<commit_message>
Added animations to plots.  Updated read me to include work distribution within the group.
</commit_message>
<xml_diff>
--- a/CaseStudy1 Presentation.pptx
+++ b/CaseStudy1 Presentation.pptx
@@ -211,7 +211,7 @@
           <a:noFill/>
           <a:extLst>
             <a:ext uri="{909E8E84-426E-40dd-AFC4-6F175D3DCCD1}">
-              <a14:hiddenFill xmlns:a14="http://schemas.microsoft.com/office/drawing/2010/main" xmlns="">
+              <a14:hiddenFill xmlns="" xmlns:a14="http://schemas.microsoft.com/office/drawing/2010/main">
                 <a:solidFill>
                   <a:srgbClr val="FFFFFF"/>
                 </a:solidFill>
@@ -270,7 +270,7 @@
             </a:ln>
             <a:extLst>
               <a:ext uri="{91240B29-F687-4f45-9708-019B960494DF}">
-                <a14:hiddenLine xmlns:a14="http://schemas.microsoft.com/office/drawing/2010/main" xmlns="" w="9525">
+                <a14:hiddenLine xmlns="" xmlns:a14="http://schemas.microsoft.com/office/drawing/2010/main" w="9525">
                   <a:solidFill>
                     <a:srgbClr val="000000"/>
                   </a:solidFill>
@@ -360,7 +360,7 @@
             </a:ln>
             <a:extLst>
               <a:ext uri="{91240B29-F687-4f45-9708-019B960494DF}">
-                <a14:hiddenLine xmlns:a14="http://schemas.microsoft.com/office/drawing/2010/main" xmlns="" w="9525">
+                <a14:hiddenLine xmlns="" xmlns:a14="http://schemas.microsoft.com/office/drawing/2010/main" w="9525">
                   <a:solidFill>
                     <a:srgbClr val="000000"/>
                   </a:solidFill>
@@ -450,7 +450,7 @@
             </a:ln>
             <a:extLst>
               <a:ext uri="{91240B29-F687-4f45-9708-019B960494DF}">
-                <a14:hiddenLine xmlns:a14="http://schemas.microsoft.com/office/drawing/2010/main" xmlns="" w="9525">
+                <a14:hiddenLine xmlns="" xmlns:a14="http://schemas.microsoft.com/office/drawing/2010/main" w="9525">
                   <a:solidFill>
                     <a:srgbClr val="000000"/>
                   </a:solidFill>
@@ -484,7 +484,7 @@
             </a:ln>
             <a:extLst>
               <a:ext uri="{91240B29-F687-4f45-9708-019B960494DF}">
-                <a14:hiddenLine xmlns:a14="http://schemas.microsoft.com/office/drawing/2010/main" xmlns="" w="9525">
+                <a14:hiddenLine xmlns="" xmlns:a14="http://schemas.microsoft.com/office/drawing/2010/main" w="9525">
                   <a:solidFill>
                     <a:srgbClr val="000000"/>
                   </a:solidFill>
@@ -574,7 +574,7 @@
             </a:ln>
             <a:extLst>
               <a:ext uri="{91240B29-F687-4f45-9708-019B960494DF}">
-                <a14:hiddenLine xmlns:a14="http://schemas.microsoft.com/office/drawing/2010/main" xmlns="" w="9525">
+                <a14:hiddenLine xmlns="" xmlns:a14="http://schemas.microsoft.com/office/drawing/2010/main" w="9525">
                   <a:solidFill>
                     <a:srgbClr val="000000"/>
                   </a:solidFill>
@@ -636,7 +636,7 @@
             </a:ln>
             <a:extLst>
               <a:ext uri="{91240B29-F687-4f45-9708-019B960494DF}">
-                <a14:hiddenLine xmlns:a14="http://schemas.microsoft.com/office/drawing/2010/main" xmlns="" w="9525">
+                <a14:hiddenLine xmlns="" xmlns:a14="http://schemas.microsoft.com/office/drawing/2010/main" w="9525">
                   <a:solidFill>
                     <a:srgbClr val="000000"/>
                   </a:solidFill>
@@ -698,7 +698,7 @@
             </a:ln>
             <a:extLst>
               <a:ext uri="{91240B29-F687-4f45-9708-019B960494DF}">
-                <a14:hiddenLine xmlns:a14="http://schemas.microsoft.com/office/drawing/2010/main" xmlns="" w="9525">
+                <a14:hiddenLine xmlns="" xmlns:a14="http://schemas.microsoft.com/office/drawing/2010/main" w="9525">
                   <a:solidFill>
                     <a:srgbClr val="000000"/>
                   </a:solidFill>
@@ -788,7 +788,7 @@
             </a:ln>
             <a:extLst>
               <a:ext uri="{91240B29-F687-4f45-9708-019B960494DF}">
-                <a14:hiddenLine xmlns:a14="http://schemas.microsoft.com/office/drawing/2010/main" xmlns="" w="9525">
+                <a14:hiddenLine xmlns="" xmlns:a14="http://schemas.microsoft.com/office/drawing/2010/main" w="9525">
                   <a:solidFill>
                     <a:srgbClr val="000000"/>
                   </a:solidFill>
@@ -850,7 +850,7 @@
             </a:ln>
             <a:extLst>
               <a:ext uri="{91240B29-F687-4f45-9708-019B960494DF}">
-                <a14:hiddenLine xmlns:a14="http://schemas.microsoft.com/office/drawing/2010/main" xmlns="" w="9525">
+                <a14:hiddenLine xmlns="" xmlns:a14="http://schemas.microsoft.com/office/drawing/2010/main" w="9525">
                   <a:solidFill>
                     <a:srgbClr val="000000"/>
                   </a:solidFill>
@@ -912,7 +912,7 @@
             </a:ln>
             <a:extLst>
               <a:ext uri="{91240B29-F687-4f45-9708-019B960494DF}">
-                <a14:hiddenLine xmlns:a14="http://schemas.microsoft.com/office/drawing/2010/main" xmlns="" w="9525">
+                <a14:hiddenLine xmlns="" xmlns:a14="http://schemas.microsoft.com/office/drawing/2010/main" w="9525">
                   <a:solidFill>
                     <a:srgbClr val="000000"/>
                   </a:solidFill>
@@ -1002,7 +1002,7 @@
             </a:ln>
             <a:extLst>
               <a:ext uri="{91240B29-F687-4f45-9708-019B960494DF}">
-                <a14:hiddenLine xmlns:a14="http://schemas.microsoft.com/office/drawing/2010/main" xmlns="" w="9525">
+                <a14:hiddenLine xmlns="" xmlns:a14="http://schemas.microsoft.com/office/drawing/2010/main" w="9525">
                   <a:solidFill>
                     <a:srgbClr val="000000"/>
                   </a:solidFill>
@@ -1092,7 +1092,7 @@
             </a:ln>
             <a:extLst>
               <a:ext uri="{91240B29-F687-4f45-9708-019B960494DF}">
-                <a14:hiddenLine xmlns:a14="http://schemas.microsoft.com/office/drawing/2010/main" xmlns="" w="9525">
+                <a14:hiddenLine xmlns="" xmlns:a14="http://schemas.microsoft.com/office/drawing/2010/main" w="9525">
                   <a:solidFill>
                     <a:srgbClr val="000000"/>
                   </a:solidFill>
@@ -1154,7 +1154,7 @@
             </a:ln>
             <a:extLst>
               <a:ext uri="{91240B29-F687-4f45-9708-019B960494DF}">
-                <a14:hiddenLine xmlns:a14="http://schemas.microsoft.com/office/drawing/2010/main" xmlns="" w="9525">
+                <a14:hiddenLine xmlns="" xmlns:a14="http://schemas.microsoft.com/office/drawing/2010/main" w="9525">
                   <a:solidFill>
                     <a:srgbClr val="000000"/>
                   </a:solidFill>
@@ -1264,7 +1264,7 @@
             </a:ln>
             <a:extLst>
               <a:ext uri="{91240B29-F687-4f45-9708-019B960494DF}">
-                <a14:hiddenLine xmlns:a14="http://schemas.microsoft.com/office/drawing/2010/main" xmlns="" w="9525">
+                <a14:hiddenLine xmlns="" xmlns:a14="http://schemas.microsoft.com/office/drawing/2010/main" w="9525">
                   <a:solidFill>
                     <a:srgbClr val="000000"/>
                   </a:solidFill>
@@ -1326,7 +1326,7 @@
             </a:ln>
             <a:extLst>
               <a:ext uri="{91240B29-F687-4f45-9708-019B960494DF}">
-                <a14:hiddenLine xmlns:a14="http://schemas.microsoft.com/office/drawing/2010/main" xmlns="" w="9525">
+                <a14:hiddenLine xmlns="" xmlns:a14="http://schemas.microsoft.com/office/drawing/2010/main" w="9525">
                   <a:solidFill>
                     <a:srgbClr val="000000"/>
                   </a:solidFill>
@@ -1416,7 +1416,7 @@
             </a:ln>
             <a:extLst>
               <a:ext uri="{91240B29-F687-4f45-9708-019B960494DF}">
-                <a14:hiddenLine xmlns:a14="http://schemas.microsoft.com/office/drawing/2010/main" xmlns="" w="9525">
+                <a14:hiddenLine xmlns="" xmlns:a14="http://schemas.microsoft.com/office/drawing/2010/main" w="9525">
                   <a:solidFill>
                     <a:srgbClr val="000000"/>
                   </a:solidFill>
@@ -1506,7 +1506,7 @@
             </a:ln>
             <a:extLst>
               <a:ext uri="{91240B29-F687-4f45-9708-019B960494DF}">
-                <a14:hiddenLine xmlns:a14="http://schemas.microsoft.com/office/drawing/2010/main" xmlns="" w="9525">
+                <a14:hiddenLine xmlns="" xmlns:a14="http://schemas.microsoft.com/office/drawing/2010/main" w="9525">
                   <a:solidFill>
                     <a:srgbClr val="000000"/>
                   </a:solidFill>
@@ -1568,7 +1568,7 @@
             </a:ln>
             <a:extLst>
               <a:ext uri="{91240B29-F687-4f45-9708-019B960494DF}">
-                <a14:hiddenLine xmlns:a14="http://schemas.microsoft.com/office/drawing/2010/main" xmlns="" w="9525">
+                <a14:hiddenLine xmlns="" xmlns:a14="http://schemas.microsoft.com/office/drawing/2010/main" w="9525">
                   <a:solidFill>
                     <a:srgbClr val="000000"/>
                   </a:solidFill>
@@ -1658,7 +1658,7 @@
             </a:ln>
             <a:extLst>
               <a:ext uri="{91240B29-F687-4f45-9708-019B960494DF}">
-                <a14:hiddenLine xmlns:a14="http://schemas.microsoft.com/office/drawing/2010/main" xmlns="" w="9525">
+                <a14:hiddenLine xmlns="" xmlns:a14="http://schemas.microsoft.com/office/drawing/2010/main" w="9525">
                   <a:solidFill>
                     <a:srgbClr val="000000"/>
                   </a:solidFill>
@@ -1748,7 +1748,7 @@
             </a:ln>
             <a:extLst>
               <a:ext uri="{91240B29-F687-4f45-9708-019B960494DF}">
-                <a14:hiddenLine xmlns:a14="http://schemas.microsoft.com/office/drawing/2010/main" xmlns="" w="9525">
+                <a14:hiddenLine xmlns="" xmlns:a14="http://schemas.microsoft.com/office/drawing/2010/main" w="9525">
                   <a:solidFill>
                     <a:srgbClr val="000000"/>
                   </a:solidFill>
@@ -1804,7 +1804,7 @@
             </a:ln>
             <a:extLst>
               <a:ext uri="{91240B29-F687-4f45-9708-019B960494DF}">
-                <a14:hiddenLine xmlns:a14="http://schemas.microsoft.com/office/drawing/2010/main" xmlns="" w="9525">
+                <a14:hiddenLine xmlns="" xmlns:a14="http://schemas.microsoft.com/office/drawing/2010/main" w="9525">
                   <a:solidFill>
                     <a:srgbClr val="000000"/>
                   </a:solidFill>
@@ -1894,7 +1894,7 @@
             </a:ln>
             <a:extLst>
               <a:ext uri="{91240B29-F687-4f45-9708-019B960494DF}">
-                <a14:hiddenLine xmlns:a14="http://schemas.microsoft.com/office/drawing/2010/main" xmlns="" w="9525">
+                <a14:hiddenLine xmlns="" xmlns:a14="http://schemas.microsoft.com/office/drawing/2010/main" w="9525">
                   <a:solidFill>
                     <a:srgbClr val="000000"/>
                   </a:solidFill>
@@ -1950,7 +1950,7 @@
             </a:ln>
             <a:extLst>
               <a:ext uri="{91240B29-F687-4f45-9708-019B960494DF}">
-                <a14:hiddenLine xmlns:a14="http://schemas.microsoft.com/office/drawing/2010/main" xmlns="" w="9525">
+                <a14:hiddenLine xmlns="" xmlns:a14="http://schemas.microsoft.com/office/drawing/2010/main" w="9525">
                   <a:solidFill>
                     <a:srgbClr val="000000"/>
                   </a:solidFill>
@@ -2040,7 +2040,7 @@
             </a:ln>
             <a:extLst>
               <a:ext uri="{91240B29-F687-4f45-9708-019B960494DF}">
-                <a14:hiddenLine xmlns:a14="http://schemas.microsoft.com/office/drawing/2010/main" xmlns="" w="9525">
+                <a14:hiddenLine xmlns="" xmlns:a14="http://schemas.microsoft.com/office/drawing/2010/main" w="9525">
                   <a:solidFill>
                     <a:srgbClr val="000000"/>
                   </a:solidFill>
@@ -2108,7 +2108,7 @@
             </a:ln>
             <a:extLst>
               <a:ext uri="{91240B29-F687-4f45-9708-019B960494DF}">
-                <a14:hiddenLine xmlns:a14="http://schemas.microsoft.com/office/drawing/2010/main" xmlns="" w="9525">
+                <a14:hiddenLine xmlns="" xmlns:a14="http://schemas.microsoft.com/office/drawing/2010/main" w="9525">
                   <a:solidFill>
                     <a:srgbClr val="000000"/>
                   </a:solidFill>
@@ -2198,7 +2198,7 @@
             </a:ln>
             <a:extLst>
               <a:ext uri="{91240B29-F687-4f45-9708-019B960494DF}">
-                <a14:hiddenLine xmlns:a14="http://schemas.microsoft.com/office/drawing/2010/main" xmlns="" w="9525">
+                <a14:hiddenLine xmlns="" xmlns:a14="http://schemas.microsoft.com/office/drawing/2010/main" w="9525">
                   <a:solidFill>
                     <a:srgbClr val="000000"/>
                   </a:solidFill>
@@ -2266,7 +2266,7 @@
             </a:ln>
             <a:extLst>
               <a:ext uri="{91240B29-F687-4f45-9708-019B960494DF}">
-                <a14:hiddenLine xmlns:a14="http://schemas.microsoft.com/office/drawing/2010/main" xmlns="" w="9525">
+                <a14:hiddenLine xmlns="" xmlns:a14="http://schemas.microsoft.com/office/drawing/2010/main" w="9525">
                   <a:solidFill>
                     <a:srgbClr val="000000"/>
                   </a:solidFill>
@@ -2356,7 +2356,7 @@
             </a:ln>
             <a:extLst>
               <a:ext uri="{91240B29-F687-4f45-9708-019B960494DF}">
-                <a14:hiddenLine xmlns:a14="http://schemas.microsoft.com/office/drawing/2010/main" xmlns="" w="9525">
+                <a14:hiddenLine xmlns="" xmlns:a14="http://schemas.microsoft.com/office/drawing/2010/main" w="9525">
                   <a:solidFill>
                     <a:srgbClr val="000000"/>
                   </a:solidFill>
@@ -2390,7 +2390,7 @@
             </a:ln>
             <a:extLst>
               <a:ext uri="{91240B29-F687-4f45-9708-019B960494DF}">
-                <a14:hiddenLine xmlns:a14="http://schemas.microsoft.com/office/drawing/2010/main" xmlns="" w="9525">
+                <a14:hiddenLine xmlns="" xmlns:a14="http://schemas.microsoft.com/office/drawing/2010/main" w="9525">
                   <a:solidFill>
                     <a:srgbClr val="000000"/>
                   </a:solidFill>
@@ -2480,7 +2480,7 @@
             </a:ln>
             <a:extLst>
               <a:ext uri="{91240B29-F687-4f45-9708-019B960494DF}">
-                <a14:hiddenLine xmlns:a14="http://schemas.microsoft.com/office/drawing/2010/main" xmlns="" w="9525">
+                <a14:hiddenLine xmlns="" xmlns:a14="http://schemas.microsoft.com/office/drawing/2010/main" w="9525">
                   <a:solidFill>
                     <a:srgbClr val="000000"/>
                   </a:solidFill>
@@ -2542,7 +2542,7 @@
             </a:ln>
             <a:extLst>
               <a:ext uri="{91240B29-F687-4f45-9708-019B960494DF}">
-                <a14:hiddenLine xmlns:a14="http://schemas.microsoft.com/office/drawing/2010/main" xmlns="" w="9525">
+                <a14:hiddenLine xmlns="" xmlns:a14="http://schemas.microsoft.com/office/drawing/2010/main" w="9525">
                   <a:solidFill>
                     <a:srgbClr val="000000"/>
                   </a:solidFill>
@@ -2604,7 +2604,7 @@
             </a:ln>
             <a:extLst>
               <a:ext uri="{91240B29-F687-4f45-9708-019B960494DF}">
-                <a14:hiddenLine xmlns:a14="http://schemas.microsoft.com/office/drawing/2010/main" xmlns="" w="9525">
+                <a14:hiddenLine xmlns="" xmlns:a14="http://schemas.microsoft.com/office/drawing/2010/main" w="9525">
                   <a:solidFill>
                     <a:srgbClr val="000000"/>
                   </a:solidFill>
@@ -2694,7 +2694,7 @@
             </a:ln>
             <a:extLst>
               <a:ext uri="{91240B29-F687-4f45-9708-019B960494DF}">
-                <a14:hiddenLine xmlns:a14="http://schemas.microsoft.com/office/drawing/2010/main" xmlns="" w="9525">
+                <a14:hiddenLine xmlns="" xmlns:a14="http://schemas.microsoft.com/office/drawing/2010/main" w="9525">
                   <a:solidFill>
                     <a:srgbClr val="000000"/>
                   </a:solidFill>
@@ -2762,7 +2762,7 @@
             </a:ln>
             <a:extLst>
               <a:ext uri="{91240B29-F687-4f45-9708-019B960494DF}">
-                <a14:hiddenLine xmlns:a14="http://schemas.microsoft.com/office/drawing/2010/main" xmlns="" w="9525">
+                <a14:hiddenLine xmlns="" xmlns:a14="http://schemas.microsoft.com/office/drawing/2010/main" w="9525">
                   <a:solidFill>
                     <a:srgbClr val="000000"/>
                   </a:solidFill>
@@ -2824,7 +2824,7 @@
             </a:ln>
             <a:extLst>
               <a:ext uri="{91240B29-F687-4f45-9708-019B960494DF}">
-                <a14:hiddenLine xmlns:a14="http://schemas.microsoft.com/office/drawing/2010/main" xmlns="" w="9525">
+                <a14:hiddenLine xmlns="" xmlns:a14="http://schemas.microsoft.com/office/drawing/2010/main" w="9525">
                   <a:solidFill>
                     <a:srgbClr val="000000"/>
                   </a:solidFill>
@@ -2914,7 +2914,7 @@
             </a:ln>
             <a:extLst>
               <a:ext uri="{91240B29-F687-4f45-9708-019B960494DF}">
-                <a14:hiddenLine xmlns:a14="http://schemas.microsoft.com/office/drawing/2010/main" xmlns="" w="9525">
+                <a14:hiddenLine xmlns="" xmlns:a14="http://schemas.microsoft.com/office/drawing/2010/main" w="9525">
                   <a:solidFill>
                     <a:srgbClr val="000000"/>
                   </a:solidFill>
@@ -2976,7 +2976,7 @@
             </a:ln>
             <a:extLst>
               <a:ext uri="{91240B29-F687-4f45-9708-019B960494DF}">
-                <a14:hiddenLine xmlns:a14="http://schemas.microsoft.com/office/drawing/2010/main" xmlns="" w="9525">
+                <a14:hiddenLine xmlns="" xmlns:a14="http://schemas.microsoft.com/office/drawing/2010/main" w="9525">
                   <a:solidFill>
                     <a:srgbClr val="000000"/>
                   </a:solidFill>
@@ -3066,7 +3066,7 @@
             </a:ln>
             <a:extLst>
               <a:ext uri="{91240B29-F687-4f45-9708-019B960494DF}">
-                <a14:hiddenLine xmlns:a14="http://schemas.microsoft.com/office/drawing/2010/main" xmlns="" w="9525">
+                <a14:hiddenLine xmlns="" xmlns:a14="http://schemas.microsoft.com/office/drawing/2010/main" w="9525">
                   <a:solidFill>
                     <a:srgbClr val="000000"/>
                   </a:solidFill>
@@ -3128,7 +3128,7 @@
             </a:ln>
             <a:extLst>
               <a:ext uri="{91240B29-F687-4f45-9708-019B960494DF}">
-                <a14:hiddenLine xmlns:a14="http://schemas.microsoft.com/office/drawing/2010/main" xmlns="" w="9525">
+                <a14:hiddenLine xmlns="" xmlns:a14="http://schemas.microsoft.com/office/drawing/2010/main" w="9525">
                   <a:solidFill>
                     <a:srgbClr val="000000"/>
                   </a:solidFill>
@@ -3218,7 +3218,7 @@
             </a:ln>
             <a:extLst>
               <a:ext uri="{91240B29-F687-4f45-9708-019B960494DF}">
-                <a14:hiddenLine xmlns:a14="http://schemas.microsoft.com/office/drawing/2010/main" xmlns="" w="9525">
+                <a14:hiddenLine xmlns="" xmlns:a14="http://schemas.microsoft.com/office/drawing/2010/main" w="9525">
                   <a:solidFill>
                     <a:srgbClr val="000000"/>
                   </a:solidFill>
@@ -3252,7 +3252,7 @@
             </a:ln>
             <a:extLst>
               <a:ext uri="{91240B29-F687-4f45-9708-019B960494DF}">
-                <a14:hiddenLine xmlns:a14="http://schemas.microsoft.com/office/drawing/2010/main" xmlns="" w="9525">
+                <a14:hiddenLine xmlns="" xmlns:a14="http://schemas.microsoft.com/office/drawing/2010/main" w="9525">
                   <a:solidFill>
                     <a:srgbClr val="000000"/>
                   </a:solidFill>
@@ -3317,7 +3317,7 @@
             </a:ln>
             <a:extLst>
               <a:ext uri="{91240B29-F687-4f45-9708-019B960494DF}">
-                <a14:hiddenLine xmlns:a14="http://schemas.microsoft.com/office/drawing/2010/main" xmlns="" w="9525">
+                <a14:hiddenLine xmlns="" xmlns:a14="http://schemas.microsoft.com/office/drawing/2010/main" w="9525">
                   <a:solidFill>
                     <a:srgbClr val="000000"/>
                   </a:solidFill>
@@ -3407,7 +3407,7 @@
             </a:ln>
             <a:extLst>
               <a:ext uri="{91240B29-F687-4f45-9708-019B960494DF}">
-                <a14:hiddenLine xmlns:a14="http://schemas.microsoft.com/office/drawing/2010/main" xmlns="" w="9525">
+                <a14:hiddenLine xmlns="" xmlns:a14="http://schemas.microsoft.com/office/drawing/2010/main" w="9525">
                   <a:solidFill>
                     <a:srgbClr val="000000"/>
                   </a:solidFill>
@@ -3469,7 +3469,7 @@
             </a:ln>
             <a:extLst>
               <a:ext uri="{91240B29-F687-4f45-9708-019B960494DF}">
-                <a14:hiddenLine xmlns:a14="http://schemas.microsoft.com/office/drawing/2010/main" xmlns="" w="9525">
+                <a14:hiddenLine xmlns="" xmlns:a14="http://schemas.microsoft.com/office/drawing/2010/main" w="9525">
                   <a:solidFill>
                     <a:srgbClr val="000000"/>
                   </a:solidFill>
@@ -3559,7 +3559,7 @@
             </a:ln>
             <a:extLst>
               <a:ext uri="{91240B29-F687-4f45-9708-019B960494DF}">
-                <a14:hiddenLine xmlns:a14="http://schemas.microsoft.com/office/drawing/2010/main" xmlns="" w="9525">
+                <a14:hiddenLine xmlns="" xmlns:a14="http://schemas.microsoft.com/office/drawing/2010/main" w="9525">
                   <a:solidFill>
                     <a:srgbClr val="000000"/>
                   </a:solidFill>
@@ -3649,7 +3649,7 @@
             </a:ln>
             <a:extLst>
               <a:ext uri="{91240B29-F687-4f45-9708-019B960494DF}">
-                <a14:hiddenLine xmlns:a14="http://schemas.microsoft.com/office/drawing/2010/main" xmlns="" w="9525">
+                <a14:hiddenLine xmlns="" xmlns:a14="http://schemas.microsoft.com/office/drawing/2010/main" w="9525">
                   <a:solidFill>
                     <a:srgbClr val="000000"/>
                   </a:solidFill>
@@ -3714,7 +3714,7 @@
             </a:ln>
             <a:extLst>
               <a:ext uri="{91240B29-F687-4f45-9708-019B960494DF}">
-                <a14:hiddenLine xmlns:a14="http://schemas.microsoft.com/office/drawing/2010/main" xmlns="" w="9525">
+                <a14:hiddenLine xmlns="" xmlns:a14="http://schemas.microsoft.com/office/drawing/2010/main" w="9525">
                   <a:solidFill>
                     <a:srgbClr val="000000"/>
                   </a:solidFill>
@@ -3776,7 +3776,7 @@
             </a:ln>
             <a:extLst>
               <a:ext uri="{91240B29-F687-4f45-9708-019B960494DF}">
-                <a14:hiddenLine xmlns:a14="http://schemas.microsoft.com/office/drawing/2010/main" xmlns="" w="9525">
+                <a14:hiddenLine xmlns="" xmlns:a14="http://schemas.microsoft.com/office/drawing/2010/main" w="9525">
                   <a:solidFill>
                     <a:srgbClr val="000000"/>
                   </a:solidFill>
@@ -3866,7 +3866,7 @@
             </a:ln>
             <a:extLst>
               <a:ext uri="{91240B29-F687-4f45-9708-019B960494DF}">
-                <a14:hiddenLine xmlns:a14="http://schemas.microsoft.com/office/drawing/2010/main" xmlns="" w="9525">
+                <a14:hiddenLine xmlns="" xmlns:a14="http://schemas.microsoft.com/office/drawing/2010/main" w="9525">
                   <a:solidFill>
                     <a:srgbClr val="000000"/>
                   </a:solidFill>
@@ -3956,7 +3956,7 @@
             </a:ln>
             <a:extLst>
               <a:ext uri="{91240B29-F687-4f45-9708-019B960494DF}">
-                <a14:hiddenLine xmlns:a14="http://schemas.microsoft.com/office/drawing/2010/main" xmlns="" w="9525">
+                <a14:hiddenLine xmlns="" xmlns:a14="http://schemas.microsoft.com/office/drawing/2010/main" w="9525">
                   <a:solidFill>
                     <a:srgbClr val="000000"/>
                   </a:solidFill>
@@ -4018,7 +4018,7 @@
             </a:ln>
             <a:extLst>
               <a:ext uri="{91240B29-F687-4f45-9708-019B960494DF}">
-                <a14:hiddenLine xmlns:a14="http://schemas.microsoft.com/office/drawing/2010/main" xmlns="" w="9525">
+                <a14:hiddenLine xmlns="" xmlns:a14="http://schemas.microsoft.com/office/drawing/2010/main" w="9525">
                   <a:solidFill>
                     <a:srgbClr val="000000"/>
                   </a:solidFill>
@@ -4138,7 +4138,7 @@
             </a:ln>
             <a:extLst>
               <a:ext uri="{91240B29-F687-4f45-9708-019B960494DF}">
-                <a14:hiddenLine xmlns:a14="http://schemas.microsoft.com/office/drawing/2010/main" xmlns="" w="9525">
+                <a14:hiddenLine xmlns="" xmlns:a14="http://schemas.microsoft.com/office/drawing/2010/main" w="9525">
                   <a:solidFill>
                     <a:srgbClr val="000000"/>
                   </a:solidFill>
@@ -4206,7 +4206,7 @@
             </a:ln>
             <a:extLst>
               <a:ext uri="{91240B29-F687-4f45-9708-019B960494DF}">
-                <a14:hiddenLine xmlns:a14="http://schemas.microsoft.com/office/drawing/2010/main" xmlns="" w="9525">
+                <a14:hiddenLine xmlns="" xmlns:a14="http://schemas.microsoft.com/office/drawing/2010/main" w="9525">
                   <a:solidFill>
                     <a:srgbClr val="000000"/>
                   </a:solidFill>
@@ -4296,7 +4296,7 @@
             </a:ln>
             <a:extLst>
               <a:ext uri="{91240B29-F687-4f45-9708-019B960494DF}">
-                <a14:hiddenLine xmlns:a14="http://schemas.microsoft.com/office/drawing/2010/main" xmlns="" w="9525">
+                <a14:hiddenLine xmlns="" xmlns:a14="http://schemas.microsoft.com/office/drawing/2010/main" w="9525">
                   <a:solidFill>
                     <a:srgbClr val="000000"/>
                   </a:solidFill>
@@ -4436,7 +4436,7 @@
           <a:p>
             <a:fld id="{48A87A34-81AB-432B-8DAE-1953F412C126}" type="datetimeFigureOut">
               <a:rPr lang="en-US" dirty="0"/>
-              <a:t>2/26/19</a:t>
+              <a:t>2/27/2019</a:t>
             </a:fld>
             <a:endParaRPr lang="en-US" dirty="0"/>
           </a:p>
@@ -4698,7 +4698,7 @@
           <a:p>
             <a:fld id="{48A87A34-81AB-432B-8DAE-1953F412C126}" type="datetimeFigureOut">
               <a:rPr lang="en-US" dirty="0"/>
-              <a:t>2/26/19</a:t>
+              <a:t>2/27/2019</a:t>
             </a:fld>
             <a:endParaRPr lang="en-US" dirty="0"/>
           </a:p>
@@ -4889,7 +4889,7 @@
           <a:p>
             <a:fld id="{48A87A34-81AB-432B-8DAE-1953F412C126}" type="datetimeFigureOut">
               <a:rPr lang="en-US" dirty="0"/>
-              <a:t>2/26/19</a:t>
+              <a:t>2/27/2019</a:t>
             </a:fld>
             <a:endParaRPr lang="en-US" dirty="0"/>
           </a:p>
@@ -5147,7 +5147,7 @@
           <a:p>
             <a:fld id="{48A87A34-81AB-432B-8DAE-1953F412C126}" type="datetimeFigureOut">
               <a:rPr lang="en-US" dirty="0"/>
-              <a:t>2/26/19</a:t>
+              <a:t>2/27/2019</a:t>
             </a:fld>
             <a:endParaRPr lang="en-US" dirty="0"/>
           </a:p>
@@ -5576,7 +5576,7 @@
           <a:p>
             <a:fld id="{48A87A34-81AB-432B-8DAE-1953F412C126}" type="datetimeFigureOut">
               <a:rPr lang="en-US" dirty="0"/>
-              <a:t>2/26/19</a:t>
+              <a:t>2/27/2019</a:t>
             </a:fld>
             <a:endParaRPr lang="en-US" dirty="0"/>
           </a:p>
@@ -6117,7 +6117,7 @@
           <a:p>
             <a:fld id="{48A87A34-81AB-432B-8DAE-1953F412C126}" type="datetimeFigureOut">
               <a:rPr lang="en-US" dirty="0"/>
-              <a:t>2/26/19</a:t>
+              <a:t>2/27/2019</a:t>
             </a:fld>
             <a:endParaRPr lang="en-US" dirty="0"/>
           </a:p>
@@ -6832,7 +6832,7 @@
           <a:p>
             <a:fld id="{48A87A34-81AB-432B-8DAE-1953F412C126}" type="datetimeFigureOut">
               <a:rPr lang="en-US" dirty="0"/>
-              <a:t>2/26/19</a:t>
+              <a:t>2/27/2019</a:t>
             </a:fld>
             <a:endParaRPr lang="en-US" dirty="0"/>
           </a:p>
@@ -6997,7 +6997,7 @@
           <a:p>
             <a:fld id="{48A87A34-81AB-432B-8DAE-1953F412C126}" type="datetimeFigureOut">
               <a:rPr lang="en-US" dirty="0"/>
-              <a:t>2/26/19</a:t>
+              <a:t>2/27/2019</a:t>
             </a:fld>
             <a:endParaRPr lang="en-US" dirty="0"/>
           </a:p>
@@ -7172,7 +7172,7 @@
           <a:p>
             <a:fld id="{48A87A34-81AB-432B-8DAE-1953F412C126}" type="datetimeFigureOut">
               <a:rPr lang="en-US" dirty="0"/>
-              <a:t>2/26/19</a:t>
+              <a:t>2/27/2019</a:t>
             </a:fld>
             <a:endParaRPr lang="en-US" dirty="0"/>
           </a:p>
@@ -7337,7 +7337,7 @@
           <a:p>
             <a:fld id="{48A87A34-81AB-432B-8DAE-1953F412C126}" type="datetimeFigureOut">
               <a:rPr lang="en-US" dirty="0"/>
-              <a:t>2/26/19</a:t>
+              <a:t>2/27/2019</a:t>
             </a:fld>
             <a:endParaRPr lang="en-US" dirty="0"/>
           </a:p>
@@ -7582,7 +7582,7 @@
           <a:p>
             <a:fld id="{48A87A34-81AB-432B-8DAE-1953F412C126}" type="datetimeFigureOut">
               <a:rPr lang="en-US" dirty="0"/>
-              <a:t>2/26/19</a:t>
+              <a:t>2/27/2019</a:t>
             </a:fld>
             <a:endParaRPr lang="en-US" dirty="0"/>
           </a:p>
@@ -7809,7 +7809,7 @@
           <a:p>
             <a:fld id="{48A87A34-81AB-432B-8DAE-1953F412C126}" type="datetimeFigureOut">
               <a:rPr lang="en-US" dirty="0"/>
-              <a:t>2/26/19</a:t>
+              <a:t>2/27/2019</a:t>
             </a:fld>
             <a:endParaRPr lang="en-US" dirty="0"/>
           </a:p>
@@ -8185,7 +8185,7 @@
           <a:p>
             <a:fld id="{48A87A34-81AB-432B-8DAE-1953F412C126}" type="datetimeFigureOut">
               <a:rPr lang="en-US" dirty="0"/>
-              <a:t>2/26/19</a:t>
+              <a:t>2/27/2019</a:t>
             </a:fld>
             <a:endParaRPr lang="en-US" dirty="0"/>
           </a:p>
@@ -8298,7 +8298,7 @@
           <a:p>
             <a:fld id="{48A87A34-81AB-432B-8DAE-1953F412C126}" type="datetimeFigureOut">
               <a:rPr lang="en-US" dirty="0"/>
-              <a:t>2/26/19</a:t>
+              <a:t>2/27/2019</a:t>
             </a:fld>
             <a:endParaRPr lang="en-US" dirty="0"/>
           </a:p>
@@ -8388,7 +8388,7 @@
           <a:p>
             <a:fld id="{48A87A34-81AB-432B-8DAE-1953F412C126}" type="datetimeFigureOut">
               <a:rPr lang="en-US" dirty="0"/>
-              <a:t>2/26/19</a:t>
+              <a:t>2/27/2019</a:t>
             </a:fld>
             <a:endParaRPr lang="en-US" dirty="0"/>
           </a:p>
@@ -8632,7 +8632,7 @@
           <a:p>
             <a:fld id="{48A87A34-81AB-432B-8DAE-1953F412C126}" type="datetimeFigureOut">
               <a:rPr lang="en-US" dirty="0"/>
-              <a:t>2/26/19</a:t>
+              <a:t>2/27/2019</a:t>
             </a:fld>
             <a:endParaRPr lang="en-US" dirty="0"/>
           </a:p>
@@ -8907,7 +8907,7 @@
           <a:p>
             <a:fld id="{48A87A34-81AB-432B-8DAE-1953F412C126}" type="datetimeFigureOut">
               <a:rPr lang="en-US" dirty="0"/>
-              <a:t>2/26/19</a:t>
+              <a:t>2/27/2019</a:t>
             </a:fld>
             <a:endParaRPr lang="en-US" dirty="0"/>
           </a:p>
@@ -9025,7 +9025,7 @@
           <a:noFill/>
           <a:extLst>
             <a:ext uri="{909E8E84-426E-40dd-AFC4-6F175D3DCCD1}">
-              <a14:hiddenFill xmlns:a14="http://schemas.microsoft.com/office/drawing/2010/main" xmlns="">
+              <a14:hiddenFill xmlns="" xmlns:a14="http://schemas.microsoft.com/office/drawing/2010/main">
                 <a:solidFill>
                   <a:srgbClr val="FFFFFF"/>
                 </a:solidFill>
@@ -9099,7 +9099,7 @@
               </a:ln>
               <a:extLst>
                 <a:ext uri="{91240B29-F687-4f45-9708-019B960494DF}">
-                  <a14:hiddenLine xmlns:a14="http://schemas.microsoft.com/office/drawing/2010/main" xmlns="" w="9525">
+                  <a14:hiddenLine xmlns="" xmlns:a14="http://schemas.microsoft.com/office/drawing/2010/main" w="9525">
                     <a:solidFill>
                       <a:srgbClr val="000000"/>
                     </a:solidFill>
@@ -9189,7 +9189,7 @@
               </a:ln>
               <a:extLst>
                 <a:ext uri="{91240B29-F687-4f45-9708-019B960494DF}">
-                  <a14:hiddenLine xmlns:a14="http://schemas.microsoft.com/office/drawing/2010/main" xmlns="" w="9525">
+                  <a14:hiddenLine xmlns="" xmlns:a14="http://schemas.microsoft.com/office/drawing/2010/main" w="9525">
                     <a:solidFill>
                       <a:srgbClr val="000000"/>
                     </a:solidFill>
@@ -9279,7 +9279,7 @@
               </a:ln>
               <a:extLst>
                 <a:ext uri="{91240B29-F687-4f45-9708-019B960494DF}">
-                  <a14:hiddenLine xmlns:a14="http://schemas.microsoft.com/office/drawing/2010/main" xmlns="" w="9525">
+                  <a14:hiddenLine xmlns="" xmlns:a14="http://schemas.microsoft.com/office/drawing/2010/main" w="9525">
                     <a:solidFill>
                       <a:srgbClr val="000000"/>
                     </a:solidFill>
@@ -9341,7 +9341,7 @@
               </a:ln>
               <a:extLst>
                 <a:ext uri="{91240B29-F687-4f45-9708-019B960494DF}">
-                  <a14:hiddenLine xmlns:a14="http://schemas.microsoft.com/office/drawing/2010/main" xmlns="" w="9525">
+                  <a14:hiddenLine xmlns="" xmlns:a14="http://schemas.microsoft.com/office/drawing/2010/main" w="9525">
                     <a:solidFill>
                       <a:srgbClr val="000000"/>
                     </a:solidFill>
@@ -9431,7 +9431,7 @@
               </a:ln>
               <a:extLst>
                 <a:ext uri="{91240B29-F687-4f45-9708-019B960494DF}">
-                  <a14:hiddenLine xmlns:a14="http://schemas.microsoft.com/office/drawing/2010/main" xmlns="" w="9525">
+                  <a14:hiddenLine xmlns="" xmlns:a14="http://schemas.microsoft.com/office/drawing/2010/main" w="9525">
                     <a:solidFill>
                       <a:srgbClr val="000000"/>
                     </a:solidFill>
@@ -9493,7 +9493,7 @@
               </a:ln>
               <a:extLst>
                 <a:ext uri="{91240B29-F687-4f45-9708-019B960494DF}">
-                  <a14:hiddenLine xmlns:a14="http://schemas.microsoft.com/office/drawing/2010/main" xmlns="" w="9525">
+                  <a14:hiddenLine xmlns="" xmlns:a14="http://schemas.microsoft.com/office/drawing/2010/main" w="9525">
                     <a:solidFill>
                       <a:srgbClr val="000000"/>
                     </a:solidFill>
@@ -9555,7 +9555,7 @@
               </a:ln>
               <a:extLst>
                 <a:ext uri="{91240B29-F687-4f45-9708-019B960494DF}">
-                  <a14:hiddenLine xmlns:a14="http://schemas.microsoft.com/office/drawing/2010/main" xmlns="" w="9525">
+                  <a14:hiddenLine xmlns="" xmlns:a14="http://schemas.microsoft.com/office/drawing/2010/main" w="9525">
                     <a:solidFill>
                       <a:srgbClr val="000000"/>
                     </a:solidFill>
@@ -9645,7 +9645,7 @@
               </a:ln>
               <a:extLst>
                 <a:ext uri="{91240B29-F687-4f45-9708-019B960494DF}">
-                  <a14:hiddenLine xmlns:a14="http://schemas.microsoft.com/office/drawing/2010/main" xmlns="" w="9525">
+                  <a14:hiddenLine xmlns="" xmlns:a14="http://schemas.microsoft.com/office/drawing/2010/main" w="9525">
                     <a:solidFill>
                       <a:srgbClr val="000000"/>
                     </a:solidFill>
@@ -9735,7 +9735,7 @@
               </a:ln>
               <a:extLst>
                 <a:ext uri="{91240B29-F687-4f45-9708-019B960494DF}">
-                  <a14:hiddenLine xmlns:a14="http://schemas.microsoft.com/office/drawing/2010/main" xmlns="" w="9525">
+                  <a14:hiddenLine xmlns="" xmlns:a14="http://schemas.microsoft.com/office/drawing/2010/main" w="9525">
                     <a:solidFill>
                       <a:srgbClr val="000000"/>
                     </a:solidFill>
@@ -9797,7 +9797,7 @@
               </a:ln>
               <a:extLst>
                 <a:ext uri="{91240B29-F687-4f45-9708-019B960494DF}">
-                  <a14:hiddenLine xmlns:a14="http://schemas.microsoft.com/office/drawing/2010/main" xmlns="" w="9525">
+                  <a14:hiddenLine xmlns="" xmlns:a14="http://schemas.microsoft.com/office/drawing/2010/main" w="9525">
                     <a:solidFill>
                       <a:srgbClr val="000000"/>
                     </a:solidFill>
@@ -9907,7 +9907,7 @@
               </a:ln>
               <a:extLst>
                 <a:ext uri="{91240B29-F687-4f45-9708-019B960494DF}">
-                  <a14:hiddenLine xmlns:a14="http://schemas.microsoft.com/office/drawing/2010/main" xmlns="" w="9525">
+                  <a14:hiddenLine xmlns="" xmlns:a14="http://schemas.microsoft.com/office/drawing/2010/main" w="9525">
                     <a:solidFill>
                       <a:srgbClr val="000000"/>
                     </a:solidFill>
@@ -9991,7 +9991,7 @@
               </a:ln>
               <a:extLst>
                 <a:ext uri="{91240B29-F687-4f45-9708-019B960494DF}">
-                  <a14:hiddenLine xmlns:a14="http://schemas.microsoft.com/office/drawing/2010/main" xmlns="" w="9525">
+                  <a14:hiddenLine xmlns="" xmlns:a14="http://schemas.microsoft.com/office/drawing/2010/main" w="9525">
                     <a:solidFill>
                       <a:srgbClr val="000000"/>
                     </a:solidFill>
@@ -10053,7 +10053,7 @@
               </a:ln>
               <a:extLst>
                 <a:ext uri="{91240B29-F687-4f45-9708-019B960494DF}">
-                  <a14:hiddenLine xmlns:a14="http://schemas.microsoft.com/office/drawing/2010/main" xmlns="" w="9525">
+                  <a14:hiddenLine xmlns="" xmlns:a14="http://schemas.microsoft.com/office/drawing/2010/main" w="9525">
                     <a:solidFill>
                       <a:srgbClr val="000000"/>
                     </a:solidFill>
@@ -10115,7 +10115,7 @@
               </a:ln>
               <a:extLst>
                 <a:ext uri="{91240B29-F687-4f45-9708-019B960494DF}">
-                  <a14:hiddenLine xmlns:a14="http://schemas.microsoft.com/office/drawing/2010/main" xmlns="" w="9525">
+                  <a14:hiddenLine xmlns="" xmlns:a14="http://schemas.microsoft.com/office/drawing/2010/main" w="9525">
                     <a:solidFill>
                       <a:srgbClr val="000000"/>
                     </a:solidFill>
@@ -10205,7 +10205,7 @@
               </a:ln>
               <a:extLst>
                 <a:ext uri="{91240B29-F687-4f45-9708-019B960494DF}">
-                  <a14:hiddenLine xmlns:a14="http://schemas.microsoft.com/office/drawing/2010/main" xmlns="" w="9525">
+                  <a14:hiddenLine xmlns="" xmlns:a14="http://schemas.microsoft.com/office/drawing/2010/main" w="9525">
                     <a:solidFill>
                       <a:srgbClr val="000000"/>
                     </a:solidFill>
@@ -10239,7 +10239,7 @@
               </a:ln>
               <a:extLst>
                 <a:ext uri="{91240B29-F687-4f45-9708-019B960494DF}">
-                  <a14:hiddenLine xmlns:a14="http://schemas.microsoft.com/office/drawing/2010/main" xmlns="" w="9525">
+                  <a14:hiddenLine xmlns="" xmlns:a14="http://schemas.microsoft.com/office/drawing/2010/main" w="9525">
                     <a:solidFill>
                       <a:srgbClr val="000000"/>
                     </a:solidFill>
@@ -10304,7 +10304,7 @@
               </a:ln>
               <a:extLst>
                 <a:ext uri="{91240B29-F687-4f45-9708-019B960494DF}">
-                  <a14:hiddenLine xmlns:a14="http://schemas.microsoft.com/office/drawing/2010/main" xmlns="" w="9525">
+                  <a14:hiddenLine xmlns="" xmlns:a14="http://schemas.microsoft.com/office/drawing/2010/main" w="9525">
                     <a:solidFill>
                       <a:srgbClr val="000000"/>
                     </a:solidFill>
@@ -10394,7 +10394,7 @@
               </a:ln>
               <a:extLst>
                 <a:ext uri="{91240B29-F687-4f45-9708-019B960494DF}">
-                  <a14:hiddenLine xmlns:a14="http://schemas.microsoft.com/office/drawing/2010/main" xmlns="" w="9525">
+                  <a14:hiddenLine xmlns="" xmlns:a14="http://schemas.microsoft.com/office/drawing/2010/main" w="9525">
                     <a:solidFill>
                       <a:srgbClr val="000000"/>
                     </a:solidFill>
@@ -10456,7 +10456,7 @@
               </a:ln>
               <a:extLst>
                 <a:ext uri="{91240B29-F687-4f45-9708-019B960494DF}">
-                  <a14:hiddenLine xmlns:a14="http://schemas.microsoft.com/office/drawing/2010/main" xmlns="" w="9525">
+                  <a14:hiddenLine xmlns="" xmlns:a14="http://schemas.microsoft.com/office/drawing/2010/main" w="9525">
                     <a:solidFill>
                       <a:srgbClr val="000000"/>
                     </a:solidFill>
@@ -10546,7 +10546,7 @@
               </a:ln>
               <a:extLst>
                 <a:ext uri="{91240B29-F687-4f45-9708-019B960494DF}">
-                  <a14:hiddenLine xmlns:a14="http://schemas.microsoft.com/office/drawing/2010/main" xmlns="" w="9525">
+                  <a14:hiddenLine xmlns="" xmlns:a14="http://schemas.microsoft.com/office/drawing/2010/main" w="9525">
                     <a:solidFill>
                       <a:srgbClr val="000000"/>
                     </a:solidFill>
@@ -10611,7 +10611,7 @@
               </a:ln>
               <a:extLst>
                 <a:ext uri="{91240B29-F687-4f45-9708-019B960494DF}">
-                  <a14:hiddenLine xmlns:a14="http://schemas.microsoft.com/office/drawing/2010/main" xmlns="" w="9525">
+                  <a14:hiddenLine xmlns="" xmlns:a14="http://schemas.microsoft.com/office/drawing/2010/main" w="9525">
                     <a:solidFill>
                       <a:srgbClr val="000000"/>
                     </a:solidFill>
@@ -10673,7 +10673,7 @@
               </a:ln>
               <a:extLst>
                 <a:ext uri="{91240B29-F687-4f45-9708-019B960494DF}">
-                  <a14:hiddenLine xmlns:a14="http://schemas.microsoft.com/office/drawing/2010/main" xmlns="" w="9525">
+                  <a14:hiddenLine xmlns="" xmlns:a14="http://schemas.microsoft.com/office/drawing/2010/main" w="9525">
                     <a:solidFill>
                       <a:srgbClr val="000000"/>
                     </a:solidFill>
@@ -10763,7 +10763,7 @@
               </a:ln>
               <a:extLst>
                 <a:ext uri="{91240B29-F687-4f45-9708-019B960494DF}">
-                  <a14:hiddenLine xmlns:a14="http://schemas.microsoft.com/office/drawing/2010/main" xmlns="" w="9525">
+                  <a14:hiddenLine xmlns="" xmlns:a14="http://schemas.microsoft.com/office/drawing/2010/main" w="9525">
                     <a:solidFill>
                       <a:srgbClr val="000000"/>
                     </a:solidFill>
@@ -10853,7 +10853,7 @@
               </a:ln>
               <a:extLst>
                 <a:ext uri="{91240B29-F687-4f45-9708-019B960494DF}">
-                  <a14:hiddenLine xmlns:a14="http://schemas.microsoft.com/office/drawing/2010/main" xmlns="" w="9525">
+                  <a14:hiddenLine xmlns="" xmlns:a14="http://schemas.microsoft.com/office/drawing/2010/main" w="9525">
                     <a:solidFill>
                       <a:srgbClr val="000000"/>
                     </a:solidFill>
@@ -10918,7 +10918,7 @@
               </a:ln>
               <a:extLst>
                 <a:ext uri="{91240B29-F687-4f45-9708-019B960494DF}">
-                  <a14:hiddenLine xmlns:a14="http://schemas.microsoft.com/office/drawing/2010/main" xmlns="" w="9525">
+                  <a14:hiddenLine xmlns="" xmlns:a14="http://schemas.microsoft.com/office/drawing/2010/main" w="9525">
                     <a:solidFill>
                       <a:srgbClr val="000000"/>
                     </a:solidFill>
@@ -11038,7 +11038,7 @@
               </a:ln>
               <a:extLst>
                 <a:ext uri="{91240B29-F687-4f45-9708-019B960494DF}">
-                  <a14:hiddenLine xmlns:a14="http://schemas.microsoft.com/office/drawing/2010/main" xmlns="" w="9525">
+                  <a14:hiddenLine xmlns="" xmlns:a14="http://schemas.microsoft.com/office/drawing/2010/main" w="9525">
                     <a:solidFill>
                       <a:srgbClr val="000000"/>
                     </a:solidFill>
@@ -11119,7 +11119,7 @@
               </a:ln>
               <a:extLst>
                 <a:ext uri="{91240B29-F687-4f45-9708-019B960494DF}">
-                  <a14:hiddenLine xmlns:a14="http://schemas.microsoft.com/office/drawing/2010/main" xmlns="" w="9525">
+                  <a14:hiddenLine xmlns="" xmlns:a14="http://schemas.microsoft.com/office/drawing/2010/main" w="9525">
                     <a:solidFill>
                       <a:srgbClr val="000000"/>
                     </a:solidFill>
@@ -11234,7 +11234,7 @@
               </a:ln>
               <a:extLst>
                 <a:ext uri="{91240B29-F687-4f45-9708-019B960494DF}">
-                  <a14:hiddenLine xmlns:a14="http://schemas.microsoft.com/office/drawing/2010/main" xmlns="" w="9525">
+                  <a14:hiddenLine xmlns="" xmlns:a14="http://schemas.microsoft.com/office/drawing/2010/main" w="9525">
                     <a:solidFill>
                       <a:srgbClr val="000000"/>
                     </a:solidFill>
@@ -11324,7 +11324,7 @@
               </a:ln>
               <a:extLst>
                 <a:ext uri="{91240B29-F687-4f45-9708-019B960494DF}">
-                  <a14:hiddenLine xmlns:a14="http://schemas.microsoft.com/office/drawing/2010/main" xmlns="" w="9525">
+                  <a14:hiddenLine xmlns="" xmlns:a14="http://schemas.microsoft.com/office/drawing/2010/main" w="9525">
                     <a:solidFill>
                       <a:srgbClr val="000000"/>
                     </a:solidFill>
@@ -11389,7 +11389,7 @@
               </a:ln>
               <a:extLst>
                 <a:ext uri="{91240B29-F687-4f45-9708-019B960494DF}">
-                  <a14:hiddenLine xmlns:a14="http://schemas.microsoft.com/office/drawing/2010/main" xmlns="" w="9525">
+                  <a14:hiddenLine xmlns="" xmlns:a14="http://schemas.microsoft.com/office/drawing/2010/main" w="9525">
                     <a:solidFill>
                       <a:srgbClr val="000000"/>
                     </a:solidFill>
@@ -11479,7 +11479,7 @@
               </a:ln>
               <a:extLst>
                 <a:ext uri="{91240B29-F687-4f45-9708-019B960494DF}">
-                  <a14:hiddenLine xmlns:a14="http://schemas.microsoft.com/office/drawing/2010/main" xmlns="" w="9525">
+                  <a14:hiddenLine xmlns="" xmlns:a14="http://schemas.microsoft.com/office/drawing/2010/main" w="9525">
                     <a:solidFill>
                       <a:srgbClr val="000000"/>
                     </a:solidFill>
@@ -11547,7 +11547,7 @@
               </a:ln>
               <a:extLst>
                 <a:ext uri="{91240B29-F687-4f45-9708-019B960494DF}">
-                  <a14:hiddenLine xmlns:a14="http://schemas.microsoft.com/office/drawing/2010/main" xmlns="" w="9525">
+                  <a14:hiddenLine xmlns="" xmlns:a14="http://schemas.microsoft.com/office/drawing/2010/main" w="9525">
                     <a:solidFill>
                       <a:srgbClr val="000000"/>
                     </a:solidFill>
@@ -11637,7 +11637,7 @@
               </a:ln>
               <a:extLst>
                 <a:ext uri="{91240B29-F687-4f45-9708-019B960494DF}">
-                  <a14:hiddenLine xmlns:a14="http://schemas.microsoft.com/office/drawing/2010/main" xmlns="" w="9525">
+                  <a14:hiddenLine xmlns="" xmlns:a14="http://schemas.microsoft.com/office/drawing/2010/main" w="9525">
                     <a:solidFill>
                       <a:srgbClr val="000000"/>
                     </a:solidFill>
@@ -11705,7 +11705,7 @@
               </a:ln>
               <a:extLst>
                 <a:ext uri="{91240B29-F687-4f45-9708-019B960494DF}">
-                  <a14:hiddenLine xmlns:a14="http://schemas.microsoft.com/office/drawing/2010/main" xmlns="" w="9525">
+                  <a14:hiddenLine xmlns="" xmlns:a14="http://schemas.microsoft.com/office/drawing/2010/main" w="9525">
                     <a:solidFill>
                       <a:srgbClr val="000000"/>
                     </a:solidFill>
@@ -11795,7 +11795,7 @@
               </a:ln>
               <a:extLst>
                 <a:ext uri="{91240B29-F687-4f45-9708-019B960494DF}">
-                  <a14:hiddenLine xmlns:a14="http://schemas.microsoft.com/office/drawing/2010/main" xmlns="" w="9525">
+                  <a14:hiddenLine xmlns="" xmlns:a14="http://schemas.microsoft.com/office/drawing/2010/main" w="9525">
                     <a:solidFill>
                       <a:srgbClr val="000000"/>
                     </a:solidFill>
@@ -11829,7 +11829,7 @@
               </a:ln>
               <a:extLst>
                 <a:ext uri="{91240B29-F687-4f45-9708-019B960494DF}">
-                  <a14:hiddenLine xmlns:a14="http://schemas.microsoft.com/office/drawing/2010/main" xmlns="" w="9525">
+                  <a14:hiddenLine xmlns="" xmlns:a14="http://schemas.microsoft.com/office/drawing/2010/main" w="9525">
                     <a:solidFill>
                       <a:srgbClr val="000000"/>
                     </a:solidFill>
@@ -11970,7 +11970,7 @@
             <a:fld id="{48A87A34-81AB-432B-8DAE-1953F412C126}" type="datetimeFigureOut">
               <a:rPr lang="en-US" dirty="0"/>
               <a:pPr/>
-              <a:t>2/26/19</a:t>
+              <a:t>2/27/2019</a:t>
             </a:fld>
             <a:endParaRPr lang="en-US" dirty="0"/>
           </a:p>
@@ -12886,6 +12886,406 @@
           </a:prstGeom>
         </p:spPr>
       </p:pic>
+      <p:cxnSp>
+        <p:nvCxnSpPr>
+          <p:cNvPr id="5" name="Straight Arrow Connector 4">
+            <a:extLst>
+              <a:ext uri="{FF2B5EF4-FFF2-40B4-BE49-F238E27FC236}">
+                <a16:creationId xmlns:a16="http://schemas.microsoft.com/office/drawing/2014/main" id="{22704B14-36BB-4A5F-89C5-71DE2E1F40BE}"/>
+              </a:ext>
+            </a:extLst>
+          </p:cNvPr>
+          <p:cNvCxnSpPr>
+            <a:cxnSpLocks/>
+          </p:cNvCxnSpPr>
+          <p:nvPr/>
+        </p:nvCxnSpPr>
+        <p:spPr>
+          <a:xfrm flipV="1">
+            <a:off x="9684688" y="874645"/>
+            <a:ext cx="0" cy="246489"/>
+          </a:xfrm>
+          <a:prstGeom prst="straightConnector1">
+            <a:avLst/>
+          </a:prstGeom>
+          <a:ln>
+            <a:tailEnd type="triangle"/>
+          </a:ln>
+        </p:spPr>
+        <p:style>
+          <a:lnRef idx="1">
+            <a:schemeClr val="dk1"/>
+          </a:lnRef>
+          <a:fillRef idx="0">
+            <a:schemeClr val="dk1"/>
+          </a:fillRef>
+          <a:effectRef idx="0">
+            <a:schemeClr val="dk1"/>
+          </a:effectRef>
+          <a:fontRef idx="minor">
+            <a:schemeClr val="tx1"/>
+          </a:fontRef>
+        </p:style>
+      </p:cxnSp>
+      <p:cxnSp>
+        <p:nvCxnSpPr>
+          <p:cNvPr id="8" name="Straight Arrow Connector 7">
+            <a:extLst>
+              <a:ext uri="{FF2B5EF4-FFF2-40B4-BE49-F238E27FC236}">
+                <a16:creationId xmlns:a16="http://schemas.microsoft.com/office/drawing/2014/main" id="{62F05304-31AE-4959-B594-52F28ED9D967}"/>
+              </a:ext>
+            </a:extLst>
+          </p:cNvPr>
+          <p:cNvCxnSpPr>
+            <a:cxnSpLocks/>
+          </p:cNvCxnSpPr>
+          <p:nvPr/>
+        </p:nvCxnSpPr>
+        <p:spPr>
+          <a:xfrm flipV="1">
+            <a:off x="8230925" y="997889"/>
+            <a:ext cx="0" cy="246489"/>
+          </a:xfrm>
+          <a:prstGeom prst="straightConnector1">
+            <a:avLst/>
+          </a:prstGeom>
+          <a:ln>
+            <a:tailEnd type="triangle"/>
+          </a:ln>
+        </p:spPr>
+        <p:style>
+          <a:lnRef idx="1">
+            <a:schemeClr val="dk1"/>
+          </a:lnRef>
+          <a:fillRef idx="0">
+            <a:schemeClr val="dk1"/>
+          </a:fillRef>
+          <a:effectRef idx="0">
+            <a:schemeClr val="dk1"/>
+          </a:effectRef>
+          <a:fontRef idx="minor">
+            <a:schemeClr val="tx1"/>
+          </a:fontRef>
+        </p:style>
+      </p:cxnSp>
+      <p:cxnSp>
+        <p:nvCxnSpPr>
+          <p:cNvPr id="9" name="Straight Arrow Connector 8">
+            <a:extLst>
+              <a:ext uri="{FF2B5EF4-FFF2-40B4-BE49-F238E27FC236}">
+                <a16:creationId xmlns:a16="http://schemas.microsoft.com/office/drawing/2014/main" id="{8C55DDCE-EAA7-443B-8DDB-69354AFE48B9}"/>
+              </a:ext>
+            </a:extLst>
+          </p:cNvPr>
+          <p:cNvCxnSpPr>
+            <a:cxnSpLocks/>
+          </p:cNvCxnSpPr>
+          <p:nvPr/>
+        </p:nvCxnSpPr>
+        <p:spPr>
+          <a:xfrm flipV="1">
+            <a:off x="6998473" y="1094630"/>
+            <a:ext cx="0" cy="246489"/>
+          </a:xfrm>
+          <a:prstGeom prst="straightConnector1">
+            <a:avLst/>
+          </a:prstGeom>
+          <a:ln>
+            <a:tailEnd type="triangle"/>
+          </a:ln>
+        </p:spPr>
+        <p:style>
+          <a:lnRef idx="1">
+            <a:schemeClr val="dk1"/>
+          </a:lnRef>
+          <a:fillRef idx="0">
+            <a:schemeClr val="dk1"/>
+          </a:fillRef>
+          <a:effectRef idx="0">
+            <a:schemeClr val="dk1"/>
+          </a:effectRef>
+          <a:fontRef idx="minor">
+            <a:schemeClr val="tx1"/>
+          </a:fontRef>
+        </p:style>
+      </p:cxnSp>
+      <p:cxnSp>
+        <p:nvCxnSpPr>
+          <p:cNvPr id="10" name="Straight Arrow Connector 9">
+            <a:extLst>
+              <a:ext uri="{FF2B5EF4-FFF2-40B4-BE49-F238E27FC236}">
+                <a16:creationId xmlns:a16="http://schemas.microsoft.com/office/drawing/2014/main" id="{571F7282-60F6-40ED-9972-FF7CAC1341AB}"/>
+              </a:ext>
+            </a:extLst>
+          </p:cNvPr>
+          <p:cNvCxnSpPr>
+            <a:cxnSpLocks/>
+          </p:cNvCxnSpPr>
+          <p:nvPr/>
+        </p:nvCxnSpPr>
+        <p:spPr>
+          <a:xfrm flipV="1">
+            <a:off x="6346465" y="1207274"/>
+            <a:ext cx="0" cy="246489"/>
+          </a:xfrm>
+          <a:prstGeom prst="straightConnector1">
+            <a:avLst/>
+          </a:prstGeom>
+          <a:ln>
+            <a:tailEnd type="triangle"/>
+          </a:ln>
+        </p:spPr>
+        <p:style>
+          <a:lnRef idx="1">
+            <a:schemeClr val="dk1"/>
+          </a:lnRef>
+          <a:fillRef idx="0">
+            <a:schemeClr val="dk1"/>
+          </a:fillRef>
+          <a:effectRef idx="0">
+            <a:schemeClr val="dk1"/>
+          </a:effectRef>
+          <a:fontRef idx="minor">
+            <a:schemeClr val="tx1"/>
+          </a:fontRef>
+        </p:style>
+      </p:cxnSp>
+      <p:cxnSp>
+        <p:nvCxnSpPr>
+          <p:cNvPr id="11" name="Straight Arrow Connector 10">
+            <a:extLst>
+              <a:ext uri="{FF2B5EF4-FFF2-40B4-BE49-F238E27FC236}">
+                <a16:creationId xmlns:a16="http://schemas.microsoft.com/office/drawing/2014/main" id="{D9F74891-139A-4CDD-9618-2DCE2CE78688}"/>
+              </a:ext>
+            </a:extLst>
+          </p:cNvPr>
+          <p:cNvCxnSpPr>
+            <a:cxnSpLocks/>
+          </p:cNvCxnSpPr>
+          <p:nvPr/>
+        </p:nvCxnSpPr>
+        <p:spPr>
+          <a:xfrm flipV="1">
+            <a:off x="6195390" y="1341119"/>
+            <a:ext cx="0" cy="246489"/>
+          </a:xfrm>
+          <a:prstGeom prst="straightConnector1">
+            <a:avLst/>
+          </a:prstGeom>
+          <a:ln>
+            <a:tailEnd type="triangle"/>
+          </a:ln>
+        </p:spPr>
+        <p:style>
+          <a:lnRef idx="1">
+            <a:schemeClr val="dk1"/>
+          </a:lnRef>
+          <a:fillRef idx="0">
+            <a:schemeClr val="dk1"/>
+          </a:fillRef>
+          <a:effectRef idx="0">
+            <a:schemeClr val="dk1"/>
+          </a:effectRef>
+          <a:fontRef idx="minor">
+            <a:schemeClr val="tx1"/>
+          </a:fontRef>
+        </p:style>
+      </p:cxnSp>
+      <p:cxnSp>
+        <p:nvCxnSpPr>
+          <p:cNvPr id="13" name="Straight Arrow Connector 12">
+            <a:extLst>
+              <a:ext uri="{FF2B5EF4-FFF2-40B4-BE49-F238E27FC236}">
+                <a16:creationId xmlns:a16="http://schemas.microsoft.com/office/drawing/2014/main" id="{F2FEB7E7-5D1D-48B9-B844-6D46DB6C1B03}"/>
+              </a:ext>
+            </a:extLst>
+          </p:cNvPr>
+          <p:cNvCxnSpPr/>
+          <p:nvPr/>
+        </p:nvCxnSpPr>
+        <p:spPr>
+          <a:xfrm flipH="1">
+            <a:off x="1383527" y="6058894"/>
+            <a:ext cx="151075" cy="0"/>
+          </a:xfrm>
+          <a:prstGeom prst="straightConnector1">
+            <a:avLst/>
+          </a:prstGeom>
+          <a:ln>
+            <a:tailEnd type="triangle"/>
+          </a:ln>
+        </p:spPr>
+        <p:style>
+          <a:lnRef idx="1">
+            <a:schemeClr val="dk1"/>
+          </a:lnRef>
+          <a:fillRef idx="0">
+            <a:schemeClr val="dk1"/>
+          </a:fillRef>
+          <a:effectRef idx="0">
+            <a:schemeClr val="dk1"/>
+          </a:effectRef>
+          <a:fontRef idx="minor">
+            <a:schemeClr val="tx1"/>
+          </a:fontRef>
+        </p:style>
+      </p:cxnSp>
+      <p:cxnSp>
+        <p:nvCxnSpPr>
+          <p:cNvPr id="14" name="Straight Arrow Connector 13">
+            <a:extLst>
+              <a:ext uri="{FF2B5EF4-FFF2-40B4-BE49-F238E27FC236}">
+                <a16:creationId xmlns:a16="http://schemas.microsoft.com/office/drawing/2014/main" id="{FF290AFB-4623-454E-9F05-961345839BAE}"/>
+              </a:ext>
+            </a:extLst>
+          </p:cNvPr>
+          <p:cNvCxnSpPr/>
+          <p:nvPr/>
+        </p:nvCxnSpPr>
+        <p:spPr>
+          <a:xfrm flipH="1">
+            <a:off x="1296103" y="5980747"/>
+            <a:ext cx="151075" cy="0"/>
+          </a:xfrm>
+          <a:prstGeom prst="straightConnector1">
+            <a:avLst/>
+          </a:prstGeom>
+          <a:ln>
+            <a:tailEnd type="triangle"/>
+          </a:ln>
+        </p:spPr>
+        <p:style>
+          <a:lnRef idx="1">
+            <a:schemeClr val="dk1"/>
+          </a:lnRef>
+          <a:fillRef idx="0">
+            <a:schemeClr val="dk1"/>
+          </a:fillRef>
+          <a:effectRef idx="0">
+            <a:schemeClr val="dk1"/>
+          </a:effectRef>
+          <a:fontRef idx="minor">
+            <a:schemeClr val="tx1"/>
+          </a:fontRef>
+        </p:style>
+      </p:cxnSp>
+      <p:cxnSp>
+        <p:nvCxnSpPr>
+          <p:cNvPr id="15" name="Straight Arrow Connector 14">
+            <a:extLst>
+              <a:ext uri="{FF2B5EF4-FFF2-40B4-BE49-F238E27FC236}">
+                <a16:creationId xmlns:a16="http://schemas.microsoft.com/office/drawing/2014/main" id="{C97B424C-98F1-4365-A7E2-A9BEAD84A371}"/>
+              </a:ext>
+            </a:extLst>
+          </p:cNvPr>
+          <p:cNvCxnSpPr/>
+          <p:nvPr/>
+        </p:nvCxnSpPr>
+        <p:spPr>
+          <a:xfrm flipH="1">
+            <a:off x="1307989" y="5858869"/>
+            <a:ext cx="151075" cy="0"/>
+          </a:xfrm>
+          <a:prstGeom prst="straightConnector1">
+            <a:avLst/>
+          </a:prstGeom>
+          <a:ln>
+            <a:tailEnd type="triangle"/>
+          </a:ln>
+        </p:spPr>
+        <p:style>
+          <a:lnRef idx="1">
+            <a:schemeClr val="dk1"/>
+          </a:lnRef>
+          <a:fillRef idx="0">
+            <a:schemeClr val="dk1"/>
+          </a:fillRef>
+          <a:effectRef idx="0">
+            <a:schemeClr val="dk1"/>
+          </a:effectRef>
+          <a:fontRef idx="minor">
+            <a:schemeClr val="tx1"/>
+          </a:fontRef>
+        </p:style>
+      </p:cxnSp>
+      <p:cxnSp>
+        <p:nvCxnSpPr>
+          <p:cNvPr id="16" name="Straight Arrow Connector 15">
+            <a:extLst>
+              <a:ext uri="{FF2B5EF4-FFF2-40B4-BE49-F238E27FC236}">
+                <a16:creationId xmlns:a16="http://schemas.microsoft.com/office/drawing/2014/main" id="{68187017-987A-4505-AA46-1CE7C03F5249}"/>
+              </a:ext>
+            </a:extLst>
+          </p:cNvPr>
+          <p:cNvCxnSpPr/>
+          <p:nvPr/>
+        </p:nvCxnSpPr>
+        <p:spPr>
+          <a:xfrm flipH="1">
+            <a:off x="1307989" y="5744569"/>
+            <a:ext cx="151075" cy="0"/>
+          </a:xfrm>
+          <a:prstGeom prst="straightConnector1">
+            <a:avLst/>
+          </a:prstGeom>
+          <a:ln>
+            <a:tailEnd type="triangle"/>
+          </a:ln>
+        </p:spPr>
+        <p:style>
+          <a:lnRef idx="1">
+            <a:schemeClr val="dk1"/>
+          </a:lnRef>
+          <a:fillRef idx="0">
+            <a:schemeClr val="dk1"/>
+          </a:fillRef>
+          <a:effectRef idx="0">
+            <a:schemeClr val="dk1"/>
+          </a:effectRef>
+          <a:fontRef idx="minor">
+            <a:schemeClr val="tx1"/>
+          </a:fontRef>
+        </p:style>
+      </p:cxnSp>
+      <p:cxnSp>
+        <p:nvCxnSpPr>
+          <p:cNvPr id="17" name="Straight Arrow Connector 16">
+            <a:extLst>
+              <a:ext uri="{FF2B5EF4-FFF2-40B4-BE49-F238E27FC236}">
+                <a16:creationId xmlns:a16="http://schemas.microsoft.com/office/drawing/2014/main" id="{E7F93676-B783-4AA0-8E6A-9D6FD91FB9D2}"/>
+              </a:ext>
+            </a:extLst>
+          </p:cNvPr>
+          <p:cNvCxnSpPr/>
+          <p:nvPr/>
+        </p:nvCxnSpPr>
+        <p:spPr>
+          <a:xfrm flipH="1">
+            <a:off x="1459064" y="5630269"/>
+            <a:ext cx="151075" cy="0"/>
+          </a:xfrm>
+          <a:prstGeom prst="straightConnector1">
+            <a:avLst/>
+          </a:prstGeom>
+          <a:ln>
+            <a:tailEnd type="triangle"/>
+          </a:ln>
+        </p:spPr>
+        <p:style>
+          <a:lnRef idx="1">
+            <a:schemeClr val="dk1"/>
+          </a:lnRef>
+          <a:fillRef idx="0">
+            <a:schemeClr val="dk1"/>
+          </a:fillRef>
+          <a:effectRef idx="0">
+            <a:schemeClr val="dk1"/>
+          </a:effectRef>
+          <a:fontRef idx="minor">
+            <a:schemeClr val="tx1"/>
+          </a:fontRef>
+        </p:style>
+      </p:cxnSp>
     </p:spTree>
     <p:extLst>
       <p:ext uri="{BB962C8B-B14F-4D97-AF65-F5344CB8AC3E}">
@@ -12896,6 +13296,342 @@
   <p:clrMapOvr>
     <a:masterClrMapping/>
   </p:clrMapOvr>
+  <p:timing>
+    <p:tnLst>
+      <p:par>
+        <p:cTn id="1" dur="indefinite" restart="never" nodeType="tmRoot">
+          <p:childTnLst>
+            <p:seq concurrent="1" nextAc="seek">
+              <p:cTn id="2" dur="indefinite" nodeType="mainSeq">
+                <p:childTnLst>
+                  <p:par>
+                    <p:cTn id="3" fill="hold">
+                      <p:stCondLst>
+                        <p:cond delay="indefinite"/>
+                      </p:stCondLst>
+                      <p:childTnLst>
+                        <p:par>
+                          <p:cTn id="4" fill="hold">
+                            <p:stCondLst>
+                              <p:cond delay="0"/>
+                            </p:stCondLst>
+                            <p:childTnLst>
+                              <p:par>
+                                <p:cTn id="5" presetID="1" presetClass="entr" presetSubtype="0" fill="hold" nodeType="clickEffect">
+                                  <p:stCondLst>
+                                    <p:cond delay="0"/>
+                                  </p:stCondLst>
+                                  <p:childTnLst>
+                                    <p:set>
+                                      <p:cBhvr>
+                                        <p:cTn id="6" dur="1" fill="hold">
+                                          <p:stCondLst>
+                                            <p:cond delay="0"/>
+                                          </p:stCondLst>
+                                        </p:cTn>
+                                        <p:tgtEl>
+                                          <p:spTgt spid="8"/>
+                                        </p:tgtEl>
+                                        <p:attrNameLst>
+                                          <p:attrName>style.visibility</p:attrName>
+                                        </p:attrNameLst>
+                                      </p:cBhvr>
+                                      <p:to>
+                                        <p:strVal val="visible"/>
+                                      </p:to>
+                                    </p:set>
+                                  </p:childTnLst>
+                                </p:cTn>
+                              </p:par>
+                              <p:par>
+                                <p:cTn id="7" presetID="1" presetClass="entr" presetSubtype="0" fill="hold" nodeType="withEffect">
+                                  <p:stCondLst>
+                                    <p:cond delay="0"/>
+                                  </p:stCondLst>
+                                  <p:childTnLst>
+                                    <p:set>
+                                      <p:cBhvr>
+                                        <p:cTn id="8" dur="1" fill="hold">
+                                          <p:stCondLst>
+                                            <p:cond delay="0"/>
+                                          </p:stCondLst>
+                                        </p:cTn>
+                                        <p:tgtEl>
+                                          <p:spTgt spid="9"/>
+                                        </p:tgtEl>
+                                        <p:attrNameLst>
+                                          <p:attrName>style.visibility</p:attrName>
+                                        </p:attrNameLst>
+                                      </p:cBhvr>
+                                      <p:to>
+                                        <p:strVal val="visible"/>
+                                      </p:to>
+                                    </p:set>
+                                  </p:childTnLst>
+                                </p:cTn>
+                              </p:par>
+                              <p:par>
+                                <p:cTn id="9" presetID="1" presetClass="entr" presetSubtype="0" fill="hold" nodeType="withEffect">
+                                  <p:stCondLst>
+                                    <p:cond delay="0"/>
+                                  </p:stCondLst>
+                                  <p:childTnLst>
+                                    <p:set>
+                                      <p:cBhvr>
+                                        <p:cTn id="10" dur="1" fill="hold">
+                                          <p:stCondLst>
+                                            <p:cond delay="0"/>
+                                          </p:stCondLst>
+                                        </p:cTn>
+                                        <p:tgtEl>
+                                          <p:spTgt spid="10"/>
+                                        </p:tgtEl>
+                                        <p:attrNameLst>
+                                          <p:attrName>style.visibility</p:attrName>
+                                        </p:attrNameLst>
+                                      </p:cBhvr>
+                                      <p:to>
+                                        <p:strVal val="visible"/>
+                                      </p:to>
+                                    </p:set>
+                                  </p:childTnLst>
+                                </p:cTn>
+                              </p:par>
+                              <p:par>
+                                <p:cTn id="11" presetID="1" presetClass="entr" presetSubtype="0" fill="hold" nodeType="withEffect">
+                                  <p:stCondLst>
+                                    <p:cond delay="0"/>
+                                  </p:stCondLst>
+                                  <p:childTnLst>
+                                    <p:set>
+                                      <p:cBhvr>
+                                        <p:cTn id="12" dur="1" fill="hold">
+                                          <p:stCondLst>
+                                            <p:cond delay="0"/>
+                                          </p:stCondLst>
+                                        </p:cTn>
+                                        <p:tgtEl>
+                                          <p:spTgt spid="11"/>
+                                        </p:tgtEl>
+                                        <p:attrNameLst>
+                                          <p:attrName>style.visibility</p:attrName>
+                                        </p:attrNameLst>
+                                      </p:cBhvr>
+                                      <p:to>
+                                        <p:strVal val="visible"/>
+                                      </p:to>
+                                    </p:set>
+                                  </p:childTnLst>
+                                </p:cTn>
+                              </p:par>
+                              <p:par>
+                                <p:cTn id="13" presetID="1" presetClass="entr" presetSubtype="0" fill="hold" nodeType="withEffect">
+                                  <p:stCondLst>
+                                    <p:cond delay="0"/>
+                                  </p:stCondLst>
+                                  <p:childTnLst>
+                                    <p:set>
+                                      <p:cBhvr>
+                                        <p:cTn id="14" dur="1" fill="hold">
+                                          <p:stCondLst>
+                                            <p:cond delay="0"/>
+                                          </p:stCondLst>
+                                        </p:cTn>
+                                        <p:tgtEl>
+                                          <p:spTgt spid="5"/>
+                                        </p:tgtEl>
+                                        <p:attrNameLst>
+                                          <p:attrName>style.visibility</p:attrName>
+                                        </p:attrNameLst>
+                                      </p:cBhvr>
+                                      <p:to>
+                                        <p:strVal val="visible"/>
+                                      </p:to>
+                                    </p:set>
+                                  </p:childTnLst>
+                                </p:cTn>
+                              </p:par>
+                            </p:childTnLst>
+                          </p:cTn>
+                        </p:par>
+                      </p:childTnLst>
+                    </p:cTn>
+                  </p:par>
+                  <p:par>
+                    <p:cTn id="15" fill="hold">
+                      <p:stCondLst>
+                        <p:cond delay="indefinite"/>
+                      </p:stCondLst>
+                      <p:childTnLst>
+                        <p:par>
+                          <p:cTn id="16" fill="hold">
+                            <p:stCondLst>
+                              <p:cond delay="0"/>
+                            </p:stCondLst>
+                            <p:childTnLst>
+                              <p:par>
+                                <p:cTn id="17" presetID="1" presetClass="entr" presetSubtype="0" fill="hold" nodeType="clickEffect">
+                                  <p:stCondLst>
+                                    <p:cond delay="0"/>
+                                  </p:stCondLst>
+                                  <p:childTnLst>
+                                    <p:set>
+                                      <p:cBhvr>
+                                        <p:cTn id="18" dur="1" fill="hold">
+                                          <p:stCondLst>
+                                            <p:cond delay="0"/>
+                                          </p:stCondLst>
+                                        </p:cTn>
+                                        <p:tgtEl>
+                                          <p:spTgt spid="13"/>
+                                        </p:tgtEl>
+                                        <p:attrNameLst>
+                                          <p:attrName>style.visibility</p:attrName>
+                                        </p:attrNameLst>
+                                      </p:cBhvr>
+                                      <p:to>
+                                        <p:strVal val="visible"/>
+                                      </p:to>
+                                    </p:set>
+                                  </p:childTnLst>
+                                </p:cTn>
+                              </p:par>
+                              <p:par>
+                                <p:cTn id="19" presetID="1" presetClass="entr" presetSubtype="0" fill="hold" nodeType="withEffect">
+                                  <p:stCondLst>
+                                    <p:cond delay="0"/>
+                                  </p:stCondLst>
+                                  <p:childTnLst>
+                                    <p:set>
+                                      <p:cBhvr>
+                                        <p:cTn id="20" dur="1" fill="hold">
+                                          <p:stCondLst>
+                                            <p:cond delay="0"/>
+                                          </p:stCondLst>
+                                        </p:cTn>
+                                        <p:tgtEl>
+                                          <p:spTgt spid="14"/>
+                                        </p:tgtEl>
+                                        <p:attrNameLst>
+                                          <p:attrName>style.visibility</p:attrName>
+                                        </p:attrNameLst>
+                                      </p:cBhvr>
+                                      <p:to>
+                                        <p:strVal val="visible"/>
+                                      </p:to>
+                                    </p:set>
+                                  </p:childTnLst>
+                                </p:cTn>
+                              </p:par>
+                              <p:par>
+                                <p:cTn id="21" presetID="1" presetClass="entr" presetSubtype="0" fill="hold" nodeType="withEffect">
+                                  <p:stCondLst>
+                                    <p:cond delay="0"/>
+                                  </p:stCondLst>
+                                  <p:childTnLst>
+                                    <p:set>
+                                      <p:cBhvr>
+                                        <p:cTn id="22" dur="1" fill="hold">
+                                          <p:stCondLst>
+                                            <p:cond delay="0"/>
+                                          </p:stCondLst>
+                                        </p:cTn>
+                                        <p:tgtEl>
+                                          <p:spTgt spid="15"/>
+                                        </p:tgtEl>
+                                        <p:attrNameLst>
+                                          <p:attrName>style.visibility</p:attrName>
+                                        </p:attrNameLst>
+                                      </p:cBhvr>
+                                      <p:to>
+                                        <p:strVal val="visible"/>
+                                      </p:to>
+                                    </p:set>
+                                  </p:childTnLst>
+                                </p:cTn>
+                              </p:par>
+                              <p:par>
+                                <p:cTn id="23" presetID="1" presetClass="entr" presetSubtype="0" fill="hold" nodeType="withEffect">
+                                  <p:stCondLst>
+                                    <p:cond delay="0"/>
+                                  </p:stCondLst>
+                                  <p:childTnLst>
+                                    <p:set>
+                                      <p:cBhvr>
+                                        <p:cTn id="24" dur="1" fill="hold">
+                                          <p:stCondLst>
+                                            <p:cond delay="0"/>
+                                          </p:stCondLst>
+                                        </p:cTn>
+                                        <p:tgtEl>
+                                          <p:spTgt spid="16"/>
+                                        </p:tgtEl>
+                                        <p:attrNameLst>
+                                          <p:attrName>style.visibility</p:attrName>
+                                        </p:attrNameLst>
+                                      </p:cBhvr>
+                                      <p:to>
+                                        <p:strVal val="visible"/>
+                                      </p:to>
+                                    </p:set>
+                                  </p:childTnLst>
+                                </p:cTn>
+                              </p:par>
+                              <p:par>
+                                <p:cTn id="25" presetID="1" presetClass="entr" presetSubtype="0" fill="hold" nodeType="withEffect">
+                                  <p:stCondLst>
+                                    <p:cond delay="0"/>
+                                  </p:stCondLst>
+                                  <p:childTnLst>
+                                    <p:set>
+                                      <p:cBhvr>
+                                        <p:cTn id="26" dur="1" fill="hold">
+                                          <p:stCondLst>
+                                            <p:cond delay="0"/>
+                                          </p:stCondLst>
+                                        </p:cTn>
+                                        <p:tgtEl>
+                                          <p:spTgt spid="17"/>
+                                        </p:tgtEl>
+                                        <p:attrNameLst>
+                                          <p:attrName>style.visibility</p:attrName>
+                                        </p:attrNameLst>
+                                      </p:cBhvr>
+                                      <p:to>
+                                        <p:strVal val="visible"/>
+                                      </p:to>
+                                    </p:set>
+                                  </p:childTnLst>
+                                </p:cTn>
+                              </p:par>
+                            </p:childTnLst>
+                          </p:cTn>
+                        </p:par>
+                      </p:childTnLst>
+                    </p:cTn>
+                  </p:par>
+                </p:childTnLst>
+              </p:cTn>
+              <p:prevCondLst>
+                <p:cond evt="onPrev" delay="0">
+                  <p:tgtEl>
+                    <p:sldTgt/>
+                  </p:tgtEl>
+                </p:cond>
+              </p:prevCondLst>
+              <p:nextCondLst>
+                <p:cond evt="onNext" delay="0">
+                  <p:tgtEl>
+                    <p:sldTgt/>
+                  </p:tgtEl>
+                </p:cond>
+              </p:nextCondLst>
+            </p:seq>
+          </p:childTnLst>
+        </p:cTn>
+      </p:par>
+    </p:tnLst>
+  </p:timing>
 </p:sld>
 </file>
 
@@ -16296,6 +17032,84 @@
           </a:p>
         </p:txBody>
       </p:sp>
+      <p:cxnSp>
+        <p:nvCxnSpPr>
+          <p:cNvPr id="9" name="Straight Arrow Connector 8">
+            <a:extLst>
+              <a:ext uri="{FF2B5EF4-FFF2-40B4-BE49-F238E27FC236}">
+                <a16:creationId xmlns:a16="http://schemas.microsoft.com/office/drawing/2014/main" id="{A141CA27-2EAD-4742-B5EF-A5455F031E4E}"/>
+              </a:ext>
+            </a:extLst>
+          </p:cNvPr>
+          <p:cNvCxnSpPr/>
+          <p:nvPr/>
+        </p:nvCxnSpPr>
+        <p:spPr>
+          <a:xfrm>
+            <a:off x="846468" y="6011890"/>
+            <a:ext cx="190500" cy="0"/>
+          </a:xfrm>
+          <a:prstGeom prst="straightConnector1">
+            <a:avLst/>
+          </a:prstGeom>
+          <a:ln>
+            <a:tailEnd type="triangle"/>
+          </a:ln>
+        </p:spPr>
+        <p:style>
+          <a:lnRef idx="1">
+            <a:schemeClr val="dk1"/>
+          </a:lnRef>
+          <a:fillRef idx="0">
+            <a:schemeClr val="dk1"/>
+          </a:fillRef>
+          <a:effectRef idx="0">
+            <a:schemeClr val="dk1"/>
+          </a:effectRef>
+          <a:fontRef idx="minor">
+            <a:schemeClr val="tx1"/>
+          </a:fontRef>
+        </p:style>
+      </p:cxnSp>
+      <p:cxnSp>
+        <p:nvCxnSpPr>
+          <p:cNvPr id="11" name="Straight Arrow Connector 10">
+            <a:extLst>
+              <a:ext uri="{FF2B5EF4-FFF2-40B4-BE49-F238E27FC236}">
+                <a16:creationId xmlns:a16="http://schemas.microsoft.com/office/drawing/2014/main" id="{E24A1B23-C1BF-4716-B249-2759055232CE}"/>
+              </a:ext>
+            </a:extLst>
+          </p:cNvPr>
+          <p:cNvCxnSpPr/>
+          <p:nvPr/>
+        </p:nvCxnSpPr>
+        <p:spPr>
+          <a:xfrm>
+            <a:off x="846468" y="6088381"/>
+            <a:ext cx="190500" cy="0"/>
+          </a:xfrm>
+          <a:prstGeom prst="straightConnector1">
+            <a:avLst/>
+          </a:prstGeom>
+          <a:ln>
+            <a:tailEnd type="triangle"/>
+          </a:ln>
+        </p:spPr>
+        <p:style>
+          <a:lnRef idx="1">
+            <a:schemeClr val="dk1"/>
+          </a:lnRef>
+          <a:fillRef idx="0">
+            <a:schemeClr val="dk1"/>
+          </a:fillRef>
+          <a:effectRef idx="0">
+            <a:schemeClr val="dk1"/>
+          </a:effectRef>
+          <a:fontRef idx="minor">
+            <a:schemeClr val="tx1"/>
+          </a:fontRef>
+        </p:style>
+      </p:cxnSp>
     </p:spTree>
     <p:extLst>
       <p:ext uri="{BB962C8B-B14F-4D97-AF65-F5344CB8AC3E}">
@@ -16306,6 +17120,108 @@
   <p:clrMapOvr>
     <a:masterClrMapping/>
   </p:clrMapOvr>
+  <p:timing>
+    <p:tnLst>
+      <p:par>
+        <p:cTn id="1" dur="indefinite" restart="never" nodeType="tmRoot">
+          <p:childTnLst>
+            <p:seq concurrent="1" nextAc="seek">
+              <p:cTn id="2" dur="indefinite" nodeType="mainSeq">
+                <p:childTnLst>
+                  <p:par>
+                    <p:cTn id="3" fill="hold">
+                      <p:stCondLst>
+                        <p:cond delay="indefinite"/>
+                      </p:stCondLst>
+                      <p:childTnLst>
+                        <p:par>
+                          <p:cTn id="4" fill="hold">
+                            <p:stCondLst>
+                              <p:cond delay="0"/>
+                            </p:stCondLst>
+                            <p:childTnLst>
+                              <p:par>
+                                <p:cTn id="5" presetID="1" presetClass="entr" presetSubtype="0" fill="hold" nodeType="clickEffect">
+                                  <p:stCondLst>
+                                    <p:cond delay="0"/>
+                                  </p:stCondLst>
+                                  <p:childTnLst>
+                                    <p:set>
+                                      <p:cBhvr>
+                                        <p:cTn id="6" dur="1" fill="hold">
+                                          <p:stCondLst>
+                                            <p:cond delay="0"/>
+                                          </p:stCondLst>
+                                        </p:cTn>
+                                        <p:tgtEl>
+                                          <p:spTgt spid="9"/>
+                                        </p:tgtEl>
+                                        <p:attrNameLst>
+                                          <p:attrName>style.visibility</p:attrName>
+                                        </p:attrNameLst>
+                                      </p:cBhvr>
+                                      <p:to>
+                                        <p:strVal val="visible"/>
+                                      </p:to>
+                                    </p:set>
+                                  </p:childTnLst>
+                                </p:cTn>
+                              </p:par>
+                              <p:par>
+                                <p:cTn id="7" presetID="1" presetClass="entr" presetSubtype="0" fill="hold" nodeType="withEffect">
+                                  <p:stCondLst>
+                                    <p:cond delay="0"/>
+                                  </p:stCondLst>
+                                  <p:childTnLst>
+                                    <p:set>
+                                      <p:cBhvr>
+                                        <p:cTn id="8" dur="1" fill="hold">
+                                          <p:stCondLst>
+                                            <p:cond delay="0"/>
+                                          </p:stCondLst>
+                                        </p:cTn>
+                                        <p:tgtEl>
+                                          <p:spTgt spid="11"/>
+                                        </p:tgtEl>
+                                        <p:attrNameLst>
+                                          <p:attrName>style.visibility</p:attrName>
+                                        </p:attrNameLst>
+                                      </p:cBhvr>
+                                      <p:to>
+                                        <p:strVal val="visible"/>
+                                      </p:to>
+                                    </p:set>
+                                  </p:childTnLst>
+                                </p:cTn>
+                              </p:par>
+                            </p:childTnLst>
+                          </p:cTn>
+                        </p:par>
+                      </p:childTnLst>
+                    </p:cTn>
+                  </p:par>
+                </p:childTnLst>
+              </p:cTn>
+              <p:prevCondLst>
+                <p:cond evt="onPrev" delay="0">
+                  <p:tgtEl>
+                    <p:sldTgt/>
+                  </p:tgtEl>
+                </p:cond>
+              </p:prevCondLst>
+              <p:nextCondLst>
+                <p:cond evt="onNext" delay="0">
+                  <p:tgtEl>
+                    <p:sldTgt/>
+                  </p:tgtEl>
+                </p:cond>
+              </p:nextCondLst>
+            </p:seq>
+          </p:childTnLst>
+        </p:cTn>
+      </p:par>
+    </p:tnLst>
+  </p:timing>
 </p:sld>
 </file>
 
@@ -16517,6 +17433,133 @@
           </a:p>
         </p:txBody>
       </p:sp>
+      <p:cxnSp>
+        <p:nvCxnSpPr>
+          <p:cNvPr id="6" name="Straight Arrow Connector 5">
+            <a:extLst>
+              <a:ext uri="{FF2B5EF4-FFF2-40B4-BE49-F238E27FC236}">
+                <a16:creationId xmlns:a16="http://schemas.microsoft.com/office/drawing/2014/main" id="{206CF37A-A1C9-4402-A247-A7A4A26CBF2B}"/>
+              </a:ext>
+            </a:extLst>
+          </p:cNvPr>
+          <p:cNvCxnSpPr/>
+          <p:nvPr/>
+        </p:nvCxnSpPr>
+        <p:spPr>
+          <a:xfrm>
+            <a:off x="751070" y="6121510"/>
+            <a:ext cx="182880" cy="0"/>
+          </a:xfrm>
+          <a:prstGeom prst="straightConnector1">
+            <a:avLst/>
+          </a:prstGeom>
+          <a:ln>
+            <a:tailEnd type="triangle"/>
+          </a:ln>
+        </p:spPr>
+        <p:style>
+          <a:lnRef idx="1">
+            <a:schemeClr val="dk1"/>
+          </a:lnRef>
+          <a:fillRef idx="0">
+            <a:schemeClr val="dk1"/>
+          </a:fillRef>
+          <a:effectRef idx="0">
+            <a:schemeClr val="dk1"/>
+          </a:effectRef>
+          <a:fontRef idx="minor">
+            <a:schemeClr val="tx1"/>
+          </a:fontRef>
+        </p:style>
+      </p:cxnSp>
+      <p:cxnSp>
+        <p:nvCxnSpPr>
+          <p:cNvPr id="8" name="Straight Arrow Connector 7">
+            <a:extLst>
+              <a:ext uri="{FF2B5EF4-FFF2-40B4-BE49-F238E27FC236}">
+                <a16:creationId xmlns:a16="http://schemas.microsoft.com/office/drawing/2014/main" id="{48823947-7BF7-4DC7-9BFB-069A0660DE5E}"/>
+              </a:ext>
+            </a:extLst>
+          </p:cNvPr>
+          <p:cNvCxnSpPr/>
+          <p:nvPr/>
+        </p:nvCxnSpPr>
+        <p:spPr>
+          <a:xfrm>
+            <a:off x="751070" y="2844910"/>
+            <a:ext cx="182880" cy="0"/>
+          </a:xfrm>
+          <a:prstGeom prst="straightConnector1">
+            <a:avLst/>
+          </a:prstGeom>
+          <a:ln>
+            <a:solidFill>
+              <a:schemeClr val="tx2">
+                <a:lumMod val="75000"/>
+              </a:schemeClr>
+            </a:solidFill>
+            <a:tailEnd type="triangle"/>
+          </a:ln>
+        </p:spPr>
+        <p:style>
+          <a:lnRef idx="1">
+            <a:schemeClr val="dk1"/>
+          </a:lnRef>
+          <a:fillRef idx="0">
+            <a:schemeClr val="dk1"/>
+          </a:fillRef>
+          <a:effectRef idx="0">
+            <a:schemeClr val="dk1"/>
+          </a:effectRef>
+          <a:fontRef idx="minor">
+            <a:schemeClr val="tx1"/>
+          </a:fontRef>
+        </p:style>
+      </p:cxnSp>
+      <p:cxnSp>
+        <p:nvCxnSpPr>
+          <p:cNvPr id="9" name="Straight Arrow Connector 8">
+            <a:extLst>
+              <a:ext uri="{FF2B5EF4-FFF2-40B4-BE49-F238E27FC236}">
+                <a16:creationId xmlns:a16="http://schemas.microsoft.com/office/drawing/2014/main" id="{3D6840C9-E54B-4BE7-B9DC-9F882D4393B0}"/>
+              </a:ext>
+            </a:extLst>
+          </p:cNvPr>
+          <p:cNvCxnSpPr/>
+          <p:nvPr/>
+        </p:nvCxnSpPr>
+        <p:spPr>
+          <a:xfrm>
+            <a:off x="751070" y="5443330"/>
+            <a:ext cx="182880" cy="0"/>
+          </a:xfrm>
+          <a:prstGeom prst="straightConnector1">
+            <a:avLst/>
+          </a:prstGeom>
+          <a:ln>
+            <a:solidFill>
+              <a:schemeClr val="tx2">
+                <a:lumMod val="75000"/>
+              </a:schemeClr>
+            </a:solidFill>
+            <a:tailEnd type="triangle"/>
+          </a:ln>
+        </p:spPr>
+        <p:style>
+          <a:lnRef idx="1">
+            <a:schemeClr val="dk1"/>
+          </a:lnRef>
+          <a:fillRef idx="0">
+            <a:schemeClr val="dk1"/>
+          </a:fillRef>
+          <a:effectRef idx="0">
+            <a:schemeClr val="dk1"/>
+          </a:effectRef>
+          <a:fontRef idx="minor">
+            <a:schemeClr val="tx1"/>
+          </a:fontRef>
+        </p:style>
+      </p:cxnSp>
     </p:spTree>
     <p:extLst>
       <p:ext uri="{BB962C8B-B14F-4D97-AF65-F5344CB8AC3E}">
@@ -16527,6 +17570,153 @@
   <p:clrMapOvr>
     <a:masterClrMapping/>
   </p:clrMapOvr>
+  <p:timing>
+    <p:tnLst>
+      <p:par>
+        <p:cTn id="1" dur="indefinite" restart="never" nodeType="tmRoot">
+          <p:childTnLst>
+            <p:seq concurrent="1" nextAc="seek">
+              <p:cTn id="2" dur="indefinite" nodeType="mainSeq">
+                <p:childTnLst>
+                  <p:par>
+                    <p:cTn id="3" fill="hold">
+                      <p:stCondLst>
+                        <p:cond delay="indefinite"/>
+                      </p:stCondLst>
+                      <p:childTnLst>
+                        <p:par>
+                          <p:cTn id="4" fill="hold">
+                            <p:stCondLst>
+                              <p:cond delay="0"/>
+                            </p:stCondLst>
+                            <p:childTnLst>
+                              <p:par>
+                                <p:cTn id="5" presetID="1" presetClass="entr" presetSubtype="0" fill="hold" nodeType="clickEffect">
+                                  <p:stCondLst>
+                                    <p:cond delay="0"/>
+                                  </p:stCondLst>
+                                  <p:childTnLst>
+                                    <p:set>
+                                      <p:cBhvr>
+                                        <p:cTn id="6" dur="1" fill="hold">
+                                          <p:stCondLst>
+                                            <p:cond delay="0"/>
+                                          </p:stCondLst>
+                                        </p:cTn>
+                                        <p:tgtEl>
+                                          <p:spTgt spid="6"/>
+                                        </p:tgtEl>
+                                        <p:attrNameLst>
+                                          <p:attrName>style.visibility</p:attrName>
+                                        </p:attrNameLst>
+                                      </p:cBhvr>
+                                      <p:to>
+                                        <p:strVal val="visible"/>
+                                      </p:to>
+                                    </p:set>
+                                  </p:childTnLst>
+                                </p:cTn>
+                              </p:par>
+                            </p:childTnLst>
+                          </p:cTn>
+                        </p:par>
+                      </p:childTnLst>
+                    </p:cTn>
+                  </p:par>
+                  <p:par>
+                    <p:cTn id="7" fill="hold">
+                      <p:stCondLst>
+                        <p:cond delay="indefinite"/>
+                      </p:stCondLst>
+                      <p:childTnLst>
+                        <p:par>
+                          <p:cTn id="8" fill="hold">
+                            <p:stCondLst>
+                              <p:cond delay="0"/>
+                            </p:stCondLst>
+                            <p:childTnLst>
+                              <p:par>
+                                <p:cTn id="9" presetID="1" presetClass="entr" presetSubtype="0" fill="hold" nodeType="clickEffect">
+                                  <p:stCondLst>
+                                    <p:cond delay="0"/>
+                                  </p:stCondLst>
+                                  <p:childTnLst>
+                                    <p:set>
+                                      <p:cBhvr>
+                                        <p:cTn id="10" dur="1" fill="hold">
+                                          <p:stCondLst>
+                                            <p:cond delay="0"/>
+                                          </p:stCondLst>
+                                        </p:cTn>
+                                        <p:tgtEl>
+                                          <p:spTgt spid="8"/>
+                                        </p:tgtEl>
+                                        <p:attrNameLst>
+                                          <p:attrName>style.visibility</p:attrName>
+                                        </p:attrNameLst>
+                                      </p:cBhvr>
+                                      <p:to>
+                                        <p:strVal val="visible"/>
+                                      </p:to>
+                                    </p:set>
+                                  </p:childTnLst>
+                                </p:cTn>
+                              </p:par>
+                              <p:par>
+                                <p:cTn id="11" presetID="1" presetClass="entr" presetSubtype="0" fill="hold" nodeType="withEffect">
+                                  <p:stCondLst>
+                                    <p:cond delay="0"/>
+                                  </p:stCondLst>
+                                  <p:childTnLst>
+                                    <p:set>
+                                      <p:cBhvr>
+                                        <p:cTn id="12" dur="1" fill="hold">
+                                          <p:stCondLst>
+                                            <p:cond delay="0"/>
+                                          </p:stCondLst>
+                                        </p:cTn>
+                                        <p:tgtEl>
+                                          <p:spTgt spid="9"/>
+                                        </p:tgtEl>
+                                        <p:attrNameLst>
+                                          <p:attrName>style.visibility</p:attrName>
+                                        </p:attrNameLst>
+                                      </p:cBhvr>
+                                      <p:to>
+                                        <p:strVal val="visible"/>
+                                      </p:to>
+                                    </p:set>
+                                  </p:childTnLst>
+                                </p:cTn>
+                              </p:par>
+                            </p:childTnLst>
+                          </p:cTn>
+                        </p:par>
+                      </p:childTnLst>
+                    </p:cTn>
+                  </p:par>
+                </p:childTnLst>
+              </p:cTn>
+              <p:prevCondLst>
+                <p:cond evt="onPrev" delay="0">
+                  <p:tgtEl>
+                    <p:sldTgt/>
+                  </p:tgtEl>
+                </p:cond>
+              </p:prevCondLst>
+              <p:nextCondLst>
+                <p:cond evt="onNext" delay="0">
+                  <p:tgtEl>
+                    <p:sldTgt/>
+                  </p:tgtEl>
+                </p:cond>
+              </p:nextCondLst>
+            </p:seq>
+          </p:childTnLst>
+        </p:cTn>
+      </p:par>
+    </p:tnLst>
+  </p:timing>
 </p:sld>
 </file>
 
@@ -16706,7 +17896,7 @@
             </a:ln>
             <a:extLst>
               <a:ext uri="{91240B29-F687-4f45-9708-019B960494DF}">
-                <a14:hiddenLine xmlns="" xmlns:a14="http://schemas.microsoft.com/office/drawing/2010/main" xmlns:p14="http://schemas.microsoft.com/office/powerpoint/2010/main" xmlns:a16="http://schemas.microsoft.com/office/drawing/2014/main" w="9525">
+                <a14:hiddenLine xmlns:a16="http://schemas.microsoft.com/office/drawing/2014/main" xmlns:p14="http://schemas.microsoft.com/office/powerpoint/2010/main" xmlns:a14="http://schemas.microsoft.com/office/drawing/2010/main" xmlns="" w="9525">
                   <a:solidFill>
                     <a:srgbClr val="000000"/>
                   </a:solidFill>
@@ -16811,7 +18001,7 @@
             </a:ln>
             <a:extLst>
               <a:ext uri="{91240B29-F687-4f45-9708-019B960494DF}">
-                <a14:hiddenLine xmlns="" xmlns:a14="http://schemas.microsoft.com/office/drawing/2010/main" xmlns:p14="http://schemas.microsoft.com/office/powerpoint/2010/main" xmlns:a16="http://schemas.microsoft.com/office/drawing/2014/main" w="9525">
+                <a14:hiddenLine xmlns:a16="http://schemas.microsoft.com/office/drawing/2014/main" xmlns:p14="http://schemas.microsoft.com/office/powerpoint/2010/main" xmlns:a14="http://schemas.microsoft.com/office/drawing/2010/main" xmlns="" w="9525">
                   <a:solidFill>
                     <a:srgbClr val="000000"/>
                   </a:solidFill>
@@ -16916,7 +18106,7 @@
             </a:ln>
             <a:extLst>
               <a:ext uri="{91240B29-F687-4f45-9708-019B960494DF}">
-                <a14:hiddenLine xmlns="" xmlns:a14="http://schemas.microsoft.com/office/drawing/2010/main" xmlns:p14="http://schemas.microsoft.com/office/powerpoint/2010/main" xmlns:a16="http://schemas.microsoft.com/office/drawing/2014/main" w="9525">
+                <a14:hiddenLine xmlns:a16="http://schemas.microsoft.com/office/drawing/2014/main" xmlns:p14="http://schemas.microsoft.com/office/powerpoint/2010/main" xmlns:a14="http://schemas.microsoft.com/office/drawing/2010/main" xmlns="" w="9525">
                   <a:solidFill>
                     <a:srgbClr val="000000"/>
                   </a:solidFill>
@@ -16993,7 +18183,7 @@
             </a:ln>
             <a:extLst>
               <a:ext uri="{91240B29-F687-4f45-9708-019B960494DF}">
-                <a14:hiddenLine xmlns="" xmlns:a14="http://schemas.microsoft.com/office/drawing/2010/main" xmlns:p14="http://schemas.microsoft.com/office/powerpoint/2010/main" xmlns:a16="http://schemas.microsoft.com/office/drawing/2014/main" w="9525">
+                <a14:hiddenLine xmlns:a16="http://schemas.microsoft.com/office/drawing/2014/main" xmlns:p14="http://schemas.microsoft.com/office/powerpoint/2010/main" xmlns:a14="http://schemas.microsoft.com/office/drawing/2010/main" xmlns="" w="9525">
                   <a:solidFill>
                     <a:srgbClr val="000000"/>
                   </a:solidFill>
@@ -17098,7 +18288,7 @@
             </a:ln>
             <a:extLst>
               <a:ext uri="{91240B29-F687-4f45-9708-019B960494DF}">
-                <a14:hiddenLine xmlns="" xmlns:a14="http://schemas.microsoft.com/office/drawing/2010/main" xmlns:p14="http://schemas.microsoft.com/office/powerpoint/2010/main" xmlns:a16="http://schemas.microsoft.com/office/drawing/2014/main" w="9525">
+                <a14:hiddenLine xmlns:a16="http://schemas.microsoft.com/office/drawing/2014/main" xmlns:p14="http://schemas.microsoft.com/office/powerpoint/2010/main" xmlns:a14="http://schemas.microsoft.com/office/drawing/2010/main" xmlns="" w="9525">
                   <a:solidFill>
                     <a:srgbClr val="000000"/>
                   </a:solidFill>
@@ -17175,7 +18365,7 @@
             </a:ln>
             <a:extLst>
               <a:ext uri="{91240B29-F687-4f45-9708-019B960494DF}">
-                <a14:hiddenLine xmlns="" xmlns:a14="http://schemas.microsoft.com/office/drawing/2010/main" xmlns:p14="http://schemas.microsoft.com/office/powerpoint/2010/main" xmlns:a16="http://schemas.microsoft.com/office/drawing/2014/main" w="9525">
+                <a14:hiddenLine xmlns:a16="http://schemas.microsoft.com/office/drawing/2014/main" xmlns:p14="http://schemas.microsoft.com/office/powerpoint/2010/main" xmlns:a14="http://schemas.microsoft.com/office/drawing/2010/main" xmlns="" w="9525">
                   <a:solidFill>
                     <a:srgbClr val="000000"/>
                   </a:solidFill>
@@ -17252,7 +18442,7 @@
             </a:ln>
             <a:extLst>
               <a:ext uri="{91240B29-F687-4f45-9708-019B960494DF}">
-                <a14:hiddenLine xmlns="" xmlns:a14="http://schemas.microsoft.com/office/drawing/2010/main" xmlns:p14="http://schemas.microsoft.com/office/powerpoint/2010/main" xmlns:a16="http://schemas.microsoft.com/office/drawing/2014/main" w="9525">
+                <a14:hiddenLine xmlns:a16="http://schemas.microsoft.com/office/drawing/2014/main" xmlns:p14="http://schemas.microsoft.com/office/powerpoint/2010/main" xmlns:a14="http://schemas.microsoft.com/office/drawing/2010/main" xmlns="" w="9525">
                   <a:solidFill>
                     <a:srgbClr val="000000"/>
                   </a:solidFill>
@@ -17357,7 +18547,7 @@
             </a:ln>
             <a:extLst>
               <a:ext uri="{91240B29-F687-4f45-9708-019B960494DF}">
-                <a14:hiddenLine xmlns="" xmlns:a14="http://schemas.microsoft.com/office/drawing/2010/main" xmlns:p14="http://schemas.microsoft.com/office/powerpoint/2010/main" xmlns:a16="http://schemas.microsoft.com/office/drawing/2014/main" w="9525">
+                <a14:hiddenLine xmlns:a16="http://schemas.microsoft.com/office/drawing/2014/main" xmlns:p14="http://schemas.microsoft.com/office/powerpoint/2010/main" xmlns:a14="http://schemas.microsoft.com/office/drawing/2010/main" xmlns="" w="9525">
                   <a:solidFill>
                     <a:srgbClr val="000000"/>
                   </a:solidFill>
@@ -17462,7 +18652,7 @@
             </a:ln>
             <a:extLst>
               <a:ext uri="{91240B29-F687-4f45-9708-019B960494DF}">
-                <a14:hiddenLine xmlns="" xmlns:a14="http://schemas.microsoft.com/office/drawing/2010/main" xmlns:p14="http://schemas.microsoft.com/office/powerpoint/2010/main" xmlns:a16="http://schemas.microsoft.com/office/drawing/2014/main" w="9525">
+                <a14:hiddenLine xmlns:a16="http://schemas.microsoft.com/office/drawing/2014/main" xmlns:p14="http://schemas.microsoft.com/office/powerpoint/2010/main" xmlns:a14="http://schemas.microsoft.com/office/drawing/2010/main" xmlns="" w="9525">
                   <a:solidFill>
                     <a:srgbClr val="000000"/>
                   </a:solidFill>
@@ -17539,7 +18729,7 @@
             </a:ln>
             <a:extLst>
               <a:ext uri="{91240B29-F687-4f45-9708-019B960494DF}">
-                <a14:hiddenLine xmlns="" xmlns:a14="http://schemas.microsoft.com/office/drawing/2010/main" xmlns:p14="http://schemas.microsoft.com/office/powerpoint/2010/main" xmlns:a16="http://schemas.microsoft.com/office/drawing/2014/main" w="9525">
+                <a14:hiddenLine xmlns:a16="http://schemas.microsoft.com/office/drawing/2014/main" xmlns:p14="http://schemas.microsoft.com/office/powerpoint/2010/main" xmlns:a14="http://schemas.microsoft.com/office/drawing/2010/main" xmlns="" w="9525">
                   <a:solidFill>
                     <a:srgbClr val="000000"/>
                   </a:solidFill>
@@ -17664,7 +18854,7 @@
             </a:ln>
             <a:extLst>
               <a:ext uri="{91240B29-F687-4f45-9708-019B960494DF}">
-                <a14:hiddenLine xmlns="" xmlns:a14="http://schemas.microsoft.com/office/drawing/2010/main" xmlns:p14="http://schemas.microsoft.com/office/powerpoint/2010/main" xmlns:a16="http://schemas.microsoft.com/office/drawing/2014/main" w="9525">
+                <a14:hiddenLine xmlns:a16="http://schemas.microsoft.com/office/drawing/2014/main" xmlns:p14="http://schemas.microsoft.com/office/powerpoint/2010/main" xmlns:a14="http://schemas.microsoft.com/office/drawing/2010/main" xmlns="" w="9525">
                   <a:solidFill>
                     <a:srgbClr val="000000"/>
                   </a:solidFill>
@@ -17778,7 +18968,7 @@
             </a:ln>
             <a:extLst>
               <a:ext uri="{91240B29-F687-4f45-9708-019B960494DF}">
-                <a14:hiddenLine xmlns="" xmlns:a14="http://schemas.microsoft.com/office/drawing/2010/main" xmlns:p14="http://schemas.microsoft.com/office/powerpoint/2010/main" xmlns:a16="http://schemas.microsoft.com/office/drawing/2014/main" w="9525">
+                <a14:hiddenLine xmlns:a16="http://schemas.microsoft.com/office/drawing/2014/main" xmlns:p14="http://schemas.microsoft.com/office/powerpoint/2010/main" xmlns:a14="http://schemas.microsoft.com/office/drawing/2010/main" xmlns="" w="9525">
                   <a:solidFill>
                     <a:srgbClr val="000000"/>
                   </a:solidFill>
@@ -17855,7 +19045,7 @@
             </a:ln>
             <a:extLst>
               <a:ext uri="{91240B29-F687-4f45-9708-019B960494DF}">
-                <a14:hiddenLine xmlns="" xmlns:a14="http://schemas.microsoft.com/office/drawing/2010/main" xmlns:p14="http://schemas.microsoft.com/office/powerpoint/2010/main" xmlns:a16="http://schemas.microsoft.com/office/drawing/2014/main" w="9525">
+                <a14:hiddenLine xmlns:a16="http://schemas.microsoft.com/office/drawing/2014/main" xmlns:p14="http://schemas.microsoft.com/office/powerpoint/2010/main" xmlns:a14="http://schemas.microsoft.com/office/drawing/2010/main" xmlns="" w="9525">
                   <a:solidFill>
                     <a:srgbClr val="000000"/>
                   </a:solidFill>
@@ -17932,7 +19122,7 @@
             </a:ln>
             <a:extLst>
               <a:ext uri="{91240B29-F687-4f45-9708-019B960494DF}">
-                <a14:hiddenLine xmlns="" xmlns:a14="http://schemas.microsoft.com/office/drawing/2010/main" xmlns:p14="http://schemas.microsoft.com/office/powerpoint/2010/main" xmlns:a16="http://schemas.microsoft.com/office/drawing/2014/main" w="9525">
+                <a14:hiddenLine xmlns:a16="http://schemas.microsoft.com/office/drawing/2014/main" xmlns:p14="http://schemas.microsoft.com/office/powerpoint/2010/main" xmlns:a14="http://schemas.microsoft.com/office/drawing/2010/main" xmlns="" w="9525">
                   <a:solidFill>
                     <a:srgbClr val="000000"/>
                   </a:solidFill>
@@ -18037,7 +19227,7 @@
             </a:ln>
             <a:extLst>
               <a:ext uri="{91240B29-F687-4f45-9708-019B960494DF}">
-                <a14:hiddenLine xmlns="" xmlns:a14="http://schemas.microsoft.com/office/drawing/2010/main" xmlns:p14="http://schemas.microsoft.com/office/powerpoint/2010/main" xmlns:a16="http://schemas.microsoft.com/office/drawing/2014/main" w="9525">
+                <a14:hiddenLine xmlns:a16="http://schemas.microsoft.com/office/drawing/2014/main" xmlns:p14="http://schemas.microsoft.com/office/powerpoint/2010/main" xmlns:a14="http://schemas.microsoft.com/office/drawing/2010/main" xmlns="" w="9525">
                   <a:solidFill>
                     <a:srgbClr val="000000"/>
                   </a:solidFill>
@@ -18086,7 +19276,7 @@
             </a:ln>
             <a:extLst>
               <a:ext uri="{91240B29-F687-4f45-9708-019B960494DF}">
-                <a14:hiddenLine xmlns="" xmlns:a14="http://schemas.microsoft.com/office/drawing/2010/main" xmlns:p14="http://schemas.microsoft.com/office/powerpoint/2010/main" xmlns:a16="http://schemas.microsoft.com/office/drawing/2014/main" w="9525">
+                <a14:hiddenLine xmlns:a16="http://schemas.microsoft.com/office/drawing/2014/main" xmlns:p14="http://schemas.microsoft.com/office/powerpoint/2010/main" xmlns:a14="http://schemas.microsoft.com/office/drawing/2010/main" xmlns="" w="9525">
                   <a:solidFill>
                     <a:srgbClr val="000000"/>
                   </a:solidFill>
@@ -18166,7 +19356,7 @@
             </a:ln>
             <a:extLst>
               <a:ext uri="{91240B29-F687-4f45-9708-019B960494DF}">
-                <a14:hiddenLine xmlns="" xmlns:a14="http://schemas.microsoft.com/office/drawing/2010/main" xmlns:p14="http://schemas.microsoft.com/office/powerpoint/2010/main" xmlns:a16="http://schemas.microsoft.com/office/drawing/2014/main" w="9525">
+                <a14:hiddenLine xmlns:a16="http://schemas.microsoft.com/office/drawing/2014/main" xmlns:p14="http://schemas.microsoft.com/office/powerpoint/2010/main" xmlns:a14="http://schemas.microsoft.com/office/drawing/2010/main" xmlns="" w="9525">
                   <a:solidFill>
                     <a:srgbClr val="000000"/>
                   </a:solidFill>
@@ -18271,7 +19461,7 @@
             </a:ln>
             <a:extLst>
               <a:ext uri="{91240B29-F687-4f45-9708-019B960494DF}">
-                <a14:hiddenLine xmlns="" xmlns:a14="http://schemas.microsoft.com/office/drawing/2010/main" xmlns:p14="http://schemas.microsoft.com/office/powerpoint/2010/main" xmlns:a16="http://schemas.microsoft.com/office/drawing/2014/main" w="9525">
+                <a14:hiddenLine xmlns:a16="http://schemas.microsoft.com/office/drawing/2014/main" xmlns:p14="http://schemas.microsoft.com/office/powerpoint/2010/main" xmlns:a14="http://schemas.microsoft.com/office/drawing/2010/main" xmlns="" w="9525">
                   <a:solidFill>
                     <a:srgbClr val="000000"/>
                   </a:solidFill>
@@ -18348,7 +19538,7 @@
             </a:ln>
             <a:extLst>
               <a:ext uri="{91240B29-F687-4f45-9708-019B960494DF}">
-                <a14:hiddenLine xmlns="" xmlns:a14="http://schemas.microsoft.com/office/drawing/2010/main" xmlns:p14="http://schemas.microsoft.com/office/powerpoint/2010/main" xmlns:a16="http://schemas.microsoft.com/office/drawing/2014/main" w="9525">
+                <a14:hiddenLine xmlns:a16="http://schemas.microsoft.com/office/drawing/2014/main" xmlns:p14="http://schemas.microsoft.com/office/powerpoint/2010/main" xmlns:a14="http://schemas.microsoft.com/office/drawing/2010/main" xmlns="" w="9525">
                   <a:solidFill>
                     <a:srgbClr val="000000"/>
                   </a:solidFill>
@@ -18453,7 +19643,7 @@
             </a:ln>
             <a:extLst>
               <a:ext uri="{91240B29-F687-4f45-9708-019B960494DF}">
-                <a14:hiddenLine xmlns="" xmlns:a14="http://schemas.microsoft.com/office/drawing/2010/main" xmlns:p14="http://schemas.microsoft.com/office/powerpoint/2010/main" xmlns:a16="http://schemas.microsoft.com/office/drawing/2014/main" w="9525">
+                <a14:hiddenLine xmlns:a16="http://schemas.microsoft.com/office/drawing/2014/main" xmlns:p14="http://schemas.microsoft.com/office/powerpoint/2010/main" xmlns:a14="http://schemas.microsoft.com/office/drawing/2010/main" xmlns="" w="9525">
                   <a:solidFill>
                     <a:srgbClr val="000000"/>
                   </a:solidFill>
@@ -18533,7 +19723,7 @@
             </a:ln>
             <a:extLst>
               <a:ext uri="{91240B29-F687-4f45-9708-019B960494DF}">
-                <a14:hiddenLine xmlns="" xmlns:a14="http://schemas.microsoft.com/office/drawing/2010/main" xmlns:p14="http://schemas.microsoft.com/office/powerpoint/2010/main" xmlns:a16="http://schemas.microsoft.com/office/drawing/2014/main" w="9525">
+                <a14:hiddenLine xmlns:a16="http://schemas.microsoft.com/office/drawing/2014/main" xmlns:p14="http://schemas.microsoft.com/office/powerpoint/2010/main" xmlns:a14="http://schemas.microsoft.com/office/drawing/2010/main" xmlns="" w="9525">
                   <a:solidFill>
                     <a:srgbClr val="000000"/>
                   </a:solidFill>
@@ -18610,7 +19800,7 @@
             </a:ln>
             <a:extLst>
               <a:ext uri="{91240B29-F687-4f45-9708-019B960494DF}">
-                <a14:hiddenLine xmlns="" xmlns:a14="http://schemas.microsoft.com/office/drawing/2010/main" xmlns:p14="http://schemas.microsoft.com/office/powerpoint/2010/main" xmlns:a16="http://schemas.microsoft.com/office/drawing/2014/main" w="9525">
+                <a14:hiddenLine xmlns:a16="http://schemas.microsoft.com/office/drawing/2014/main" xmlns:p14="http://schemas.microsoft.com/office/powerpoint/2010/main" xmlns:a14="http://schemas.microsoft.com/office/drawing/2010/main" xmlns="" w="9525">
                   <a:solidFill>
                     <a:srgbClr val="000000"/>
                   </a:solidFill>
@@ -18715,7 +19905,7 @@
             </a:ln>
             <a:extLst>
               <a:ext uri="{91240B29-F687-4f45-9708-019B960494DF}">
-                <a14:hiddenLine xmlns="" xmlns:a14="http://schemas.microsoft.com/office/drawing/2010/main" xmlns:p14="http://schemas.microsoft.com/office/powerpoint/2010/main" xmlns:a16="http://schemas.microsoft.com/office/drawing/2014/main" w="9525">
+                <a14:hiddenLine xmlns:a16="http://schemas.microsoft.com/office/drawing/2014/main" xmlns:p14="http://schemas.microsoft.com/office/powerpoint/2010/main" xmlns:a14="http://schemas.microsoft.com/office/drawing/2010/main" xmlns="" w="9525">
                   <a:solidFill>
                     <a:srgbClr val="000000"/>
                   </a:solidFill>
@@ -18820,7 +20010,7 @@
             </a:ln>
             <a:extLst>
               <a:ext uri="{91240B29-F687-4f45-9708-019B960494DF}">
-                <a14:hiddenLine xmlns="" xmlns:a14="http://schemas.microsoft.com/office/drawing/2010/main" xmlns:p14="http://schemas.microsoft.com/office/powerpoint/2010/main" xmlns:a16="http://schemas.microsoft.com/office/drawing/2014/main" w="9525">
+                <a14:hiddenLine xmlns:a16="http://schemas.microsoft.com/office/drawing/2014/main" xmlns:p14="http://schemas.microsoft.com/office/powerpoint/2010/main" xmlns:a14="http://schemas.microsoft.com/office/drawing/2010/main" xmlns="" w="9525">
                   <a:solidFill>
                     <a:srgbClr val="000000"/>
                   </a:solidFill>
@@ -18900,7 +20090,7 @@
             </a:ln>
             <a:extLst>
               <a:ext uri="{91240B29-F687-4f45-9708-019B960494DF}">
-                <a14:hiddenLine xmlns="" xmlns:a14="http://schemas.microsoft.com/office/drawing/2010/main" xmlns:p14="http://schemas.microsoft.com/office/powerpoint/2010/main" xmlns:a16="http://schemas.microsoft.com/office/drawing/2014/main" w="9525">
+                <a14:hiddenLine xmlns:a16="http://schemas.microsoft.com/office/drawing/2014/main" xmlns:p14="http://schemas.microsoft.com/office/powerpoint/2010/main" xmlns:a14="http://schemas.microsoft.com/office/drawing/2010/main" xmlns="" w="9525">
                   <a:solidFill>
                     <a:srgbClr val="000000"/>
                   </a:solidFill>
@@ -19035,7 +20225,7 @@
             </a:ln>
             <a:extLst>
               <a:ext uri="{91240B29-F687-4f45-9708-019B960494DF}">
-                <a14:hiddenLine xmlns="" xmlns:a14="http://schemas.microsoft.com/office/drawing/2010/main" xmlns:p14="http://schemas.microsoft.com/office/powerpoint/2010/main" xmlns:a16="http://schemas.microsoft.com/office/drawing/2014/main" w="9525">
+                <a14:hiddenLine xmlns:a16="http://schemas.microsoft.com/office/drawing/2014/main" xmlns:p14="http://schemas.microsoft.com/office/powerpoint/2010/main" xmlns:a14="http://schemas.microsoft.com/office/drawing/2010/main" xmlns="" w="9525">
                   <a:solidFill>
                     <a:srgbClr val="000000"/>
                   </a:solidFill>
@@ -19295,7 +20485,7 @@
             </a:ln>
             <a:extLst>
               <a:ext uri="{91240B29-F687-4f45-9708-019B960494DF}">
-                <a14:hiddenLine xmlns="" xmlns:a14="http://schemas.microsoft.com/office/drawing/2010/main" xmlns:p14="http://schemas.microsoft.com/office/powerpoint/2010/main" xmlns:a16="http://schemas.microsoft.com/office/drawing/2014/main" w="9525">
+                <a14:hiddenLine xmlns:a16="http://schemas.microsoft.com/office/drawing/2014/main" xmlns:p14="http://schemas.microsoft.com/office/powerpoint/2010/main" xmlns:a14="http://schemas.microsoft.com/office/drawing/2010/main" xmlns="" w="9525">
                   <a:solidFill>
                     <a:srgbClr val="000000"/>
                   </a:solidFill>
@@ -19425,7 +20615,7 @@
             </a:ln>
             <a:extLst>
               <a:ext uri="{91240B29-F687-4f45-9708-019B960494DF}">
-                <a14:hiddenLine xmlns="" xmlns:a14="http://schemas.microsoft.com/office/drawing/2010/main" xmlns:p14="http://schemas.microsoft.com/office/powerpoint/2010/main" xmlns:a16="http://schemas.microsoft.com/office/drawing/2014/main" w="9525">
+                <a14:hiddenLine xmlns:a16="http://schemas.microsoft.com/office/drawing/2014/main" xmlns:p14="http://schemas.microsoft.com/office/powerpoint/2010/main" xmlns:a14="http://schemas.microsoft.com/office/drawing/2010/main" xmlns="" w="9525">
                   <a:solidFill>
                     <a:srgbClr val="000000"/>
                   </a:solidFill>
@@ -19530,7 +20720,7 @@
             </a:ln>
             <a:extLst>
               <a:ext uri="{91240B29-F687-4f45-9708-019B960494DF}">
-                <a14:hiddenLine xmlns="" xmlns:a14="http://schemas.microsoft.com/office/drawing/2010/main" xmlns:p14="http://schemas.microsoft.com/office/powerpoint/2010/main" xmlns:a16="http://schemas.microsoft.com/office/drawing/2014/main" w="9525">
+                <a14:hiddenLine xmlns:a16="http://schemas.microsoft.com/office/drawing/2014/main" xmlns:p14="http://schemas.microsoft.com/office/powerpoint/2010/main" xmlns:a14="http://schemas.microsoft.com/office/drawing/2010/main" xmlns="" w="9525">
                   <a:solidFill>
                     <a:srgbClr val="000000"/>
                   </a:solidFill>
@@ -19610,7 +20800,7 @@
             </a:ln>
             <a:extLst>
               <a:ext uri="{91240B29-F687-4f45-9708-019B960494DF}">
-                <a14:hiddenLine xmlns="" xmlns:a14="http://schemas.microsoft.com/office/drawing/2010/main" xmlns:p14="http://schemas.microsoft.com/office/powerpoint/2010/main" xmlns:a16="http://schemas.microsoft.com/office/drawing/2014/main" w="9525">
+                <a14:hiddenLine xmlns:a16="http://schemas.microsoft.com/office/drawing/2014/main" xmlns:p14="http://schemas.microsoft.com/office/powerpoint/2010/main" xmlns:a14="http://schemas.microsoft.com/office/drawing/2010/main" xmlns="" w="9525">
                   <a:solidFill>
                     <a:srgbClr val="000000"/>
                   </a:solidFill>
@@ -19715,7 +20905,7 @@
             </a:ln>
             <a:extLst>
               <a:ext uri="{91240B29-F687-4f45-9708-019B960494DF}">
-                <a14:hiddenLine xmlns="" xmlns:a14="http://schemas.microsoft.com/office/drawing/2010/main" xmlns:p14="http://schemas.microsoft.com/office/powerpoint/2010/main" xmlns:a16="http://schemas.microsoft.com/office/drawing/2014/main" w="9525">
+                <a14:hiddenLine xmlns:a16="http://schemas.microsoft.com/office/drawing/2014/main" xmlns:p14="http://schemas.microsoft.com/office/powerpoint/2010/main" xmlns:a14="http://schemas.microsoft.com/office/drawing/2010/main" xmlns="" w="9525">
                   <a:solidFill>
                     <a:srgbClr val="000000"/>
                   </a:solidFill>
@@ -19798,7 +20988,7 @@
             </a:ln>
             <a:extLst>
               <a:ext uri="{91240B29-F687-4f45-9708-019B960494DF}">
-                <a14:hiddenLine xmlns="" xmlns:a14="http://schemas.microsoft.com/office/drawing/2010/main" xmlns:p14="http://schemas.microsoft.com/office/powerpoint/2010/main" xmlns:a16="http://schemas.microsoft.com/office/drawing/2014/main" w="9525">
+                <a14:hiddenLine xmlns:a16="http://schemas.microsoft.com/office/drawing/2014/main" xmlns:p14="http://schemas.microsoft.com/office/powerpoint/2010/main" xmlns:a14="http://schemas.microsoft.com/office/drawing/2010/main" xmlns="" w="9525">
                   <a:solidFill>
                     <a:srgbClr val="000000"/>
                   </a:solidFill>
@@ -19903,7 +21093,7 @@
             </a:ln>
             <a:extLst>
               <a:ext uri="{91240B29-F687-4f45-9708-019B960494DF}">
-                <a14:hiddenLine xmlns="" xmlns:a14="http://schemas.microsoft.com/office/drawing/2010/main" xmlns:p14="http://schemas.microsoft.com/office/powerpoint/2010/main" xmlns:a16="http://schemas.microsoft.com/office/drawing/2014/main" w="9525">
+                <a14:hiddenLine xmlns:a16="http://schemas.microsoft.com/office/drawing/2014/main" xmlns:p14="http://schemas.microsoft.com/office/powerpoint/2010/main" xmlns:a14="http://schemas.microsoft.com/office/drawing/2010/main" xmlns="" w="9525">
                   <a:solidFill>
                     <a:srgbClr val="000000"/>
                   </a:solidFill>
@@ -19986,7 +21176,7 @@
             </a:ln>
             <a:extLst>
               <a:ext uri="{91240B29-F687-4f45-9708-019B960494DF}">
-                <a14:hiddenLine xmlns="" xmlns:a14="http://schemas.microsoft.com/office/drawing/2010/main" xmlns:p14="http://schemas.microsoft.com/office/powerpoint/2010/main" xmlns:a16="http://schemas.microsoft.com/office/drawing/2014/main" w="9525">
+                <a14:hiddenLine xmlns:a16="http://schemas.microsoft.com/office/drawing/2014/main" xmlns:p14="http://schemas.microsoft.com/office/powerpoint/2010/main" xmlns:a14="http://schemas.microsoft.com/office/drawing/2010/main" xmlns="" w="9525">
                   <a:solidFill>
                     <a:srgbClr val="000000"/>
                   </a:solidFill>
@@ -20091,7 +21281,7 @@
             </a:ln>
             <a:extLst>
               <a:ext uri="{91240B29-F687-4f45-9708-019B960494DF}">
-                <a14:hiddenLine xmlns="" xmlns:a14="http://schemas.microsoft.com/office/drawing/2010/main" xmlns:p14="http://schemas.microsoft.com/office/powerpoint/2010/main" xmlns:a16="http://schemas.microsoft.com/office/drawing/2014/main" w="9525">
+                <a14:hiddenLine xmlns:a16="http://schemas.microsoft.com/office/drawing/2014/main" xmlns:p14="http://schemas.microsoft.com/office/powerpoint/2010/main" xmlns:a14="http://schemas.microsoft.com/office/drawing/2010/main" xmlns="" w="9525">
                   <a:solidFill>
                     <a:srgbClr val="000000"/>
                   </a:solidFill>
@@ -20140,7 +21330,7 @@
             </a:ln>
             <a:extLst>
               <a:ext uri="{91240B29-F687-4f45-9708-019B960494DF}">
-                <a14:hiddenLine xmlns="" xmlns:a14="http://schemas.microsoft.com/office/drawing/2010/main" xmlns:p14="http://schemas.microsoft.com/office/powerpoint/2010/main" xmlns:a16="http://schemas.microsoft.com/office/drawing/2014/main" w="9525">
+                <a14:hiddenLine xmlns:a16="http://schemas.microsoft.com/office/drawing/2014/main" xmlns:p14="http://schemas.microsoft.com/office/powerpoint/2010/main" xmlns:a14="http://schemas.microsoft.com/office/drawing/2010/main" xmlns="" w="9525">
                   <a:solidFill>
                     <a:srgbClr val="000000"/>
                   </a:solidFill>

</xml_diff>

<commit_message>
Updated the slide show and Rmd file
Added correlation slide and highlighted KY and DC dots in the scatterplot
</commit_message>
<xml_diff>
--- a/CaseStudy1 Presentation.pptx
+++ b/CaseStudy1 Presentation.pptx
@@ -5,7 +5,7 @@
     <p:sldMasterId id="2147483648" r:id="rId1"/>
   </p:sldMasterIdLst>
   <p:notesMasterIdLst>
-    <p:notesMasterId r:id="rId12"/>
+    <p:notesMasterId r:id="rId13"/>
   </p:notesMasterIdLst>
   <p:sldIdLst>
     <p:sldId id="256" r:id="rId2"/>
@@ -17,7 +17,8 @@
     <p:sldId id="263" r:id="rId8"/>
     <p:sldId id="264" r:id="rId9"/>
     <p:sldId id="265" r:id="rId10"/>
-    <p:sldId id="266" r:id="rId11"/>
+    <p:sldId id="267" r:id="rId11"/>
+    <p:sldId id="266" r:id="rId12"/>
   </p:sldIdLst>
   <p:sldSz cx="12192000" cy="6858000"/>
   <p:notesSz cx="6858000" cy="9144000"/>
@@ -134,6 +135,7 @@
             <p14:sldId id="263"/>
             <p14:sldId id="264"/>
             <p14:sldId id="265"/>
+            <p14:sldId id="267"/>
             <p14:sldId id="266"/>
           </p14:sldIdLst>
         </p14:section>
@@ -239,7 +241,7 @@
           <a:p>
             <a:fld id="{1AF07D79-51EF-944D-A48B-9F68CC0182BF}" type="datetimeFigureOut">
               <a:rPr lang="en-US" smtClean="0"/>
-              <a:t>2/28/2019</a:t>
+              <a:t>2/28/19</a:t>
             </a:fld>
             <a:endParaRPr lang="en-US"/>
           </a:p>
@@ -992,7 +994,7 @@
           <a:p>
             <a:r>
               <a:rPr lang="en-US" dirty="0"/>
-              <a:t>The scatterplot shows a trend that increasing ABV in beer also increases the bitter taste.</a:t>
+              <a:t>The scatterplot shows a trend that increasing ABV in beer also increases the bitter taste.  The red dots indicate beers from KY and DC</a:t>
             </a:r>
           </a:p>
         </p:txBody>
@@ -1024,6 +1026,101 @@
     <p:extLst>
       <p:ext uri="{BB962C8B-B14F-4D97-AF65-F5344CB8AC3E}">
         <p14:creationId xmlns:p14="http://schemas.microsoft.com/office/powerpoint/2010/main" val="572250126"/>
+      </p:ext>
+    </p:extLst>
+  </p:cSld>
+  <p:clrMapOvr>
+    <a:masterClrMapping/>
+  </p:clrMapOvr>
+</p:notes>
+</file>
+
+<file path=ppt/notesSlides/notesSlide7.xml><?xml version="1.0" encoding="utf-8"?>
+<p:notes xmlns:a="http://schemas.openxmlformats.org/drawingml/2006/main" xmlns:r="http://schemas.openxmlformats.org/officeDocument/2006/relationships" xmlns:p="http://schemas.openxmlformats.org/presentationml/2006/main">
+  <p:cSld>
+    <p:spTree>
+      <p:nvGrpSpPr>
+        <p:cNvPr id="1" name=""/>
+        <p:cNvGrpSpPr/>
+        <p:nvPr/>
+      </p:nvGrpSpPr>
+      <p:grpSpPr>
+        <a:xfrm>
+          <a:off x="0" y="0"/>
+          <a:ext cx="0" cy="0"/>
+          <a:chOff x="0" y="0"/>
+          <a:chExt cx="0" cy="0"/>
+        </a:xfrm>
+      </p:grpSpPr>
+      <p:sp>
+        <p:nvSpPr>
+          <p:cNvPr id="2" name="Slide Image Placeholder 1"/>
+          <p:cNvSpPr>
+            <a:spLocks noGrp="1" noRot="1" noChangeAspect="1"/>
+          </p:cNvSpPr>
+          <p:nvPr>
+            <p:ph type="sldImg"/>
+          </p:nvPr>
+        </p:nvSpPr>
+        <p:spPr/>
+      </p:sp>
+      <p:sp>
+        <p:nvSpPr>
+          <p:cNvPr id="3" name="Notes Placeholder 2"/>
+          <p:cNvSpPr>
+            <a:spLocks noGrp="1"/>
+          </p:cNvSpPr>
+          <p:nvPr>
+            <p:ph type="body" idx="1"/>
+          </p:nvPr>
+        </p:nvSpPr>
+        <p:spPr/>
+        <p:txBody>
+          <a:bodyPr/>
+          <a:lstStyle/>
+          <a:p>
+            <a:r>
+              <a:rPr lang="en-US" dirty="0"/>
+              <a:t>At an alpha 	level of 0.05  level of significance, there </a:t>
+            </a:r>
+            <a:r>
+              <a:rPr lang="en-US"/>
+              <a:t>is significant </a:t>
+            </a:r>
+            <a:r>
+              <a:rPr lang="en-US" dirty="0"/>
+              <a:t>evidence to suggest that the data are linearly correlated (p &lt; 0.001)</a:t>
+            </a:r>
+          </a:p>
+        </p:txBody>
+      </p:sp>
+      <p:sp>
+        <p:nvSpPr>
+          <p:cNvPr id="4" name="Slide Number Placeholder 3"/>
+          <p:cNvSpPr>
+            <a:spLocks noGrp="1"/>
+          </p:cNvSpPr>
+          <p:nvPr>
+            <p:ph type="sldNum" sz="quarter" idx="5"/>
+          </p:nvPr>
+        </p:nvSpPr>
+        <p:spPr/>
+        <p:txBody>
+          <a:bodyPr/>
+          <a:lstStyle/>
+          <a:p>
+            <a:fld id="{5E6EE6E0-C363-BB43-AA93-5D9B78864B04}" type="slidenum">
+              <a:rPr lang="en-US" smtClean="0"/>
+              <a:t>10</a:t>
+            </a:fld>
+            <a:endParaRPr lang="en-US"/>
+          </a:p>
+        </p:txBody>
+      </p:sp>
+    </p:spTree>
+    <p:extLst>
+      <p:ext uri="{BB962C8B-B14F-4D97-AF65-F5344CB8AC3E}">
+        <p14:creationId xmlns:p14="http://schemas.microsoft.com/office/powerpoint/2010/main" val="1796928982"/>
       </p:ext>
     </p:extLst>
   </p:cSld>
@@ -1090,7 +1187,7 @@
           <a:noFill/>
           <a:extLst>
             <a:ext uri="{909E8E84-426E-40dd-AFC4-6F175D3DCCD1}">
-              <a14:hiddenFill xmlns:a14="http://schemas.microsoft.com/office/drawing/2010/main" xmlns="">
+              <a14:hiddenFill xmlns="" xmlns:a14="http://schemas.microsoft.com/office/drawing/2010/main">
                 <a:solidFill>
                   <a:srgbClr val="FFFFFF"/>
                 </a:solidFill>
@@ -1149,7 +1246,7 @@
             </a:ln>
             <a:extLst>
               <a:ext uri="{91240B29-F687-4f45-9708-019B960494DF}">
-                <a14:hiddenLine xmlns:a14="http://schemas.microsoft.com/office/drawing/2010/main" xmlns="" w="9525">
+                <a14:hiddenLine xmlns="" xmlns:a14="http://schemas.microsoft.com/office/drawing/2010/main" w="9525">
                   <a:solidFill>
                     <a:srgbClr val="000000"/>
                   </a:solidFill>
@@ -1239,7 +1336,7 @@
             </a:ln>
             <a:extLst>
               <a:ext uri="{91240B29-F687-4f45-9708-019B960494DF}">
-                <a14:hiddenLine xmlns:a14="http://schemas.microsoft.com/office/drawing/2010/main" xmlns="" w="9525">
+                <a14:hiddenLine xmlns="" xmlns:a14="http://schemas.microsoft.com/office/drawing/2010/main" w="9525">
                   <a:solidFill>
                     <a:srgbClr val="000000"/>
                   </a:solidFill>
@@ -1329,7 +1426,7 @@
             </a:ln>
             <a:extLst>
               <a:ext uri="{91240B29-F687-4f45-9708-019B960494DF}">
-                <a14:hiddenLine xmlns:a14="http://schemas.microsoft.com/office/drawing/2010/main" xmlns="" w="9525">
+                <a14:hiddenLine xmlns="" xmlns:a14="http://schemas.microsoft.com/office/drawing/2010/main" w="9525">
                   <a:solidFill>
                     <a:srgbClr val="000000"/>
                   </a:solidFill>
@@ -1363,7 +1460,7 @@
             </a:ln>
             <a:extLst>
               <a:ext uri="{91240B29-F687-4f45-9708-019B960494DF}">
-                <a14:hiddenLine xmlns:a14="http://schemas.microsoft.com/office/drawing/2010/main" xmlns="" w="9525">
+                <a14:hiddenLine xmlns="" xmlns:a14="http://schemas.microsoft.com/office/drawing/2010/main" w="9525">
                   <a:solidFill>
                     <a:srgbClr val="000000"/>
                   </a:solidFill>
@@ -1453,7 +1550,7 @@
             </a:ln>
             <a:extLst>
               <a:ext uri="{91240B29-F687-4f45-9708-019B960494DF}">
-                <a14:hiddenLine xmlns:a14="http://schemas.microsoft.com/office/drawing/2010/main" xmlns="" w="9525">
+                <a14:hiddenLine xmlns="" xmlns:a14="http://schemas.microsoft.com/office/drawing/2010/main" w="9525">
                   <a:solidFill>
                     <a:srgbClr val="000000"/>
                   </a:solidFill>
@@ -1515,7 +1612,7 @@
             </a:ln>
             <a:extLst>
               <a:ext uri="{91240B29-F687-4f45-9708-019B960494DF}">
-                <a14:hiddenLine xmlns:a14="http://schemas.microsoft.com/office/drawing/2010/main" xmlns="" w="9525">
+                <a14:hiddenLine xmlns="" xmlns:a14="http://schemas.microsoft.com/office/drawing/2010/main" w="9525">
                   <a:solidFill>
                     <a:srgbClr val="000000"/>
                   </a:solidFill>
@@ -1577,7 +1674,7 @@
             </a:ln>
             <a:extLst>
               <a:ext uri="{91240B29-F687-4f45-9708-019B960494DF}">
-                <a14:hiddenLine xmlns:a14="http://schemas.microsoft.com/office/drawing/2010/main" xmlns="" w="9525">
+                <a14:hiddenLine xmlns="" xmlns:a14="http://schemas.microsoft.com/office/drawing/2010/main" w="9525">
                   <a:solidFill>
                     <a:srgbClr val="000000"/>
                   </a:solidFill>
@@ -1667,7 +1764,7 @@
             </a:ln>
             <a:extLst>
               <a:ext uri="{91240B29-F687-4f45-9708-019B960494DF}">
-                <a14:hiddenLine xmlns:a14="http://schemas.microsoft.com/office/drawing/2010/main" xmlns="" w="9525">
+                <a14:hiddenLine xmlns="" xmlns:a14="http://schemas.microsoft.com/office/drawing/2010/main" w="9525">
                   <a:solidFill>
                     <a:srgbClr val="000000"/>
                   </a:solidFill>
@@ -1729,7 +1826,7 @@
             </a:ln>
             <a:extLst>
               <a:ext uri="{91240B29-F687-4f45-9708-019B960494DF}">
-                <a14:hiddenLine xmlns:a14="http://schemas.microsoft.com/office/drawing/2010/main" xmlns="" w="9525">
+                <a14:hiddenLine xmlns="" xmlns:a14="http://schemas.microsoft.com/office/drawing/2010/main" w="9525">
                   <a:solidFill>
                     <a:srgbClr val="000000"/>
                   </a:solidFill>
@@ -1791,7 +1888,7 @@
             </a:ln>
             <a:extLst>
               <a:ext uri="{91240B29-F687-4f45-9708-019B960494DF}">
-                <a14:hiddenLine xmlns:a14="http://schemas.microsoft.com/office/drawing/2010/main" xmlns="" w="9525">
+                <a14:hiddenLine xmlns="" xmlns:a14="http://schemas.microsoft.com/office/drawing/2010/main" w="9525">
                   <a:solidFill>
                     <a:srgbClr val="000000"/>
                   </a:solidFill>
@@ -1881,7 +1978,7 @@
             </a:ln>
             <a:extLst>
               <a:ext uri="{91240B29-F687-4f45-9708-019B960494DF}">
-                <a14:hiddenLine xmlns:a14="http://schemas.microsoft.com/office/drawing/2010/main" xmlns="" w="9525">
+                <a14:hiddenLine xmlns="" xmlns:a14="http://schemas.microsoft.com/office/drawing/2010/main" w="9525">
                   <a:solidFill>
                     <a:srgbClr val="000000"/>
                   </a:solidFill>
@@ -1971,7 +2068,7 @@
             </a:ln>
             <a:extLst>
               <a:ext uri="{91240B29-F687-4f45-9708-019B960494DF}">
-                <a14:hiddenLine xmlns:a14="http://schemas.microsoft.com/office/drawing/2010/main" xmlns="" w="9525">
+                <a14:hiddenLine xmlns="" xmlns:a14="http://schemas.microsoft.com/office/drawing/2010/main" w="9525">
                   <a:solidFill>
                     <a:srgbClr val="000000"/>
                   </a:solidFill>
@@ -2033,7 +2130,7 @@
             </a:ln>
             <a:extLst>
               <a:ext uri="{91240B29-F687-4f45-9708-019B960494DF}">
-                <a14:hiddenLine xmlns:a14="http://schemas.microsoft.com/office/drawing/2010/main" xmlns="" w="9525">
+                <a14:hiddenLine xmlns="" xmlns:a14="http://schemas.microsoft.com/office/drawing/2010/main" w="9525">
                   <a:solidFill>
                     <a:srgbClr val="000000"/>
                   </a:solidFill>
@@ -2143,7 +2240,7 @@
             </a:ln>
             <a:extLst>
               <a:ext uri="{91240B29-F687-4f45-9708-019B960494DF}">
-                <a14:hiddenLine xmlns:a14="http://schemas.microsoft.com/office/drawing/2010/main" xmlns="" w="9525">
+                <a14:hiddenLine xmlns="" xmlns:a14="http://schemas.microsoft.com/office/drawing/2010/main" w="9525">
                   <a:solidFill>
                     <a:srgbClr val="000000"/>
                   </a:solidFill>
@@ -2205,7 +2302,7 @@
             </a:ln>
             <a:extLst>
               <a:ext uri="{91240B29-F687-4f45-9708-019B960494DF}">
-                <a14:hiddenLine xmlns:a14="http://schemas.microsoft.com/office/drawing/2010/main" xmlns="" w="9525">
+                <a14:hiddenLine xmlns="" xmlns:a14="http://schemas.microsoft.com/office/drawing/2010/main" w="9525">
                   <a:solidFill>
                     <a:srgbClr val="000000"/>
                   </a:solidFill>
@@ -2295,7 +2392,7 @@
             </a:ln>
             <a:extLst>
               <a:ext uri="{91240B29-F687-4f45-9708-019B960494DF}">
-                <a14:hiddenLine xmlns:a14="http://schemas.microsoft.com/office/drawing/2010/main" xmlns="" w="9525">
+                <a14:hiddenLine xmlns="" xmlns:a14="http://schemas.microsoft.com/office/drawing/2010/main" w="9525">
                   <a:solidFill>
                     <a:srgbClr val="000000"/>
                   </a:solidFill>
@@ -2385,7 +2482,7 @@
             </a:ln>
             <a:extLst>
               <a:ext uri="{91240B29-F687-4f45-9708-019B960494DF}">
-                <a14:hiddenLine xmlns:a14="http://schemas.microsoft.com/office/drawing/2010/main" xmlns="" w="9525">
+                <a14:hiddenLine xmlns="" xmlns:a14="http://schemas.microsoft.com/office/drawing/2010/main" w="9525">
                   <a:solidFill>
                     <a:srgbClr val="000000"/>
                   </a:solidFill>
@@ -2447,7 +2544,7 @@
             </a:ln>
             <a:extLst>
               <a:ext uri="{91240B29-F687-4f45-9708-019B960494DF}">
-                <a14:hiddenLine xmlns:a14="http://schemas.microsoft.com/office/drawing/2010/main" xmlns="" w="9525">
+                <a14:hiddenLine xmlns="" xmlns:a14="http://schemas.microsoft.com/office/drawing/2010/main" w="9525">
                   <a:solidFill>
                     <a:srgbClr val="000000"/>
                   </a:solidFill>
@@ -2537,7 +2634,7 @@
             </a:ln>
             <a:extLst>
               <a:ext uri="{91240B29-F687-4f45-9708-019B960494DF}">
-                <a14:hiddenLine xmlns:a14="http://schemas.microsoft.com/office/drawing/2010/main" xmlns="" w="9525">
+                <a14:hiddenLine xmlns="" xmlns:a14="http://schemas.microsoft.com/office/drawing/2010/main" w="9525">
                   <a:solidFill>
                     <a:srgbClr val="000000"/>
                   </a:solidFill>
@@ -2627,7 +2724,7 @@
             </a:ln>
             <a:extLst>
               <a:ext uri="{91240B29-F687-4f45-9708-019B960494DF}">
-                <a14:hiddenLine xmlns:a14="http://schemas.microsoft.com/office/drawing/2010/main" xmlns="" w="9525">
+                <a14:hiddenLine xmlns="" xmlns:a14="http://schemas.microsoft.com/office/drawing/2010/main" w="9525">
                   <a:solidFill>
                     <a:srgbClr val="000000"/>
                   </a:solidFill>
@@ -2683,7 +2780,7 @@
             </a:ln>
             <a:extLst>
               <a:ext uri="{91240B29-F687-4f45-9708-019B960494DF}">
-                <a14:hiddenLine xmlns:a14="http://schemas.microsoft.com/office/drawing/2010/main" xmlns="" w="9525">
+                <a14:hiddenLine xmlns="" xmlns:a14="http://schemas.microsoft.com/office/drawing/2010/main" w="9525">
                   <a:solidFill>
                     <a:srgbClr val="000000"/>
                   </a:solidFill>
@@ -2773,7 +2870,7 @@
             </a:ln>
             <a:extLst>
               <a:ext uri="{91240B29-F687-4f45-9708-019B960494DF}">
-                <a14:hiddenLine xmlns:a14="http://schemas.microsoft.com/office/drawing/2010/main" xmlns="" w="9525">
+                <a14:hiddenLine xmlns="" xmlns:a14="http://schemas.microsoft.com/office/drawing/2010/main" w="9525">
                   <a:solidFill>
                     <a:srgbClr val="000000"/>
                   </a:solidFill>
@@ -2829,7 +2926,7 @@
             </a:ln>
             <a:extLst>
               <a:ext uri="{91240B29-F687-4f45-9708-019B960494DF}">
-                <a14:hiddenLine xmlns:a14="http://schemas.microsoft.com/office/drawing/2010/main" xmlns="" w="9525">
+                <a14:hiddenLine xmlns="" xmlns:a14="http://schemas.microsoft.com/office/drawing/2010/main" w="9525">
                   <a:solidFill>
                     <a:srgbClr val="000000"/>
                   </a:solidFill>
@@ -2919,7 +3016,7 @@
             </a:ln>
             <a:extLst>
               <a:ext uri="{91240B29-F687-4f45-9708-019B960494DF}">
-                <a14:hiddenLine xmlns:a14="http://schemas.microsoft.com/office/drawing/2010/main" xmlns="" w="9525">
+                <a14:hiddenLine xmlns="" xmlns:a14="http://schemas.microsoft.com/office/drawing/2010/main" w="9525">
                   <a:solidFill>
                     <a:srgbClr val="000000"/>
                   </a:solidFill>
@@ -2987,7 +3084,7 @@
             </a:ln>
             <a:extLst>
               <a:ext uri="{91240B29-F687-4f45-9708-019B960494DF}">
-                <a14:hiddenLine xmlns:a14="http://schemas.microsoft.com/office/drawing/2010/main" xmlns="" w="9525">
+                <a14:hiddenLine xmlns="" xmlns:a14="http://schemas.microsoft.com/office/drawing/2010/main" w="9525">
                   <a:solidFill>
                     <a:srgbClr val="000000"/>
                   </a:solidFill>
@@ -3077,7 +3174,7 @@
             </a:ln>
             <a:extLst>
               <a:ext uri="{91240B29-F687-4f45-9708-019B960494DF}">
-                <a14:hiddenLine xmlns:a14="http://schemas.microsoft.com/office/drawing/2010/main" xmlns="" w="9525">
+                <a14:hiddenLine xmlns="" xmlns:a14="http://schemas.microsoft.com/office/drawing/2010/main" w="9525">
                   <a:solidFill>
                     <a:srgbClr val="000000"/>
                   </a:solidFill>
@@ -3145,7 +3242,7 @@
             </a:ln>
             <a:extLst>
               <a:ext uri="{91240B29-F687-4f45-9708-019B960494DF}">
-                <a14:hiddenLine xmlns:a14="http://schemas.microsoft.com/office/drawing/2010/main" xmlns="" w="9525">
+                <a14:hiddenLine xmlns="" xmlns:a14="http://schemas.microsoft.com/office/drawing/2010/main" w="9525">
                   <a:solidFill>
                     <a:srgbClr val="000000"/>
                   </a:solidFill>
@@ -3235,7 +3332,7 @@
             </a:ln>
             <a:extLst>
               <a:ext uri="{91240B29-F687-4f45-9708-019B960494DF}">
-                <a14:hiddenLine xmlns:a14="http://schemas.microsoft.com/office/drawing/2010/main" xmlns="" w="9525">
+                <a14:hiddenLine xmlns="" xmlns:a14="http://schemas.microsoft.com/office/drawing/2010/main" w="9525">
                   <a:solidFill>
                     <a:srgbClr val="000000"/>
                   </a:solidFill>
@@ -3269,7 +3366,7 @@
             </a:ln>
             <a:extLst>
               <a:ext uri="{91240B29-F687-4f45-9708-019B960494DF}">
-                <a14:hiddenLine xmlns:a14="http://schemas.microsoft.com/office/drawing/2010/main" xmlns="" w="9525">
+                <a14:hiddenLine xmlns="" xmlns:a14="http://schemas.microsoft.com/office/drawing/2010/main" w="9525">
                   <a:solidFill>
                     <a:srgbClr val="000000"/>
                   </a:solidFill>
@@ -3359,7 +3456,7 @@
             </a:ln>
             <a:extLst>
               <a:ext uri="{91240B29-F687-4f45-9708-019B960494DF}">
-                <a14:hiddenLine xmlns:a14="http://schemas.microsoft.com/office/drawing/2010/main" xmlns="" w="9525">
+                <a14:hiddenLine xmlns="" xmlns:a14="http://schemas.microsoft.com/office/drawing/2010/main" w="9525">
                   <a:solidFill>
                     <a:srgbClr val="000000"/>
                   </a:solidFill>
@@ -3421,7 +3518,7 @@
             </a:ln>
             <a:extLst>
               <a:ext uri="{91240B29-F687-4f45-9708-019B960494DF}">
-                <a14:hiddenLine xmlns:a14="http://schemas.microsoft.com/office/drawing/2010/main" xmlns="" w="9525">
+                <a14:hiddenLine xmlns="" xmlns:a14="http://schemas.microsoft.com/office/drawing/2010/main" w="9525">
                   <a:solidFill>
                     <a:srgbClr val="000000"/>
                   </a:solidFill>
@@ -3483,7 +3580,7 @@
             </a:ln>
             <a:extLst>
               <a:ext uri="{91240B29-F687-4f45-9708-019B960494DF}">
-                <a14:hiddenLine xmlns:a14="http://schemas.microsoft.com/office/drawing/2010/main" xmlns="" w="9525">
+                <a14:hiddenLine xmlns="" xmlns:a14="http://schemas.microsoft.com/office/drawing/2010/main" w="9525">
                   <a:solidFill>
                     <a:srgbClr val="000000"/>
                   </a:solidFill>
@@ -3573,7 +3670,7 @@
             </a:ln>
             <a:extLst>
               <a:ext uri="{91240B29-F687-4f45-9708-019B960494DF}">
-                <a14:hiddenLine xmlns:a14="http://schemas.microsoft.com/office/drawing/2010/main" xmlns="" w="9525">
+                <a14:hiddenLine xmlns="" xmlns:a14="http://schemas.microsoft.com/office/drawing/2010/main" w="9525">
                   <a:solidFill>
                     <a:srgbClr val="000000"/>
                   </a:solidFill>
@@ -3641,7 +3738,7 @@
             </a:ln>
             <a:extLst>
               <a:ext uri="{91240B29-F687-4f45-9708-019B960494DF}">
-                <a14:hiddenLine xmlns:a14="http://schemas.microsoft.com/office/drawing/2010/main" xmlns="" w="9525">
+                <a14:hiddenLine xmlns="" xmlns:a14="http://schemas.microsoft.com/office/drawing/2010/main" w="9525">
                   <a:solidFill>
                     <a:srgbClr val="000000"/>
                   </a:solidFill>
@@ -3703,7 +3800,7 @@
             </a:ln>
             <a:extLst>
               <a:ext uri="{91240B29-F687-4f45-9708-019B960494DF}">
-                <a14:hiddenLine xmlns:a14="http://schemas.microsoft.com/office/drawing/2010/main" xmlns="" w="9525">
+                <a14:hiddenLine xmlns="" xmlns:a14="http://schemas.microsoft.com/office/drawing/2010/main" w="9525">
                   <a:solidFill>
                     <a:srgbClr val="000000"/>
                   </a:solidFill>
@@ -3793,7 +3890,7 @@
             </a:ln>
             <a:extLst>
               <a:ext uri="{91240B29-F687-4f45-9708-019B960494DF}">
-                <a14:hiddenLine xmlns:a14="http://schemas.microsoft.com/office/drawing/2010/main" xmlns="" w="9525">
+                <a14:hiddenLine xmlns="" xmlns:a14="http://schemas.microsoft.com/office/drawing/2010/main" w="9525">
                   <a:solidFill>
                     <a:srgbClr val="000000"/>
                   </a:solidFill>
@@ -3855,7 +3952,7 @@
             </a:ln>
             <a:extLst>
               <a:ext uri="{91240B29-F687-4f45-9708-019B960494DF}">
-                <a14:hiddenLine xmlns:a14="http://schemas.microsoft.com/office/drawing/2010/main" xmlns="" w="9525">
+                <a14:hiddenLine xmlns="" xmlns:a14="http://schemas.microsoft.com/office/drawing/2010/main" w="9525">
                   <a:solidFill>
                     <a:srgbClr val="000000"/>
                   </a:solidFill>
@@ -3945,7 +4042,7 @@
             </a:ln>
             <a:extLst>
               <a:ext uri="{91240B29-F687-4f45-9708-019B960494DF}">
-                <a14:hiddenLine xmlns:a14="http://schemas.microsoft.com/office/drawing/2010/main" xmlns="" w="9525">
+                <a14:hiddenLine xmlns="" xmlns:a14="http://schemas.microsoft.com/office/drawing/2010/main" w="9525">
                   <a:solidFill>
                     <a:srgbClr val="000000"/>
                   </a:solidFill>
@@ -4007,7 +4104,7 @@
             </a:ln>
             <a:extLst>
               <a:ext uri="{91240B29-F687-4f45-9708-019B960494DF}">
-                <a14:hiddenLine xmlns:a14="http://schemas.microsoft.com/office/drawing/2010/main" xmlns="" w="9525">
+                <a14:hiddenLine xmlns="" xmlns:a14="http://schemas.microsoft.com/office/drawing/2010/main" w="9525">
                   <a:solidFill>
                     <a:srgbClr val="000000"/>
                   </a:solidFill>
@@ -4097,7 +4194,7 @@
             </a:ln>
             <a:extLst>
               <a:ext uri="{91240B29-F687-4f45-9708-019B960494DF}">
-                <a14:hiddenLine xmlns:a14="http://schemas.microsoft.com/office/drawing/2010/main" xmlns="" w="9525">
+                <a14:hiddenLine xmlns="" xmlns:a14="http://schemas.microsoft.com/office/drawing/2010/main" w="9525">
                   <a:solidFill>
                     <a:srgbClr val="000000"/>
                   </a:solidFill>
@@ -4131,7 +4228,7 @@
             </a:ln>
             <a:extLst>
               <a:ext uri="{91240B29-F687-4f45-9708-019B960494DF}">
-                <a14:hiddenLine xmlns:a14="http://schemas.microsoft.com/office/drawing/2010/main" xmlns="" w="9525">
+                <a14:hiddenLine xmlns="" xmlns:a14="http://schemas.microsoft.com/office/drawing/2010/main" w="9525">
                   <a:solidFill>
                     <a:srgbClr val="000000"/>
                   </a:solidFill>
@@ -4196,7 +4293,7 @@
             </a:ln>
             <a:extLst>
               <a:ext uri="{91240B29-F687-4f45-9708-019B960494DF}">
-                <a14:hiddenLine xmlns:a14="http://schemas.microsoft.com/office/drawing/2010/main" xmlns="" w="9525">
+                <a14:hiddenLine xmlns="" xmlns:a14="http://schemas.microsoft.com/office/drawing/2010/main" w="9525">
                   <a:solidFill>
                     <a:srgbClr val="000000"/>
                   </a:solidFill>
@@ -4286,7 +4383,7 @@
             </a:ln>
             <a:extLst>
               <a:ext uri="{91240B29-F687-4f45-9708-019B960494DF}">
-                <a14:hiddenLine xmlns:a14="http://schemas.microsoft.com/office/drawing/2010/main" xmlns="" w="9525">
+                <a14:hiddenLine xmlns="" xmlns:a14="http://schemas.microsoft.com/office/drawing/2010/main" w="9525">
                   <a:solidFill>
                     <a:srgbClr val="000000"/>
                   </a:solidFill>
@@ -4348,7 +4445,7 @@
             </a:ln>
             <a:extLst>
               <a:ext uri="{91240B29-F687-4f45-9708-019B960494DF}">
-                <a14:hiddenLine xmlns:a14="http://schemas.microsoft.com/office/drawing/2010/main" xmlns="" w="9525">
+                <a14:hiddenLine xmlns="" xmlns:a14="http://schemas.microsoft.com/office/drawing/2010/main" w="9525">
                   <a:solidFill>
                     <a:srgbClr val="000000"/>
                   </a:solidFill>
@@ -4438,7 +4535,7 @@
             </a:ln>
             <a:extLst>
               <a:ext uri="{91240B29-F687-4f45-9708-019B960494DF}">
-                <a14:hiddenLine xmlns:a14="http://schemas.microsoft.com/office/drawing/2010/main" xmlns="" w="9525">
+                <a14:hiddenLine xmlns="" xmlns:a14="http://schemas.microsoft.com/office/drawing/2010/main" w="9525">
                   <a:solidFill>
                     <a:srgbClr val="000000"/>
                   </a:solidFill>
@@ -4528,7 +4625,7 @@
             </a:ln>
             <a:extLst>
               <a:ext uri="{91240B29-F687-4f45-9708-019B960494DF}">
-                <a14:hiddenLine xmlns:a14="http://schemas.microsoft.com/office/drawing/2010/main" xmlns="" w="9525">
+                <a14:hiddenLine xmlns="" xmlns:a14="http://schemas.microsoft.com/office/drawing/2010/main" w="9525">
                   <a:solidFill>
                     <a:srgbClr val="000000"/>
                   </a:solidFill>
@@ -4593,7 +4690,7 @@
             </a:ln>
             <a:extLst>
               <a:ext uri="{91240B29-F687-4f45-9708-019B960494DF}">
-                <a14:hiddenLine xmlns:a14="http://schemas.microsoft.com/office/drawing/2010/main" xmlns="" w="9525">
+                <a14:hiddenLine xmlns="" xmlns:a14="http://schemas.microsoft.com/office/drawing/2010/main" w="9525">
                   <a:solidFill>
                     <a:srgbClr val="000000"/>
                   </a:solidFill>
@@ -4655,7 +4752,7 @@
             </a:ln>
             <a:extLst>
               <a:ext uri="{91240B29-F687-4f45-9708-019B960494DF}">
-                <a14:hiddenLine xmlns:a14="http://schemas.microsoft.com/office/drawing/2010/main" xmlns="" w="9525">
+                <a14:hiddenLine xmlns="" xmlns:a14="http://schemas.microsoft.com/office/drawing/2010/main" w="9525">
                   <a:solidFill>
                     <a:srgbClr val="000000"/>
                   </a:solidFill>
@@ -4745,7 +4842,7 @@
             </a:ln>
             <a:extLst>
               <a:ext uri="{91240B29-F687-4f45-9708-019B960494DF}">
-                <a14:hiddenLine xmlns:a14="http://schemas.microsoft.com/office/drawing/2010/main" xmlns="" w="9525">
+                <a14:hiddenLine xmlns="" xmlns:a14="http://schemas.microsoft.com/office/drawing/2010/main" w="9525">
                   <a:solidFill>
                     <a:srgbClr val="000000"/>
                   </a:solidFill>
@@ -4835,7 +4932,7 @@
             </a:ln>
             <a:extLst>
               <a:ext uri="{91240B29-F687-4f45-9708-019B960494DF}">
-                <a14:hiddenLine xmlns:a14="http://schemas.microsoft.com/office/drawing/2010/main" xmlns="" w="9525">
+                <a14:hiddenLine xmlns="" xmlns:a14="http://schemas.microsoft.com/office/drawing/2010/main" w="9525">
                   <a:solidFill>
                     <a:srgbClr val="000000"/>
                   </a:solidFill>
@@ -4897,7 +4994,7 @@
             </a:ln>
             <a:extLst>
               <a:ext uri="{91240B29-F687-4f45-9708-019B960494DF}">
-                <a14:hiddenLine xmlns:a14="http://schemas.microsoft.com/office/drawing/2010/main" xmlns="" w="9525">
+                <a14:hiddenLine xmlns="" xmlns:a14="http://schemas.microsoft.com/office/drawing/2010/main" w="9525">
                   <a:solidFill>
                     <a:srgbClr val="000000"/>
                   </a:solidFill>
@@ -5017,7 +5114,7 @@
             </a:ln>
             <a:extLst>
               <a:ext uri="{91240B29-F687-4f45-9708-019B960494DF}">
-                <a14:hiddenLine xmlns:a14="http://schemas.microsoft.com/office/drawing/2010/main" xmlns="" w="9525">
+                <a14:hiddenLine xmlns="" xmlns:a14="http://schemas.microsoft.com/office/drawing/2010/main" w="9525">
                   <a:solidFill>
                     <a:srgbClr val="000000"/>
                   </a:solidFill>
@@ -5085,7 +5182,7 @@
             </a:ln>
             <a:extLst>
               <a:ext uri="{91240B29-F687-4f45-9708-019B960494DF}">
-                <a14:hiddenLine xmlns:a14="http://schemas.microsoft.com/office/drawing/2010/main" xmlns="" w="9525">
+                <a14:hiddenLine xmlns="" xmlns:a14="http://schemas.microsoft.com/office/drawing/2010/main" w="9525">
                   <a:solidFill>
                     <a:srgbClr val="000000"/>
                   </a:solidFill>
@@ -5175,7 +5272,7 @@
             </a:ln>
             <a:extLst>
               <a:ext uri="{91240B29-F687-4f45-9708-019B960494DF}">
-                <a14:hiddenLine xmlns:a14="http://schemas.microsoft.com/office/drawing/2010/main" xmlns="" w="9525">
+                <a14:hiddenLine xmlns="" xmlns:a14="http://schemas.microsoft.com/office/drawing/2010/main" w="9525">
                   <a:solidFill>
                     <a:srgbClr val="000000"/>
                   </a:solidFill>
@@ -5315,7 +5412,7 @@
           <a:p>
             <a:fld id="{48A87A34-81AB-432B-8DAE-1953F412C126}" type="datetimeFigureOut">
               <a:rPr lang="en-US" dirty="0"/>
-              <a:t>2/28/2019</a:t>
+              <a:t>2/28/19</a:t>
             </a:fld>
             <a:endParaRPr lang="en-US" dirty="0"/>
           </a:p>
@@ -5577,7 +5674,7 @@
           <a:p>
             <a:fld id="{48A87A34-81AB-432B-8DAE-1953F412C126}" type="datetimeFigureOut">
               <a:rPr lang="en-US" dirty="0"/>
-              <a:t>2/28/2019</a:t>
+              <a:t>2/28/19</a:t>
             </a:fld>
             <a:endParaRPr lang="en-US" dirty="0"/>
           </a:p>
@@ -5768,7 +5865,7 @@
           <a:p>
             <a:fld id="{48A87A34-81AB-432B-8DAE-1953F412C126}" type="datetimeFigureOut">
               <a:rPr lang="en-US" dirty="0"/>
-              <a:t>2/28/2019</a:t>
+              <a:t>2/28/19</a:t>
             </a:fld>
             <a:endParaRPr lang="en-US" dirty="0"/>
           </a:p>
@@ -6026,7 +6123,7 @@
           <a:p>
             <a:fld id="{48A87A34-81AB-432B-8DAE-1953F412C126}" type="datetimeFigureOut">
               <a:rPr lang="en-US" dirty="0"/>
-              <a:t>2/28/2019</a:t>
+              <a:t>2/28/19</a:t>
             </a:fld>
             <a:endParaRPr lang="en-US" dirty="0"/>
           </a:p>
@@ -6455,7 +6552,7 @@
           <a:p>
             <a:fld id="{48A87A34-81AB-432B-8DAE-1953F412C126}" type="datetimeFigureOut">
               <a:rPr lang="en-US" dirty="0"/>
-              <a:t>2/28/2019</a:t>
+              <a:t>2/28/19</a:t>
             </a:fld>
             <a:endParaRPr lang="en-US" dirty="0"/>
           </a:p>
@@ -6996,7 +7093,7 @@
           <a:p>
             <a:fld id="{48A87A34-81AB-432B-8DAE-1953F412C126}" type="datetimeFigureOut">
               <a:rPr lang="en-US" dirty="0"/>
-              <a:t>2/28/2019</a:t>
+              <a:t>2/28/19</a:t>
             </a:fld>
             <a:endParaRPr lang="en-US" dirty="0"/>
           </a:p>
@@ -7711,7 +7808,7 @@
           <a:p>
             <a:fld id="{48A87A34-81AB-432B-8DAE-1953F412C126}" type="datetimeFigureOut">
               <a:rPr lang="en-US" dirty="0"/>
-              <a:t>2/28/2019</a:t>
+              <a:t>2/28/19</a:t>
             </a:fld>
             <a:endParaRPr lang="en-US" dirty="0"/>
           </a:p>
@@ -7876,7 +7973,7 @@
           <a:p>
             <a:fld id="{48A87A34-81AB-432B-8DAE-1953F412C126}" type="datetimeFigureOut">
               <a:rPr lang="en-US" dirty="0"/>
-              <a:t>2/28/2019</a:t>
+              <a:t>2/28/19</a:t>
             </a:fld>
             <a:endParaRPr lang="en-US" dirty="0"/>
           </a:p>
@@ -8051,7 +8148,7 @@
           <a:p>
             <a:fld id="{48A87A34-81AB-432B-8DAE-1953F412C126}" type="datetimeFigureOut">
               <a:rPr lang="en-US" dirty="0"/>
-              <a:t>2/28/2019</a:t>
+              <a:t>2/28/19</a:t>
             </a:fld>
             <a:endParaRPr lang="en-US" dirty="0"/>
           </a:p>
@@ -8216,7 +8313,7 @@
           <a:p>
             <a:fld id="{48A87A34-81AB-432B-8DAE-1953F412C126}" type="datetimeFigureOut">
               <a:rPr lang="en-US" dirty="0"/>
-              <a:t>2/28/2019</a:t>
+              <a:t>2/28/19</a:t>
             </a:fld>
             <a:endParaRPr lang="en-US" dirty="0"/>
           </a:p>
@@ -8461,7 +8558,7 @@
           <a:p>
             <a:fld id="{48A87A34-81AB-432B-8DAE-1953F412C126}" type="datetimeFigureOut">
               <a:rPr lang="en-US" dirty="0"/>
-              <a:t>2/28/2019</a:t>
+              <a:t>2/28/19</a:t>
             </a:fld>
             <a:endParaRPr lang="en-US" dirty="0"/>
           </a:p>
@@ -8688,7 +8785,7 @@
           <a:p>
             <a:fld id="{48A87A34-81AB-432B-8DAE-1953F412C126}" type="datetimeFigureOut">
               <a:rPr lang="en-US" dirty="0"/>
-              <a:t>2/28/2019</a:t>
+              <a:t>2/28/19</a:t>
             </a:fld>
             <a:endParaRPr lang="en-US" dirty="0"/>
           </a:p>
@@ -9064,7 +9161,7 @@
           <a:p>
             <a:fld id="{48A87A34-81AB-432B-8DAE-1953F412C126}" type="datetimeFigureOut">
               <a:rPr lang="en-US" dirty="0"/>
-              <a:t>2/28/2019</a:t>
+              <a:t>2/28/19</a:t>
             </a:fld>
             <a:endParaRPr lang="en-US" dirty="0"/>
           </a:p>
@@ -9177,7 +9274,7 @@
           <a:p>
             <a:fld id="{48A87A34-81AB-432B-8DAE-1953F412C126}" type="datetimeFigureOut">
               <a:rPr lang="en-US" dirty="0"/>
-              <a:t>2/28/2019</a:t>
+              <a:t>2/28/19</a:t>
             </a:fld>
             <a:endParaRPr lang="en-US" dirty="0"/>
           </a:p>
@@ -9267,7 +9364,7 @@
           <a:p>
             <a:fld id="{48A87A34-81AB-432B-8DAE-1953F412C126}" type="datetimeFigureOut">
               <a:rPr lang="en-US" dirty="0"/>
-              <a:t>2/28/2019</a:t>
+              <a:t>2/28/19</a:t>
             </a:fld>
             <a:endParaRPr lang="en-US" dirty="0"/>
           </a:p>
@@ -9511,7 +9608,7 @@
           <a:p>
             <a:fld id="{48A87A34-81AB-432B-8DAE-1953F412C126}" type="datetimeFigureOut">
               <a:rPr lang="en-US" dirty="0"/>
-              <a:t>2/28/2019</a:t>
+              <a:t>2/28/19</a:t>
             </a:fld>
             <a:endParaRPr lang="en-US" dirty="0"/>
           </a:p>
@@ -9786,7 +9883,7 @@
           <a:p>
             <a:fld id="{48A87A34-81AB-432B-8DAE-1953F412C126}" type="datetimeFigureOut">
               <a:rPr lang="en-US" dirty="0"/>
-              <a:t>2/28/2019</a:t>
+              <a:t>2/28/19</a:t>
             </a:fld>
             <a:endParaRPr lang="en-US" dirty="0"/>
           </a:p>
@@ -9904,7 +10001,7 @@
           <a:noFill/>
           <a:extLst>
             <a:ext uri="{909E8E84-426E-40dd-AFC4-6F175D3DCCD1}">
-              <a14:hiddenFill xmlns:a14="http://schemas.microsoft.com/office/drawing/2010/main" xmlns="">
+              <a14:hiddenFill xmlns="" xmlns:a14="http://schemas.microsoft.com/office/drawing/2010/main">
                 <a:solidFill>
                   <a:srgbClr val="FFFFFF"/>
                 </a:solidFill>
@@ -9978,7 +10075,7 @@
               </a:ln>
               <a:extLst>
                 <a:ext uri="{91240B29-F687-4f45-9708-019B960494DF}">
-                  <a14:hiddenLine xmlns:a14="http://schemas.microsoft.com/office/drawing/2010/main" xmlns="" w="9525">
+                  <a14:hiddenLine xmlns="" xmlns:a14="http://schemas.microsoft.com/office/drawing/2010/main" w="9525">
                     <a:solidFill>
                       <a:srgbClr val="000000"/>
                     </a:solidFill>
@@ -10068,7 +10165,7 @@
               </a:ln>
               <a:extLst>
                 <a:ext uri="{91240B29-F687-4f45-9708-019B960494DF}">
-                  <a14:hiddenLine xmlns:a14="http://schemas.microsoft.com/office/drawing/2010/main" xmlns="" w="9525">
+                  <a14:hiddenLine xmlns="" xmlns:a14="http://schemas.microsoft.com/office/drawing/2010/main" w="9525">
                     <a:solidFill>
                       <a:srgbClr val="000000"/>
                     </a:solidFill>
@@ -10158,7 +10255,7 @@
               </a:ln>
               <a:extLst>
                 <a:ext uri="{91240B29-F687-4f45-9708-019B960494DF}">
-                  <a14:hiddenLine xmlns:a14="http://schemas.microsoft.com/office/drawing/2010/main" xmlns="" w="9525">
+                  <a14:hiddenLine xmlns="" xmlns:a14="http://schemas.microsoft.com/office/drawing/2010/main" w="9525">
                     <a:solidFill>
                       <a:srgbClr val="000000"/>
                     </a:solidFill>
@@ -10220,7 +10317,7 @@
               </a:ln>
               <a:extLst>
                 <a:ext uri="{91240B29-F687-4f45-9708-019B960494DF}">
-                  <a14:hiddenLine xmlns:a14="http://schemas.microsoft.com/office/drawing/2010/main" xmlns="" w="9525">
+                  <a14:hiddenLine xmlns="" xmlns:a14="http://schemas.microsoft.com/office/drawing/2010/main" w="9525">
                     <a:solidFill>
                       <a:srgbClr val="000000"/>
                     </a:solidFill>
@@ -10310,7 +10407,7 @@
               </a:ln>
               <a:extLst>
                 <a:ext uri="{91240B29-F687-4f45-9708-019B960494DF}">
-                  <a14:hiddenLine xmlns:a14="http://schemas.microsoft.com/office/drawing/2010/main" xmlns="" w="9525">
+                  <a14:hiddenLine xmlns="" xmlns:a14="http://schemas.microsoft.com/office/drawing/2010/main" w="9525">
                     <a:solidFill>
                       <a:srgbClr val="000000"/>
                     </a:solidFill>
@@ -10372,7 +10469,7 @@
               </a:ln>
               <a:extLst>
                 <a:ext uri="{91240B29-F687-4f45-9708-019B960494DF}">
-                  <a14:hiddenLine xmlns:a14="http://schemas.microsoft.com/office/drawing/2010/main" xmlns="" w="9525">
+                  <a14:hiddenLine xmlns="" xmlns:a14="http://schemas.microsoft.com/office/drawing/2010/main" w="9525">
                     <a:solidFill>
                       <a:srgbClr val="000000"/>
                     </a:solidFill>
@@ -10434,7 +10531,7 @@
               </a:ln>
               <a:extLst>
                 <a:ext uri="{91240B29-F687-4f45-9708-019B960494DF}">
-                  <a14:hiddenLine xmlns:a14="http://schemas.microsoft.com/office/drawing/2010/main" xmlns="" w="9525">
+                  <a14:hiddenLine xmlns="" xmlns:a14="http://schemas.microsoft.com/office/drawing/2010/main" w="9525">
                     <a:solidFill>
                       <a:srgbClr val="000000"/>
                     </a:solidFill>
@@ -10524,7 +10621,7 @@
               </a:ln>
               <a:extLst>
                 <a:ext uri="{91240B29-F687-4f45-9708-019B960494DF}">
-                  <a14:hiddenLine xmlns:a14="http://schemas.microsoft.com/office/drawing/2010/main" xmlns="" w="9525">
+                  <a14:hiddenLine xmlns="" xmlns:a14="http://schemas.microsoft.com/office/drawing/2010/main" w="9525">
                     <a:solidFill>
                       <a:srgbClr val="000000"/>
                     </a:solidFill>
@@ -10614,7 +10711,7 @@
               </a:ln>
               <a:extLst>
                 <a:ext uri="{91240B29-F687-4f45-9708-019B960494DF}">
-                  <a14:hiddenLine xmlns:a14="http://schemas.microsoft.com/office/drawing/2010/main" xmlns="" w="9525">
+                  <a14:hiddenLine xmlns="" xmlns:a14="http://schemas.microsoft.com/office/drawing/2010/main" w="9525">
                     <a:solidFill>
                       <a:srgbClr val="000000"/>
                     </a:solidFill>
@@ -10676,7 +10773,7 @@
               </a:ln>
               <a:extLst>
                 <a:ext uri="{91240B29-F687-4f45-9708-019B960494DF}">
-                  <a14:hiddenLine xmlns:a14="http://schemas.microsoft.com/office/drawing/2010/main" xmlns="" w="9525">
+                  <a14:hiddenLine xmlns="" xmlns:a14="http://schemas.microsoft.com/office/drawing/2010/main" w="9525">
                     <a:solidFill>
                       <a:srgbClr val="000000"/>
                     </a:solidFill>
@@ -10786,7 +10883,7 @@
               </a:ln>
               <a:extLst>
                 <a:ext uri="{91240B29-F687-4f45-9708-019B960494DF}">
-                  <a14:hiddenLine xmlns:a14="http://schemas.microsoft.com/office/drawing/2010/main" xmlns="" w="9525">
+                  <a14:hiddenLine xmlns="" xmlns:a14="http://schemas.microsoft.com/office/drawing/2010/main" w="9525">
                     <a:solidFill>
                       <a:srgbClr val="000000"/>
                     </a:solidFill>
@@ -10870,7 +10967,7 @@
               </a:ln>
               <a:extLst>
                 <a:ext uri="{91240B29-F687-4f45-9708-019B960494DF}">
-                  <a14:hiddenLine xmlns:a14="http://schemas.microsoft.com/office/drawing/2010/main" xmlns="" w="9525">
+                  <a14:hiddenLine xmlns="" xmlns:a14="http://schemas.microsoft.com/office/drawing/2010/main" w="9525">
                     <a:solidFill>
                       <a:srgbClr val="000000"/>
                     </a:solidFill>
@@ -10932,7 +11029,7 @@
               </a:ln>
               <a:extLst>
                 <a:ext uri="{91240B29-F687-4f45-9708-019B960494DF}">
-                  <a14:hiddenLine xmlns:a14="http://schemas.microsoft.com/office/drawing/2010/main" xmlns="" w="9525">
+                  <a14:hiddenLine xmlns="" xmlns:a14="http://schemas.microsoft.com/office/drawing/2010/main" w="9525">
                     <a:solidFill>
                       <a:srgbClr val="000000"/>
                     </a:solidFill>
@@ -10994,7 +11091,7 @@
               </a:ln>
               <a:extLst>
                 <a:ext uri="{91240B29-F687-4f45-9708-019B960494DF}">
-                  <a14:hiddenLine xmlns:a14="http://schemas.microsoft.com/office/drawing/2010/main" xmlns="" w="9525">
+                  <a14:hiddenLine xmlns="" xmlns:a14="http://schemas.microsoft.com/office/drawing/2010/main" w="9525">
                     <a:solidFill>
                       <a:srgbClr val="000000"/>
                     </a:solidFill>
@@ -11084,7 +11181,7 @@
               </a:ln>
               <a:extLst>
                 <a:ext uri="{91240B29-F687-4f45-9708-019B960494DF}">
-                  <a14:hiddenLine xmlns:a14="http://schemas.microsoft.com/office/drawing/2010/main" xmlns="" w="9525">
+                  <a14:hiddenLine xmlns="" xmlns:a14="http://schemas.microsoft.com/office/drawing/2010/main" w="9525">
                     <a:solidFill>
                       <a:srgbClr val="000000"/>
                     </a:solidFill>
@@ -11118,7 +11215,7 @@
               </a:ln>
               <a:extLst>
                 <a:ext uri="{91240B29-F687-4f45-9708-019B960494DF}">
-                  <a14:hiddenLine xmlns:a14="http://schemas.microsoft.com/office/drawing/2010/main" xmlns="" w="9525">
+                  <a14:hiddenLine xmlns="" xmlns:a14="http://schemas.microsoft.com/office/drawing/2010/main" w="9525">
                     <a:solidFill>
                       <a:srgbClr val="000000"/>
                     </a:solidFill>
@@ -11183,7 +11280,7 @@
               </a:ln>
               <a:extLst>
                 <a:ext uri="{91240B29-F687-4f45-9708-019B960494DF}">
-                  <a14:hiddenLine xmlns:a14="http://schemas.microsoft.com/office/drawing/2010/main" xmlns="" w="9525">
+                  <a14:hiddenLine xmlns="" xmlns:a14="http://schemas.microsoft.com/office/drawing/2010/main" w="9525">
                     <a:solidFill>
                       <a:srgbClr val="000000"/>
                     </a:solidFill>
@@ -11273,7 +11370,7 @@
               </a:ln>
               <a:extLst>
                 <a:ext uri="{91240B29-F687-4f45-9708-019B960494DF}">
-                  <a14:hiddenLine xmlns:a14="http://schemas.microsoft.com/office/drawing/2010/main" xmlns="" w="9525">
+                  <a14:hiddenLine xmlns="" xmlns:a14="http://schemas.microsoft.com/office/drawing/2010/main" w="9525">
                     <a:solidFill>
                       <a:srgbClr val="000000"/>
                     </a:solidFill>
@@ -11335,7 +11432,7 @@
               </a:ln>
               <a:extLst>
                 <a:ext uri="{91240B29-F687-4f45-9708-019B960494DF}">
-                  <a14:hiddenLine xmlns:a14="http://schemas.microsoft.com/office/drawing/2010/main" xmlns="" w="9525">
+                  <a14:hiddenLine xmlns="" xmlns:a14="http://schemas.microsoft.com/office/drawing/2010/main" w="9525">
                     <a:solidFill>
                       <a:srgbClr val="000000"/>
                     </a:solidFill>
@@ -11425,7 +11522,7 @@
               </a:ln>
               <a:extLst>
                 <a:ext uri="{91240B29-F687-4f45-9708-019B960494DF}">
-                  <a14:hiddenLine xmlns:a14="http://schemas.microsoft.com/office/drawing/2010/main" xmlns="" w="9525">
+                  <a14:hiddenLine xmlns="" xmlns:a14="http://schemas.microsoft.com/office/drawing/2010/main" w="9525">
                     <a:solidFill>
                       <a:srgbClr val="000000"/>
                     </a:solidFill>
@@ -11490,7 +11587,7 @@
               </a:ln>
               <a:extLst>
                 <a:ext uri="{91240B29-F687-4f45-9708-019B960494DF}">
-                  <a14:hiddenLine xmlns:a14="http://schemas.microsoft.com/office/drawing/2010/main" xmlns="" w="9525">
+                  <a14:hiddenLine xmlns="" xmlns:a14="http://schemas.microsoft.com/office/drawing/2010/main" w="9525">
                     <a:solidFill>
                       <a:srgbClr val="000000"/>
                     </a:solidFill>
@@ -11552,7 +11649,7 @@
               </a:ln>
               <a:extLst>
                 <a:ext uri="{91240B29-F687-4f45-9708-019B960494DF}">
-                  <a14:hiddenLine xmlns:a14="http://schemas.microsoft.com/office/drawing/2010/main" xmlns="" w="9525">
+                  <a14:hiddenLine xmlns="" xmlns:a14="http://schemas.microsoft.com/office/drawing/2010/main" w="9525">
                     <a:solidFill>
                       <a:srgbClr val="000000"/>
                     </a:solidFill>
@@ -11642,7 +11739,7 @@
               </a:ln>
               <a:extLst>
                 <a:ext uri="{91240B29-F687-4f45-9708-019B960494DF}">
-                  <a14:hiddenLine xmlns:a14="http://schemas.microsoft.com/office/drawing/2010/main" xmlns="" w="9525">
+                  <a14:hiddenLine xmlns="" xmlns:a14="http://schemas.microsoft.com/office/drawing/2010/main" w="9525">
                     <a:solidFill>
                       <a:srgbClr val="000000"/>
                     </a:solidFill>
@@ -11732,7 +11829,7 @@
               </a:ln>
               <a:extLst>
                 <a:ext uri="{91240B29-F687-4f45-9708-019B960494DF}">
-                  <a14:hiddenLine xmlns:a14="http://schemas.microsoft.com/office/drawing/2010/main" xmlns="" w="9525">
+                  <a14:hiddenLine xmlns="" xmlns:a14="http://schemas.microsoft.com/office/drawing/2010/main" w="9525">
                     <a:solidFill>
                       <a:srgbClr val="000000"/>
                     </a:solidFill>
@@ -11797,7 +11894,7 @@
               </a:ln>
               <a:extLst>
                 <a:ext uri="{91240B29-F687-4f45-9708-019B960494DF}">
-                  <a14:hiddenLine xmlns:a14="http://schemas.microsoft.com/office/drawing/2010/main" xmlns="" w="9525">
+                  <a14:hiddenLine xmlns="" xmlns:a14="http://schemas.microsoft.com/office/drawing/2010/main" w="9525">
                     <a:solidFill>
                       <a:srgbClr val="000000"/>
                     </a:solidFill>
@@ -11917,7 +12014,7 @@
               </a:ln>
               <a:extLst>
                 <a:ext uri="{91240B29-F687-4f45-9708-019B960494DF}">
-                  <a14:hiddenLine xmlns:a14="http://schemas.microsoft.com/office/drawing/2010/main" xmlns="" w="9525">
+                  <a14:hiddenLine xmlns="" xmlns:a14="http://schemas.microsoft.com/office/drawing/2010/main" w="9525">
                     <a:solidFill>
                       <a:srgbClr val="000000"/>
                     </a:solidFill>
@@ -11998,7 +12095,7 @@
               </a:ln>
               <a:extLst>
                 <a:ext uri="{91240B29-F687-4f45-9708-019B960494DF}">
-                  <a14:hiddenLine xmlns:a14="http://schemas.microsoft.com/office/drawing/2010/main" xmlns="" w="9525">
+                  <a14:hiddenLine xmlns="" xmlns:a14="http://schemas.microsoft.com/office/drawing/2010/main" w="9525">
                     <a:solidFill>
                       <a:srgbClr val="000000"/>
                     </a:solidFill>
@@ -12113,7 +12210,7 @@
               </a:ln>
               <a:extLst>
                 <a:ext uri="{91240B29-F687-4f45-9708-019B960494DF}">
-                  <a14:hiddenLine xmlns:a14="http://schemas.microsoft.com/office/drawing/2010/main" xmlns="" w="9525">
+                  <a14:hiddenLine xmlns="" xmlns:a14="http://schemas.microsoft.com/office/drawing/2010/main" w="9525">
                     <a:solidFill>
                       <a:srgbClr val="000000"/>
                     </a:solidFill>
@@ -12203,7 +12300,7 @@
               </a:ln>
               <a:extLst>
                 <a:ext uri="{91240B29-F687-4f45-9708-019B960494DF}">
-                  <a14:hiddenLine xmlns:a14="http://schemas.microsoft.com/office/drawing/2010/main" xmlns="" w="9525">
+                  <a14:hiddenLine xmlns="" xmlns:a14="http://schemas.microsoft.com/office/drawing/2010/main" w="9525">
                     <a:solidFill>
                       <a:srgbClr val="000000"/>
                     </a:solidFill>
@@ -12268,7 +12365,7 @@
               </a:ln>
               <a:extLst>
                 <a:ext uri="{91240B29-F687-4f45-9708-019B960494DF}">
-                  <a14:hiddenLine xmlns:a14="http://schemas.microsoft.com/office/drawing/2010/main" xmlns="" w="9525">
+                  <a14:hiddenLine xmlns="" xmlns:a14="http://schemas.microsoft.com/office/drawing/2010/main" w="9525">
                     <a:solidFill>
                       <a:srgbClr val="000000"/>
                     </a:solidFill>
@@ -12358,7 +12455,7 @@
               </a:ln>
               <a:extLst>
                 <a:ext uri="{91240B29-F687-4f45-9708-019B960494DF}">
-                  <a14:hiddenLine xmlns:a14="http://schemas.microsoft.com/office/drawing/2010/main" xmlns="" w="9525">
+                  <a14:hiddenLine xmlns="" xmlns:a14="http://schemas.microsoft.com/office/drawing/2010/main" w="9525">
                     <a:solidFill>
                       <a:srgbClr val="000000"/>
                     </a:solidFill>
@@ -12426,7 +12523,7 @@
               </a:ln>
               <a:extLst>
                 <a:ext uri="{91240B29-F687-4f45-9708-019B960494DF}">
-                  <a14:hiddenLine xmlns:a14="http://schemas.microsoft.com/office/drawing/2010/main" xmlns="" w="9525">
+                  <a14:hiddenLine xmlns="" xmlns:a14="http://schemas.microsoft.com/office/drawing/2010/main" w="9525">
                     <a:solidFill>
                       <a:srgbClr val="000000"/>
                     </a:solidFill>
@@ -12516,7 +12613,7 @@
               </a:ln>
               <a:extLst>
                 <a:ext uri="{91240B29-F687-4f45-9708-019B960494DF}">
-                  <a14:hiddenLine xmlns:a14="http://schemas.microsoft.com/office/drawing/2010/main" xmlns="" w="9525">
+                  <a14:hiddenLine xmlns="" xmlns:a14="http://schemas.microsoft.com/office/drawing/2010/main" w="9525">
                     <a:solidFill>
                       <a:srgbClr val="000000"/>
                     </a:solidFill>
@@ -12584,7 +12681,7 @@
               </a:ln>
               <a:extLst>
                 <a:ext uri="{91240B29-F687-4f45-9708-019B960494DF}">
-                  <a14:hiddenLine xmlns:a14="http://schemas.microsoft.com/office/drawing/2010/main" xmlns="" w="9525">
+                  <a14:hiddenLine xmlns="" xmlns:a14="http://schemas.microsoft.com/office/drawing/2010/main" w="9525">
                     <a:solidFill>
                       <a:srgbClr val="000000"/>
                     </a:solidFill>
@@ -12674,7 +12771,7 @@
               </a:ln>
               <a:extLst>
                 <a:ext uri="{91240B29-F687-4f45-9708-019B960494DF}">
-                  <a14:hiddenLine xmlns:a14="http://schemas.microsoft.com/office/drawing/2010/main" xmlns="" w="9525">
+                  <a14:hiddenLine xmlns="" xmlns:a14="http://schemas.microsoft.com/office/drawing/2010/main" w="9525">
                     <a:solidFill>
                       <a:srgbClr val="000000"/>
                     </a:solidFill>
@@ -12708,7 +12805,7 @@
               </a:ln>
               <a:extLst>
                 <a:ext uri="{91240B29-F687-4f45-9708-019B960494DF}">
-                  <a14:hiddenLine xmlns:a14="http://schemas.microsoft.com/office/drawing/2010/main" xmlns="" w="9525">
+                  <a14:hiddenLine xmlns="" xmlns:a14="http://schemas.microsoft.com/office/drawing/2010/main" w="9525">
                     <a:solidFill>
                       <a:srgbClr val="000000"/>
                     </a:solidFill>
@@ -12849,7 +12946,7 @@
             <a:fld id="{48A87A34-81AB-432B-8DAE-1953F412C126}" type="datetimeFigureOut">
               <a:rPr lang="en-US" dirty="0"/>
               <a:pPr/>
-              <a:t>2/28/2019</a:t>
+              <a:t>2/28/19</a:t>
             </a:fld>
             <a:endParaRPr lang="en-US" dirty="0"/>
           </a:p>
@@ -13360,6 +13457,247 @@
 </file>
 
 <file path=ppt/slides/slide10.xml><?xml version="1.0" encoding="utf-8"?>
+<p:sld xmlns:a="http://schemas.openxmlformats.org/drawingml/2006/main" xmlns:r="http://schemas.openxmlformats.org/officeDocument/2006/relationships" xmlns:p="http://schemas.openxmlformats.org/presentationml/2006/main">
+  <p:cSld>
+    <p:bg>
+      <p:bgPr>
+        <a:blipFill>
+          <a:blip r:embed="rId3">
+            <a:duotone>
+              <a:schemeClr val="bg2">
+                <a:shade val="88000"/>
+                <a:hueMod val="106000"/>
+                <a:satMod val="140000"/>
+                <a:lumMod val="54000"/>
+              </a:schemeClr>
+              <a:schemeClr val="bg2">
+                <a:tint val="98000"/>
+                <a:hueMod val="92000"/>
+                <a:satMod val="150000"/>
+                <a:lumMod val="150000"/>
+              </a:schemeClr>
+            </a:duotone>
+            <a:extLst/>
+          </a:blip>
+          <a:stretch/>
+        </a:blipFill>
+        <a:effectLst/>
+      </p:bgPr>
+    </p:bg>
+    <p:spTree>
+      <p:nvGrpSpPr>
+        <p:cNvPr id="1" name=""/>
+        <p:cNvGrpSpPr/>
+        <p:nvPr/>
+      </p:nvGrpSpPr>
+      <p:grpSpPr>
+        <a:xfrm>
+          <a:off x="0" y="0"/>
+          <a:ext cx="0" cy="0"/>
+          <a:chOff x="0" y="0"/>
+          <a:chExt cx="0" cy="0"/>
+        </a:xfrm>
+      </p:grpSpPr>
+      <p:sp>
+        <p:nvSpPr>
+          <p:cNvPr id="2" name="Title 1">
+            <a:extLst>
+              <a:ext uri="{FF2B5EF4-FFF2-40B4-BE49-F238E27FC236}">
+                <a16:creationId xmlns:a16="http://schemas.microsoft.com/office/drawing/2014/main" id="{7848315F-F5BA-FD48-ADBE-A72EC1989D62}"/>
+              </a:ext>
+            </a:extLst>
+          </p:cNvPr>
+          <p:cNvSpPr>
+            <a:spLocks noGrp="1"/>
+          </p:cNvSpPr>
+          <p:nvPr>
+            <p:ph type="title"/>
+          </p:nvPr>
+        </p:nvSpPr>
+        <p:spPr>
+          <a:xfrm>
+            <a:off x="8036040" y="1455027"/>
+            <a:ext cx="3611317" cy="1478570"/>
+          </a:xfrm>
+        </p:spPr>
+        <p:txBody>
+          <a:bodyPr anchor="b">
+            <a:normAutofit/>
+          </a:bodyPr>
+          <a:lstStyle/>
+          <a:p>
+            <a:r>
+              <a:rPr lang="en-US" sz="2800" dirty="0"/>
+              <a:t>CORRELATION BETWEEN ABV AND IBU</a:t>
+            </a:r>
+          </a:p>
+        </p:txBody>
+      </p:sp>
+      <p:sp>
+        <p:nvSpPr>
+          <p:cNvPr id="13" name="Round Diagonal Corner Rectangle 11">
+            <a:extLst>
+              <a:ext uri="{FF2B5EF4-FFF2-40B4-BE49-F238E27FC236}">
+                <a16:creationId xmlns:a16="http://schemas.microsoft.com/office/drawing/2014/main" id="{15649ABD-2423-4C83-8F1D-CDC70264C981}"/>
+              </a:ext>
+              <a:ext uri="{C183D7F6-B498-43B3-948B-1728B52AA6E4}">
+                <adec:decorative xmlns:adec="http://schemas.microsoft.com/office/drawing/2017/decorative" val="1"/>
+              </a:ext>
+            </a:extLst>
+          </p:cNvPr>
+          <p:cNvSpPr>
+            <a:spLocks noGrp="1" noRot="1" noChangeAspect="1" noMove="1" noResize="1" noEditPoints="1" noAdjustHandles="1" noChangeArrowheads="1" noChangeShapeType="1" noTextEdit="1"/>
+          </p:cNvSpPr>
+          <p:nvPr>
+            <p:extLst>
+              <p:ext uri="{386F3935-93C4-4BCD-93E2-E3B085C9AB24}">
+                <p16:designElem xmlns:p16="http://schemas.microsoft.com/office/powerpoint/2015/main" val="1"/>
+              </p:ext>
+            </p:extLst>
+          </p:nvPr>
+        </p:nvSpPr>
+        <p:spPr>
+          <a:xfrm>
+            <a:off x="798949" y="808057"/>
+            <a:ext cx="6752461" cy="5234394"/>
+          </a:xfrm>
+          <a:prstGeom prst="round2DiagRect">
+            <a:avLst>
+              <a:gd name="adj1" fmla="val 7418"/>
+              <a:gd name="adj2" fmla="val 0"/>
+            </a:avLst>
+          </a:prstGeom>
+          <a:solidFill>
+            <a:srgbClr val="FFFFFF"/>
+          </a:solidFill>
+          <a:ln w="19050" cap="sq">
+            <a:solidFill>
+              <a:schemeClr val="tx2">
+                <a:lumMod val="60000"/>
+                <a:lumOff val="40000"/>
+                <a:alpha val="60000"/>
+              </a:schemeClr>
+            </a:solidFill>
+            <a:miter lim="800000"/>
+          </a:ln>
+          <a:effectLst>
+            <a:outerShdw blurRad="88900" dist="38100" dir="5400000" algn="t" rotWithShape="0">
+              <a:prstClr val="black">
+                <a:alpha val="40000"/>
+              </a:prstClr>
+            </a:outerShdw>
+          </a:effectLst>
+        </p:spPr>
+        <p:style>
+          <a:lnRef idx="2">
+            <a:schemeClr val="accent1">
+              <a:shade val="50000"/>
+            </a:schemeClr>
+          </a:lnRef>
+          <a:fillRef idx="1">
+            <a:schemeClr val="accent1"/>
+          </a:fillRef>
+          <a:effectRef idx="0">
+            <a:schemeClr val="accent1"/>
+          </a:effectRef>
+          <a:fontRef idx="minor">
+            <a:schemeClr val="lt1"/>
+          </a:fontRef>
+        </p:style>
+        <p:txBody>
+          <a:bodyPr rtlCol="0" anchor="ctr"/>
+          <a:lstStyle/>
+          <a:p>
+            <a:pPr algn="ctr"/>
+            <a:endParaRPr lang="en-US"/>
+          </a:p>
+        </p:txBody>
+      </p:sp>
+      <p:sp>
+        <p:nvSpPr>
+          <p:cNvPr id="10" name="Content Placeholder 9">
+            <a:extLst>
+              <a:ext uri="{FF2B5EF4-FFF2-40B4-BE49-F238E27FC236}">
+                <a16:creationId xmlns:a16="http://schemas.microsoft.com/office/drawing/2014/main" id="{30096462-20F8-41ED-A556-1F9BA2AFF3AF}"/>
+              </a:ext>
+            </a:extLst>
+          </p:cNvPr>
+          <p:cNvSpPr>
+            <a:spLocks noGrp="1"/>
+          </p:cNvSpPr>
+          <p:nvPr>
+            <p:ph idx="1"/>
+          </p:nvPr>
+        </p:nvSpPr>
+        <p:spPr>
+          <a:xfrm>
+            <a:off x="8036040" y="3272813"/>
+            <a:ext cx="3281004" cy="1303182"/>
+          </a:xfrm>
+        </p:spPr>
+        <p:txBody>
+          <a:bodyPr>
+            <a:normAutofit/>
+          </a:bodyPr>
+          <a:lstStyle/>
+          <a:p>
+            <a:r>
+              <a:rPr lang="en-US" sz="1800" dirty="0"/>
+              <a:t>p-value &lt; 0.0001</a:t>
+            </a:r>
+          </a:p>
+          <a:p>
+            <a:r>
+              <a:rPr lang="en-US" sz="1800" dirty="0"/>
+              <a:t>Correlation coefficient = 0.67</a:t>
+            </a:r>
+          </a:p>
+        </p:txBody>
+      </p:sp>
+      <p:pic>
+        <p:nvPicPr>
+          <p:cNvPr id="7" name="Picture 6" descr="A close up of a piece of paper&#13;&#10;&#13;&#10;Description automatically generated">
+            <a:extLst>
+              <a:ext uri="{FF2B5EF4-FFF2-40B4-BE49-F238E27FC236}">
+                <a16:creationId xmlns:a16="http://schemas.microsoft.com/office/drawing/2014/main" id="{C74BA77C-CE20-494C-AC6B-432E74A37147}"/>
+              </a:ext>
+            </a:extLst>
+          </p:cNvPr>
+          <p:cNvPicPr>
+            <a:picLocks noChangeAspect="1"/>
+          </p:cNvPicPr>
+          <p:nvPr/>
+        </p:nvPicPr>
+        <p:blipFill>
+          <a:blip r:embed="rId4"/>
+          <a:stretch>
+            <a:fillRect/>
+          </a:stretch>
+        </p:blipFill>
+        <p:spPr>
+          <a:xfrm>
+            <a:off x="874956" y="1143264"/>
+            <a:ext cx="6549888" cy="4563979"/>
+          </a:xfrm>
+          <a:prstGeom prst="rect">
+            <a:avLst/>
+          </a:prstGeom>
+        </p:spPr>
+      </p:pic>
+    </p:spTree>
+    <p:extLst>
+      <p:ext uri="{BB962C8B-B14F-4D97-AF65-F5344CB8AC3E}">
+        <p14:creationId xmlns:p14="http://schemas.microsoft.com/office/powerpoint/2010/main" val="2919893056"/>
+      </p:ext>
+    </p:extLst>
+  </p:cSld>
+  <p:clrMapOvr>
+    <a:masterClrMapping/>
+  </p:clrMapOvr>
+</p:sld>
+</file>
+
+<file path=ppt/slides/slide11.xml><?xml version="1.0" encoding="utf-8"?>
 <p:sld xmlns:a="http://schemas.openxmlformats.org/drawingml/2006/main" xmlns:r="http://schemas.openxmlformats.org/officeDocument/2006/relationships" xmlns:p="http://schemas.openxmlformats.org/presentationml/2006/main">
   <p:cSld>
     <p:spTree>
@@ -18699,7 +19037,7 @@
             </a:ln>
             <a:extLst>
               <a:ext uri="{91240B29-F687-4f45-9708-019B960494DF}">
-                <a14:hiddenLine xmlns="" xmlns:a14="http://schemas.microsoft.com/office/drawing/2010/main" xmlns:p14="http://schemas.microsoft.com/office/powerpoint/2010/main" xmlns:a16="http://schemas.microsoft.com/office/drawing/2014/main" w="9525">
+                <a14:hiddenLine xmlns:a16="http://schemas.microsoft.com/office/drawing/2014/main" xmlns:p14="http://schemas.microsoft.com/office/powerpoint/2010/main" xmlns:a14="http://schemas.microsoft.com/office/drawing/2010/main" xmlns="" w="9525">
                   <a:solidFill>
                     <a:srgbClr val="000000"/>
                   </a:solidFill>
@@ -18804,7 +19142,7 @@
             </a:ln>
             <a:extLst>
               <a:ext uri="{91240B29-F687-4f45-9708-019B960494DF}">
-                <a14:hiddenLine xmlns="" xmlns:a14="http://schemas.microsoft.com/office/drawing/2010/main" xmlns:p14="http://schemas.microsoft.com/office/powerpoint/2010/main" xmlns:a16="http://schemas.microsoft.com/office/drawing/2014/main" w="9525">
+                <a14:hiddenLine xmlns:a16="http://schemas.microsoft.com/office/drawing/2014/main" xmlns:p14="http://schemas.microsoft.com/office/powerpoint/2010/main" xmlns:a14="http://schemas.microsoft.com/office/drawing/2010/main" xmlns="" w="9525">
                   <a:solidFill>
                     <a:srgbClr val="000000"/>
                   </a:solidFill>
@@ -18909,7 +19247,7 @@
             </a:ln>
             <a:extLst>
               <a:ext uri="{91240B29-F687-4f45-9708-019B960494DF}">
-                <a14:hiddenLine xmlns="" xmlns:a14="http://schemas.microsoft.com/office/drawing/2010/main" xmlns:p14="http://schemas.microsoft.com/office/powerpoint/2010/main" xmlns:a16="http://schemas.microsoft.com/office/drawing/2014/main" w="9525">
+                <a14:hiddenLine xmlns:a16="http://schemas.microsoft.com/office/drawing/2014/main" xmlns:p14="http://schemas.microsoft.com/office/powerpoint/2010/main" xmlns:a14="http://schemas.microsoft.com/office/drawing/2010/main" xmlns="" w="9525">
                   <a:solidFill>
                     <a:srgbClr val="000000"/>
                   </a:solidFill>
@@ -18986,7 +19324,7 @@
             </a:ln>
             <a:extLst>
               <a:ext uri="{91240B29-F687-4f45-9708-019B960494DF}">
-                <a14:hiddenLine xmlns="" xmlns:a14="http://schemas.microsoft.com/office/drawing/2010/main" xmlns:p14="http://schemas.microsoft.com/office/powerpoint/2010/main" xmlns:a16="http://schemas.microsoft.com/office/drawing/2014/main" w="9525">
+                <a14:hiddenLine xmlns:a16="http://schemas.microsoft.com/office/drawing/2014/main" xmlns:p14="http://schemas.microsoft.com/office/powerpoint/2010/main" xmlns:a14="http://schemas.microsoft.com/office/drawing/2010/main" xmlns="" w="9525">
                   <a:solidFill>
                     <a:srgbClr val="000000"/>
                   </a:solidFill>
@@ -19091,7 +19429,7 @@
             </a:ln>
             <a:extLst>
               <a:ext uri="{91240B29-F687-4f45-9708-019B960494DF}">
-                <a14:hiddenLine xmlns="" xmlns:a14="http://schemas.microsoft.com/office/drawing/2010/main" xmlns:p14="http://schemas.microsoft.com/office/powerpoint/2010/main" xmlns:a16="http://schemas.microsoft.com/office/drawing/2014/main" w="9525">
+                <a14:hiddenLine xmlns:a16="http://schemas.microsoft.com/office/drawing/2014/main" xmlns:p14="http://schemas.microsoft.com/office/powerpoint/2010/main" xmlns:a14="http://schemas.microsoft.com/office/drawing/2010/main" xmlns="" w="9525">
                   <a:solidFill>
                     <a:srgbClr val="000000"/>
                   </a:solidFill>
@@ -19168,7 +19506,7 @@
             </a:ln>
             <a:extLst>
               <a:ext uri="{91240B29-F687-4f45-9708-019B960494DF}">
-                <a14:hiddenLine xmlns="" xmlns:a14="http://schemas.microsoft.com/office/drawing/2010/main" xmlns:p14="http://schemas.microsoft.com/office/powerpoint/2010/main" xmlns:a16="http://schemas.microsoft.com/office/drawing/2014/main" w="9525">
+                <a14:hiddenLine xmlns:a16="http://schemas.microsoft.com/office/drawing/2014/main" xmlns:p14="http://schemas.microsoft.com/office/powerpoint/2010/main" xmlns:a14="http://schemas.microsoft.com/office/drawing/2010/main" xmlns="" w="9525">
                   <a:solidFill>
                     <a:srgbClr val="000000"/>
                   </a:solidFill>
@@ -19245,7 +19583,7 @@
             </a:ln>
             <a:extLst>
               <a:ext uri="{91240B29-F687-4f45-9708-019B960494DF}">
-                <a14:hiddenLine xmlns="" xmlns:a14="http://schemas.microsoft.com/office/drawing/2010/main" xmlns:p14="http://schemas.microsoft.com/office/powerpoint/2010/main" xmlns:a16="http://schemas.microsoft.com/office/drawing/2014/main" w="9525">
+                <a14:hiddenLine xmlns:a16="http://schemas.microsoft.com/office/drawing/2014/main" xmlns:p14="http://schemas.microsoft.com/office/powerpoint/2010/main" xmlns:a14="http://schemas.microsoft.com/office/drawing/2010/main" xmlns="" w="9525">
                   <a:solidFill>
                     <a:srgbClr val="000000"/>
                   </a:solidFill>
@@ -19350,7 +19688,7 @@
             </a:ln>
             <a:extLst>
               <a:ext uri="{91240B29-F687-4f45-9708-019B960494DF}">
-                <a14:hiddenLine xmlns="" xmlns:a14="http://schemas.microsoft.com/office/drawing/2010/main" xmlns:p14="http://schemas.microsoft.com/office/powerpoint/2010/main" xmlns:a16="http://schemas.microsoft.com/office/drawing/2014/main" w="9525">
+                <a14:hiddenLine xmlns:a16="http://schemas.microsoft.com/office/drawing/2014/main" xmlns:p14="http://schemas.microsoft.com/office/powerpoint/2010/main" xmlns:a14="http://schemas.microsoft.com/office/drawing/2010/main" xmlns="" w="9525">
                   <a:solidFill>
                     <a:srgbClr val="000000"/>
                   </a:solidFill>
@@ -19455,7 +19793,7 @@
             </a:ln>
             <a:extLst>
               <a:ext uri="{91240B29-F687-4f45-9708-019B960494DF}">
-                <a14:hiddenLine xmlns="" xmlns:a14="http://schemas.microsoft.com/office/drawing/2010/main" xmlns:p14="http://schemas.microsoft.com/office/powerpoint/2010/main" xmlns:a16="http://schemas.microsoft.com/office/drawing/2014/main" w="9525">
+                <a14:hiddenLine xmlns:a16="http://schemas.microsoft.com/office/drawing/2014/main" xmlns:p14="http://schemas.microsoft.com/office/powerpoint/2010/main" xmlns:a14="http://schemas.microsoft.com/office/drawing/2010/main" xmlns="" w="9525">
                   <a:solidFill>
                     <a:srgbClr val="000000"/>
                   </a:solidFill>
@@ -19532,7 +19870,7 @@
             </a:ln>
             <a:extLst>
               <a:ext uri="{91240B29-F687-4f45-9708-019B960494DF}">
-                <a14:hiddenLine xmlns="" xmlns:a14="http://schemas.microsoft.com/office/drawing/2010/main" xmlns:p14="http://schemas.microsoft.com/office/powerpoint/2010/main" xmlns:a16="http://schemas.microsoft.com/office/drawing/2014/main" w="9525">
+                <a14:hiddenLine xmlns:a16="http://schemas.microsoft.com/office/drawing/2014/main" xmlns:p14="http://schemas.microsoft.com/office/powerpoint/2010/main" xmlns:a14="http://schemas.microsoft.com/office/drawing/2010/main" xmlns="" w="9525">
                   <a:solidFill>
                     <a:srgbClr val="000000"/>
                   </a:solidFill>
@@ -19657,7 +19995,7 @@
             </a:ln>
             <a:extLst>
               <a:ext uri="{91240B29-F687-4f45-9708-019B960494DF}">
-                <a14:hiddenLine xmlns="" xmlns:a14="http://schemas.microsoft.com/office/drawing/2010/main" xmlns:p14="http://schemas.microsoft.com/office/powerpoint/2010/main" xmlns:a16="http://schemas.microsoft.com/office/drawing/2014/main" w="9525">
+                <a14:hiddenLine xmlns:a16="http://schemas.microsoft.com/office/drawing/2014/main" xmlns:p14="http://schemas.microsoft.com/office/powerpoint/2010/main" xmlns:a14="http://schemas.microsoft.com/office/drawing/2010/main" xmlns="" w="9525">
                   <a:solidFill>
                     <a:srgbClr val="000000"/>
                   </a:solidFill>
@@ -19771,7 +20109,7 @@
             </a:ln>
             <a:extLst>
               <a:ext uri="{91240B29-F687-4f45-9708-019B960494DF}">
-                <a14:hiddenLine xmlns="" xmlns:a14="http://schemas.microsoft.com/office/drawing/2010/main" xmlns:p14="http://schemas.microsoft.com/office/powerpoint/2010/main" xmlns:a16="http://schemas.microsoft.com/office/drawing/2014/main" w="9525">
+                <a14:hiddenLine xmlns:a16="http://schemas.microsoft.com/office/drawing/2014/main" xmlns:p14="http://schemas.microsoft.com/office/powerpoint/2010/main" xmlns:a14="http://schemas.microsoft.com/office/drawing/2010/main" xmlns="" w="9525">
                   <a:solidFill>
                     <a:srgbClr val="000000"/>
                   </a:solidFill>
@@ -19848,7 +20186,7 @@
             </a:ln>
             <a:extLst>
               <a:ext uri="{91240B29-F687-4f45-9708-019B960494DF}">
-                <a14:hiddenLine xmlns="" xmlns:a14="http://schemas.microsoft.com/office/drawing/2010/main" xmlns:p14="http://schemas.microsoft.com/office/powerpoint/2010/main" xmlns:a16="http://schemas.microsoft.com/office/drawing/2014/main" w="9525">
+                <a14:hiddenLine xmlns:a16="http://schemas.microsoft.com/office/drawing/2014/main" xmlns:p14="http://schemas.microsoft.com/office/powerpoint/2010/main" xmlns:a14="http://schemas.microsoft.com/office/drawing/2010/main" xmlns="" w="9525">
                   <a:solidFill>
                     <a:srgbClr val="000000"/>
                   </a:solidFill>
@@ -19925,7 +20263,7 @@
             </a:ln>
             <a:extLst>
               <a:ext uri="{91240B29-F687-4f45-9708-019B960494DF}">
-                <a14:hiddenLine xmlns="" xmlns:a14="http://schemas.microsoft.com/office/drawing/2010/main" xmlns:p14="http://schemas.microsoft.com/office/powerpoint/2010/main" xmlns:a16="http://schemas.microsoft.com/office/drawing/2014/main" w="9525">
+                <a14:hiddenLine xmlns:a16="http://schemas.microsoft.com/office/drawing/2014/main" xmlns:p14="http://schemas.microsoft.com/office/powerpoint/2010/main" xmlns:a14="http://schemas.microsoft.com/office/drawing/2010/main" xmlns="" w="9525">
                   <a:solidFill>
                     <a:srgbClr val="000000"/>
                   </a:solidFill>
@@ -20030,7 +20368,7 @@
             </a:ln>
             <a:extLst>
               <a:ext uri="{91240B29-F687-4f45-9708-019B960494DF}">
-                <a14:hiddenLine xmlns="" xmlns:a14="http://schemas.microsoft.com/office/drawing/2010/main" xmlns:p14="http://schemas.microsoft.com/office/powerpoint/2010/main" xmlns:a16="http://schemas.microsoft.com/office/drawing/2014/main" w="9525">
+                <a14:hiddenLine xmlns:a16="http://schemas.microsoft.com/office/drawing/2014/main" xmlns:p14="http://schemas.microsoft.com/office/powerpoint/2010/main" xmlns:a14="http://schemas.microsoft.com/office/drawing/2010/main" xmlns="" w="9525">
                   <a:solidFill>
                     <a:srgbClr val="000000"/>
                   </a:solidFill>
@@ -20079,7 +20417,7 @@
             </a:ln>
             <a:extLst>
               <a:ext uri="{91240B29-F687-4f45-9708-019B960494DF}">
-                <a14:hiddenLine xmlns="" xmlns:a14="http://schemas.microsoft.com/office/drawing/2010/main" xmlns:p14="http://schemas.microsoft.com/office/powerpoint/2010/main" xmlns:a16="http://schemas.microsoft.com/office/drawing/2014/main" w="9525">
+                <a14:hiddenLine xmlns:a16="http://schemas.microsoft.com/office/drawing/2014/main" xmlns:p14="http://schemas.microsoft.com/office/powerpoint/2010/main" xmlns:a14="http://schemas.microsoft.com/office/drawing/2010/main" xmlns="" w="9525">
                   <a:solidFill>
                     <a:srgbClr val="000000"/>
                   </a:solidFill>
@@ -20159,7 +20497,7 @@
             </a:ln>
             <a:extLst>
               <a:ext uri="{91240B29-F687-4f45-9708-019B960494DF}">
-                <a14:hiddenLine xmlns="" xmlns:a14="http://schemas.microsoft.com/office/drawing/2010/main" xmlns:p14="http://schemas.microsoft.com/office/powerpoint/2010/main" xmlns:a16="http://schemas.microsoft.com/office/drawing/2014/main" w="9525">
+                <a14:hiddenLine xmlns:a16="http://schemas.microsoft.com/office/drawing/2014/main" xmlns:p14="http://schemas.microsoft.com/office/powerpoint/2010/main" xmlns:a14="http://schemas.microsoft.com/office/drawing/2010/main" xmlns="" w="9525">
                   <a:solidFill>
                     <a:srgbClr val="000000"/>
                   </a:solidFill>
@@ -20264,7 +20602,7 @@
             </a:ln>
             <a:extLst>
               <a:ext uri="{91240B29-F687-4f45-9708-019B960494DF}">
-                <a14:hiddenLine xmlns="" xmlns:a14="http://schemas.microsoft.com/office/drawing/2010/main" xmlns:p14="http://schemas.microsoft.com/office/powerpoint/2010/main" xmlns:a16="http://schemas.microsoft.com/office/drawing/2014/main" w="9525">
+                <a14:hiddenLine xmlns:a16="http://schemas.microsoft.com/office/drawing/2014/main" xmlns:p14="http://schemas.microsoft.com/office/powerpoint/2010/main" xmlns:a14="http://schemas.microsoft.com/office/drawing/2010/main" xmlns="" w="9525">
                   <a:solidFill>
                     <a:srgbClr val="000000"/>
                   </a:solidFill>
@@ -20341,7 +20679,7 @@
             </a:ln>
             <a:extLst>
               <a:ext uri="{91240B29-F687-4f45-9708-019B960494DF}">
-                <a14:hiddenLine xmlns="" xmlns:a14="http://schemas.microsoft.com/office/drawing/2010/main" xmlns:p14="http://schemas.microsoft.com/office/powerpoint/2010/main" xmlns:a16="http://schemas.microsoft.com/office/drawing/2014/main" w="9525">
+                <a14:hiddenLine xmlns:a16="http://schemas.microsoft.com/office/drawing/2014/main" xmlns:p14="http://schemas.microsoft.com/office/powerpoint/2010/main" xmlns:a14="http://schemas.microsoft.com/office/drawing/2010/main" xmlns="" w="9525">
                   <a:solidFill>
                     <a:srgbClr val="000000"/>
                   </a:solidFill>
@@ -20446,7 +20784,7 @@
             </a:ln>
             <a:extLst>
               <a:ext uri="{91240B29-F687-4f45-9708-019B960494DF}">
-                <a14:hiddenLine xmlns="" xmlns:a14="http://schemas.microsoft.com/office/drawing/2010/main" xmlns:p14="http://schemas.microsoft.com/office/powerpoint/2010/main" xmlns:a16="http://schemas.microsoft.com/office/drawing/2014/main" w="9525">
+                <a14:hiddenLine xmlns:a16="http://schemas.microsoft.com/office/drawing/2014/main" xmlns:p14="http://schemas.microsoft.com/office/powerpoint/2010/main" xmlns:a14="http://schemas.microsoft.com/office/drawing/2010/main" xmlns="" w="9525">
                   <a:solidFill>
                     <a:srgbClr val="000000"/>
                   </a:solidFill>
@@ -20526,7 +20864,7 @@
             </a:ln>
             <a:extLst>
               <a:ext uri="{91240B29-F687-4f45-9708-019B960494DF}">
-                <a14:hiddenLine xmlns="" xmlns:a14="http://schemas.microsoft.com/office/drawing/2010/main" xmlns:p14="http://schemas.microsoft.com/office/powerpoint/2010/main" xmlns:a16="http://schemas.microsoft.com/office/drawing/2014/main" w="9525">
+                <a14:hiddenLine xmlns:a16="http://schemas.microsoft.com/office/drawing/2014/main" xmlns:p14="http://schemas.microsoft.com/office/powerpoint/2010/main" xmlns:a14="http://schemas.microsoft.com/office/drawing/2010/main" xmlns="" w="9525">
                   <a:solidFill>
                     <a:srgbClr val="000000"/>
                   </a:solidFill>
@@ -20603,7 +20941,7 @@
             </a:ln>
             <a:extLst>
               <a:ext uri="{91240B29-F687-4f45-9708-019B960494DF}">
-                <a14:hiddenLine xmlns="" xmlns:a14="http://schemas.microsoft.com/office/drawing/2010/main" xmlns:p14="http://schemas.microsoft.com/office/powerpoint/2010/main" xmlns:a16="http://schemas.microsoft.com/office/drawing/2014/main" w="9525">
+                <a14:hiddenLine xmlns:a16="http://schemas.microsoft.com/office/drawing/2014/main" xmlns:p14="http://schemas.microsoft.com/office/powerpoint/2010/main" xmlns:a14="http://schemas.microsoft.com/office/drawing/2010/main" xmlns="" w="9525">
                   <a:solidFill>
                     <a:srgbClr val="000000"/>
                   </a:solidFill>
@@ -20708,7 +21046,7 @@
             </a:ln>
             <a:extLst>
               <a:ext uri="{91240B29-F687-4f45-9708-019B960494DF}">
-                <a14:hiddenLine xmlns="" xmlns:a14="http://schemas.microsoft.com/office/drawing/2010/main" xmlns:p14="http://schemas.microsoft.com/office/powerpoint/2010/main" xmlns:a16="http://schemas.microsoft.com/office/drawing/2014/main" w="9525">
+                <a14:hiddenLine xmlns:a16="http://schemas.microsoft.com/office/drawing/2014/main" xmlns:p14="http://schemas.microsoft.com/office/powerpoint/2010/main" xmlns:a14="http://schemas.microsoft.com/office/drawing/2010/main" xmlns="" w="9525">
                   <a:solidFill>
                     <a:srgbClr val="000000"/>
                   </a:solidFill>
@@ -20813,7 +21151,7 @@
             </a:ln>
             <a:extLst>
               <a:ext uri="{91240B29-F687-4f45-9708-019B960494DF}">
-                <a14:hiddenLine xmlns="" xmlns:a14="http://schemas.microsoft.com/office/drawing/2010/main" xmlns:p14="http://schemas.microsoft.com/office/powerpoint/2010/main" xmlns:a16="http://schemas.microsoft.com/office/drawing/2014/main" w="9525">
+                <a14:hiddenLine xmlns:a16="http://schemas.microsoft.com/office/drawing/2014/main" xmlns:p14="http://schemas.microsoft.com/office/powerpoint/2010/main" xmlns:a14="http://schemas.microsoft.com/office/drawing/2010/main" xmlns="" w="9525">
                   <a:solidFill>
                     <a:srgbClr val="000000"/>
                   </a:solidFill>
@@ -20893,7 +21231,7 @@
             </a:ln>
             <a:extLst>
               <a:ext uri="{91240B29-F687-4f45-9708-019B960494DF}">
-                <a14:hiddenLine xmlns="" xmlns:a14="http://schemas.microsoft.com/office/drawing/2010/main" xmlns:p14="http://schemas.microsoft.com/office/powerpoint/2010/main" xmlns:a16="http://schemas.microsoft.com/office/drawing/2014/main" w="9525">
+                <a14:hiddenLine xmlns:a16="http://schemas.microsoft.com/office/drawing/2014/main" xmlns:p14="http://schemas.microsoft.com/office/powerpoint/2010/main" xmlns:a14="http://schemas.microsoft.com/office/drawing/2010/main" xmlns="" w="9525">
                   <a:solidFill>
                     <a:srgbClr val="000000"/>
                   </a:solidFill>
@@ -21028,7 +21366,7 @@
             </a:ln>
             <a:extLst>
               <a:ext uri="{91240B29-F687-4f45-9708-019B960494DF}">
-                <a14:hiddenLine xmlns="" xmlns:a14="http://schemas.microsoft.com/office/drawing/2010/main" xmlns:p14="http://schemas.microsoft.com/office/powerpoint/2010/main" xmlns:a16="http://schemas.microsoft.com/office/drawing/2014/main" w="9525">
+                <a14:hiddenLine xmlns:a16="http://schemas.microsoft.com/office/drawing/2014/main" xmlns:p14="http://schemas.microsoft.com/office/powerpoint/2010/main" xmlns:a14="http://schemas.microsoft.com/office/drawing/2010/main" xmlns="" w="9525">
                   <a:solidFill>
                     <a:srgbClr val="000000"/>
                   </a:solidFill>
@@ -21235,7 +21573,7 @@
             </a:ln>
             <a:extLst>
               <a:ext uri="{91240B29-F687-4f45-9708-019B960494DF}">
-                <a14:hiddenLine xmlns="" xmlns:a14="http://schemas.microsoft.com/office/drawing/2010/main" xmlns:p14="http://schemas.microsoft.com/office/powerpoint/2010/main" xmlns:a16="http://schemas.microsoft.com/office/drawing/2014/main" w="9525">
+                <a14:hiddenLine xmlns:a16="http://schemas.microsoft.com/office/drawing/2014/main" xmlns:p14="http://schemas.microsoft.com/office/powerpoint/2010/main" xmlns:a14="http://schemas.microsoft.com/office/drawing/2010/main" xmlns="" w="9525">
                   <a:solidFill>
                     <a:srgbClr val="000000"/>
                   </a:solidFill>
@@ -21365,7 +21703,7 @@
             </a:ln>
             <a:extLst>
               <a:ext uri="{91240B29-F687-4f45-9708-019B960494DF}">
-                <a14:hiddenLine xmlns="" xmlns:a14="http://schemas.microsoft.com/office/drawing/2010/main" xmlns:p14="http://schemas.microsoft.com/office/powerpoint/2010/main" xmlns:a16="http://schemas.microsoft.com/office/drawing/2014/main" w="9525">
+                <a14:hiddenLine xmlns:a16="http://schemas.microsoft.com/office/drawing/2014/main" xmlns:p14="http://schemas.microsoft.com/office/powerpoint/2010/main" xmlns:a14="http://schemas.microsoft.com/office/drawing/2010/main" xmlns="" w="9525">
                   <a:solidFill>
                     <a:srgbClr val="000000"/>
                   </a:solidFill>
@@ -21470,7 +21808,7 @@
             </a:ln>
             <a:extLst>
               <a:ext uri="{91240B29-F687-4f45-9708-019B960494DF}">
-                <a14:hiddenLine xmlns="" xmlns:a14="http://schemas.microsoft.com/office/drawing/2010/main" xmlns:p14="http://schemas.microsoft.com/office/powerpoint/2010/main" xmlns:a16="http://schemas.microsoft.com/office/drawing/2014/main" w="9525">
+                <a14:hiddenLine xmlns:a16="http://schemas.microsoft.com/office/drawing/2014/main" xmlns:p14="http://schemas.microsoft.com/office/powerpoint/2010/main" xmlns:a14="http://schemas.microsoft.com/office/drawing/2010/main" xmlns="" w="9525">
                   <a:solidFill>
                     <a:srgbClr val="000000"/>
                   </a:solidFill>
@@ -21550,7 +21888,7 @@
             </a:ln>
             <a:extLst>
               <a:ext uri="{91240B29-F687-4f45-9708-019B960494DF}">
-                <a14:hiddenLine xmlns="" xmlns:a14="http://schemas.microsoft.com/office/drawing/2010/main" xmlns:p14="http://schemas.microsoft.com/office/powerpoint/2010/main" xmlns:a16="http://schemas.microsoft.com/office/drawing/2014/main" w="9525">
+                <a14:hiddenLine xmlns:a16="http://schemas.microsoft.com/office/drawing/2014/main" xmlns:p14="http://schemas.microsoft.com/office/powerpoint/2010/main" xmlns:a14="http://schemas.microsoft.com/office/drawing/2010/main" xmlns="" w="9525">
                   <a:solidFill>
                     <a:srgbClr val="000000"/>
                   </a:solidFill>
@@ -21655,7 +21993,7 @@
             </a:ln>
             <a:extLst>
               <a:ext uri="{91240B29-F687-4f45-9708-019B960494DF}">
-                <a14:hiddenLine xmlns="" xmlns:a14="http://schemas.microsoft.com/office/drawing/2010/main" xmlns:p14="http://schemas.microsoft.com/office/powerpoint/2010/main" xmlns:a16="http://schemas.microsoft.com/office/drawing/2014/main" w="9525">
+                <a14:hiddenLine xmlns:a16="http://schemas.microsoft.com/office/drawing/2014/main" xmlns:p14="http://schemas.microsoft.com/office/powerpoint/2010/main" xmlns:a14="http://schemas.microsoft.com/office/drawing/2010/main" xmlns="" w="9525">
                   <a:solidFill>
                     <a:srgbClr val="000000"/>
                   </a:solidFill>
@@ -21738,7 +22076,7 @@
             </a:ln>
             <a:extLst>
               <a:ext uri="{91240B29-F687-4f45-9708-019B960494DF}">
-                <a14:hiddenLine xmlns="" xmlns:a14="http://schemas.microsoft.com/office/drawing/2010/main" xmlns:p14="http://schemas.microsoft.com/office/powerpoint/2010/main" xmlns:a16="http://schemas.microsoft.com/office/drawing/2014/main" w="9525">
+                <a14:hiddenLine xmlns:a16="http://schemas.microsoft.com/office/drawing/2014/main" xmlns:p14="http://schemas.microsoft.com/office/powerpoint/2010/main" xmlns:a14="http://schemas.microsoft.com/office/drawing/2010/main" xmlns="" w="9525">
                   <a:solidFill>
                     <a:srgbClr val="000000"/>
                   </a:solidFill>
@@ -21843,7 +22181,7 @@
             </a:ln>
             <a:extLst>
               <a:ext uri="{91240B29-F687-4f45-9708-019B960494DF}">
-                <a14:hiddenLine xmlns="" xmlns:a14="http://schemas.microsoft.com/office/drawing/2010/main" xmlns:p14="http://schemas.microsoft.com/office/powerpoint/2010/main" xmlns:a16="http://schemas.microsoft.com/office/drawing/2014/main" w="9525">
+                <a14:hiddenLine xmlns:a16="http://schemas.microsoft.com/office/drawing/2014/main" xmlns:p14="http://schemas.microsoft.com/office/powerpoint/2010/main" xmlns:a14="http://schemas.microsoft.com/office/drawing/2010/main" xmlns="" w="9525">
                   <a:solidFill>
                     <a:srgbClr val="000000"/>
                   </a:solidFill>
@@ -21926,7 +22264,7 @@
             </a:ln>
             <a:extLst>
               <a:ext uri="{91240B29-F687-4f45-9708-019B960494DF}">
-                <a14:hiddenLine xmlns="" xmlns:a14="http://schemas.microsoft.com/office/drawing/2010/main" xmlns:p14="http://schemas.microsoft.com/office/powerpoint/2010/main" xmlns:a16="http://schemas.microsoft.com/office/drawing/2014/main" w="9525">
+                <a14:hiddenLine xmlns:a16="http://schemas.microsoft.com/office/drawing/2014/main" xmlns:p14="http://schemas.microsoft.com/office/powerpoint/2010/main" xmlns:a14="http://schemas.microsoft.com/office/drawing/2010/main" xmlns="" w="9525">
                   <a:solidFill>
                     <a:srgbClr val="000000"/>
                   </a:solidFill>
@@ -22031,7 +22369,7 @@
             </a:ln>
             <a:extLst>
               <a:ext uri="{91240B29-F687-4f45-9708-019B960494DF}">
-                <a14:hiddenLine xmlns="" xmlns:a14="http://schemas.microsoft.com/office/drawing/2010/main" xmlns:p14="http://schemas.microsoft.com/office/powerpoint/2010/main" xmlns:a16="http://schemas.microsoft.com/office/drawing/2014/main" w="9525">
+                <a14:hiddenLine xmlns:a16="http://schemas.microsoft.com/office/drawing/2014/main" xmlns:p14="http://schemas.microsoft.com/office/powerpoint/2010/main" xmlns:a14="http://schemas.microsoft.com/office/drawing/2010/main" xmlns="" w="9525">
                   <a:solidFill>
                     <a:srgbClr val="000000"/>
                   </a:solidFill>
@@ -22080,7 +22418,7 @@
             </a:ln>
             <a:extLst>
               <a:ext uri="{91240B29-F687-4f45-9708-019B960494DF}">
-                <a14:hiddenLine xmlns="" xmlns:a14="http://schemas.microsoft.com/office/drawing/2010/main" xmlns:p14="http://schemas.microsoft.com/office/powerpoint/2010/main" xmlns:a16="http://schemas.microsoft.com/office/drawing/2014/main" w="9525">
+                <a14:hiddenLine xmlns:a16="http://schemas.microsoft.com/office/drawing/2014/main" xmlns:p14="http://schemas.microsoft.com/office/powerpoint/2010/main" xmlns:a14="http://schemas.microsoft.com/office/drawing/2010/main" xmlns="" w="9525">
                   <a:solidFill>
                     <a:srgbClr val="000000"/>
                   </a:solidFill>
@@ -22608,68 +22946,6 @@
           </a:p>
         </p:txBody>
       </p:sp>
-      <p:pic>
-        <p:nvPicPr>
-          <p:cNvPr id="5" name="Content Placeholder 4">
-            <a:extLst>
-              <a:ext uri="{FF2B5EF4-FFF2-40B4-BE49-F238E27FC236}">
-                <a16:creationId xmlns:a16="http://schemas.microsoft.com/office/drawing/2014/main" id="{DBDD860C-B768-4447-A4B6-CD89A37802E8}"/>
-              </a:ext>
-            </a:extLst>
-          </p:cNvPr>
-          <p:cNvPicPr>
-            <a:picLocks noGrp="1" noChangeAspect="1"/>
-          </p:cNvPicPr>
-          <p:nvPr>
-            <p:ph idx="1"/>
-          </p:nvPr>
-        </p:nvPicPr>
-        <p:blipFill>
-          <a:blip r:embed="rId3"/>
-          <a:stretch>
-            <a:fillRect/>
-          </a:stretch>
-        </p:blipFill>
-        <p:spPr>
-          <a:xfrm>
-            <a:off x="1754910" y="1385888"/>
-            <a:ext cx="8275781" cy="5152081"/>
-          </a:xfrm>
-          <a:prstGeom prst="rect">
-            <a:avLst/>
-          </a:prstGeom>
-          <a:solidFill>
-            <a:srgbClr val="FFFFFF">
-              <a:shade val="85000"/>
-            </a:srgbClr>
-          </a:solidFill>
-          <a:ln w="88900" cap="sq">
-            <a:solidFill>
-              <a:srgbClr val="FFFFFF"/>
-            </a:solidFill>
-            <a:miter lim="800000"/>
-          </a:ln>
-          <a:effectLst>
-            <a:outerShdw blurRad="55000" dist="18000" dir="5400000" algn="tl" rotWithShape="0">
-              <a:srgbClr val="000000">
-                <a:alpha val="40000"/>
-              </a:srgbClr>
-            </a:outerShdw>
-          </a:effectLst>
-          <a:scene3d>
-            <a:camera prst="orthographicFront"/>
-            <a:lightRig rig="twoPt" dir="t">
-              <a:rot lat="0" lon="0" rev="7200000"/>
-            </a:lightRig>
-          </a:scene3d>
-          <a:sp3d>
-            <a:bevelT w="25400" h="19050"/>
-            <a:contourClr>
-              <a:srgbClr val="FFFFFF"/>
-            </a:contourClr>
-          </a:sp3d>
-        </p:spPr>
-      </p:pic>
       <p:cxnSp>
         <p:nvCxnSpPr>
           <p:cNvPr id="4" name="Straight Connector 3"/>
@@ -22705,6 +22981,35 @@
           </a:fontRef>
         </p:style>
       </p:cxnSp>
+      <p:pic>
+        <p:nvPicPr>
+          <p:cNvPr id="8" name="Content Placeholder 7" descr="A picture containing wall, map&#13;&#10;&#13;&#10;Description automatically generated">
+            <a:extLst>
+              <a:ext uri="{FF2B5EF4-FFF2-40B4-BE49-F238E27FC236}">
+                <a16:creationId xmlns:a16="http://schemas.microsoft.com/office/drawing/2014/main" id="{CCBBB80F-4D86-5147-A06E-0DBAF4523D6B}"/>
+              </a:ext>
+            </a:extLst>
+          </p:cNvPr>
+          <p:cNvPicPr>
+            <a:picLocks noGrp="1" noChangeAspect="1"/>
+          </p:cNvPicPr>
+          <p:nvPr>
+            <p:ph idx="1"/>
+          </p:nvPr>
+        </p:nvPicPr>
+        <p:blipFill>
+          <a:blip r:embed="rId3"/>
+          <a:stretch>
+            <a:fillRect/>
+          </a:stretch>
+        </p:blipFill>
+        <p:spPr>
+          <a:xfrm>
+            <a:off x="2114372" y="1478570"/>
+            <a:ext cx="7254479" cy="4939220"/>
+          </a:xfrm>
+        </p:spPr>
+      </p:pic>
     </p:spTree>
     <p:extLst>
       <p:ext uri="{BB962C8B-B14F-4D97-AF65-F5344CB8AC3E}">

</xml_diff>

<commit_message>
Updated code with bar plot for Na percentages and added plot to presentation
</commit_message>
<xml_diff>
--- a/CaseStudy1 Presentation.pptx
+++ b/CaseStudy1 Presentation.pptx
@@ -241,7 +241,7 @@
           <a:p>
             <a:fld id="{1AF07D79-51EF-944D-A48B-9F68CC0182BF}" type="datetimeFigureOut">
               <a:rPr lang="en-US" smtClean="0"/>
-              <a:t>2/28/19</a:t>
+              <a:t>2/28/2019</a:t>
             </a:fld>
             <a:endParaRPr lang="en-US"/>
           </a:p>
@@ -1187,7 +1187,7 @@
           <a:noFill/>
           <a:extLst>
             <a:ext uri="{909E8E84-426E-40dd-AFC4-6F175D3DCCD1}">
-              <a14:hiddenFill xmlns="" xmlns:a14="http://schemas.microsoft.com/office/drawing/2010/main">
+              <a14:hiddenFill xmlns:a14="http://schemas.microsoft.com/office/drawing/2010/main" xmlns="">
                 <a:solidFill>
                   <a:srgbClr val="FFFFFF"/>
                 </a:solidFill>
@@ -1246,7 +1246,7 @@
             </a:ln>
             <a:extLst>
               <a:ext uri="{91240B29-F687-4f45-9708-019B960494DF}">
-                <a14:hiddenLine xmlns="" xmlns:a14="http://schemas.microsoft.com/office/drawing/2010/main" w="9525">
+                <a14:hiddenLine xmlns:a14="http://schemas.microsoft.com/office/drawing/2010/main" xmlns="" w="9525">
                   <a:solidFill>
                     <a:srgbClr val="000000"/>
                   </a:solidFill>
@@ -1336,7 +1336,7 @@
             </a:ln>
             <a:extLst>
               <a:ext uri="{91240B29-F687-4f45-9708-019B960494DF}">
-                <a14:hiddenLine xmlns="" xmlns:a14="http://schemas.microsoft.com/office/drawing/2010/main" w="9525">
+                <a14:hiddenLine xmlns:a14="http://schemas.microsoft.com/office/drawing/2010/main" xmlns="" w="9525">
                   <a:solidFill>
                     <a:srgbClr val="000000"/>
                   </a:solidFill>
@@ -1426,7 +1426,7 @@
             </a:ln>
             <a:extLst>
               <a:ext uri="{91240B29-F687-4f45-9708-019B960494DF}">
-                <a14:hiddenLine xmlns="" xmlns:a14="http://schemas.microsoft.com/office/drawing/2010/main" w="9525">
+                <a14:hiddenLine xmlns:a14="http://schemas.microsoft.com/office/drawing/2010/main" xmlns="" w="9525">
                   <a:solidFill>
                     <a:srgbClr val="000000"/>
                   </a:solidFill>
@@ -1460,7 +1460,7 @@
             </a:ln>
             <a:extLst>
               <a:ext uri="{91240B29-F687-4f45-9708-019B960494DF}">
-                <a14:hiddenLine xmlns="" xmlns:a14="http://schemas.microsoft.com/office/drawing/2010/main" w="9525">
+                <a14:hiddenLine xmlns:a14="http://schemas.microsoft.com/office/drawing/2010/main" xmlns="" w="9525">
                   <a:solidFill>
                     <a:srgbClr val="000000"/>
                   </a:solidFill>
@@ -1550,7 +1550,7 @@
             </a:ln>
             <a:extLst>
               <a:ext uri="{91240B29-F687-4f45-9708-019B960494DF}">
-                <a14:hiddenLine xmlns="" xmlns:a14="http://schemas.microsoft.com/office/drawing/2010/main" w="9525">
+                <a14:hiddenLine xmlns:a14="http://schemas.microsoft.com/office/drawing/2010/main" xmlns="" w="9525">
                   <a:solidFill>
                     <a:srgbClr val="000000"/>
                   </a:solidFill>
@@ -1612,7 +1612,7 @@
             </a:ln>
             <a:extLst>
               <a:ext uri="{91240B29-F687-4f45-9708-019B960494DF}">
-                <a14:hiddenLine xmlns="" xmlns:a14="http://schemas.microsoft.com/office/drawing/2010/main" w="9525">
+                <a14:hiddenLine xmlns:a14="http://schemas.microsoft.com/office/drawing/2010/main" xmlns="" w="9525">
                   <a:solidFill>
                     <a:srgbClr val="000000"/>
                   </a:solidFill>
@@ -1674,7 +1674,7 @@
             </a:ln>
             <a:extLst>
               <a:ext uri="{91240B29-F687-4f45-9708-019B960494DF}">
-                <a14:hiddenLine xmlns="" xmlns:a14="http://schemas.microsoft.com/office/drawing/2010/main" w="9525">
+                <a14:hiddenLine xmlns:a14="http://schemas.microsoft.com/office/drawing/2010/main" xmlns="" w="9525">
                   <a:solidFill>
                     <a:srgbClr val="000000"/>
                   </a:solidFill>
@@ -1764,7 +1764,7 @@
             </a:ln>
             <a:extLst>
               <a:ext uri="{91240B29-F687-4f45-9708-019B960494DF}">
-                <a14:hiddenLine xmlns="" xmlns:a14="http://schemas.microsoft.com/office/drawing/2010/main" w="9525">
+                <a14:hiddenLine xmlns:a14="http://schemas.microsoft.com/office/drawing/2010/main" xmlns="" w="9525">
                   <a:solidFill>
                     <a:srgbClr val="000000"/>
                   </a:solidFill>
@@ -1826,7 +1826,7 @@
             </a:ln>
             <a:extLst>
               <a:ext uri="{91240B29-F687-4f45-9708-019B960494DF}">
-                <a14:hiddenLine xmlns="" xmlns:a14="http://schemas.microsoft.com/office/drawing/2010/main" w="9525">
+                <a14:hiddenLine xmlns:a14="http://schemas.microsoft.com/office/drawing/2010/main" xmlns="" w="9525">
                   <a:solidFill>
                     <a:srgbClr val="000000"/>
                   </a:solidFill>
@@ -1888,7 +1888,7 @@
             </a:ln>
             <a:extLst>
               <a:ext uri="{91240B29-F687-4f45-9708-019B960494DF}">
-                <a14:hiddenLine xmlns="" xmlns:a14="http://schemas.microsoft.com/office/drawing/2010/main" w="9525">
+                <a14:hiddenLine xmlns:a14="http://schemas.microsoft.com/office/drawing/2010/main" xmlns="" w="9525">
                   <a:solidFill>
                     <a:srgbClr val="000000"/>
                   </a:solidFill>
@@ -1978,7 +1978,7 @@
             </a:ln>
             <a:extLst>
               <a:ext uri="{91240B29-F687-4f45-9708-019B960494DF}">
-                <a14:hiddenLine xmlns="" xmlns:a14="http://schemas.microsoft.com/office/drawing/2010/main" w="9525">
+                <a14:hiddenLine xmlns:a14="http://schemas.microsoft.com/office/drawing/2010/main" xmlns="" w="9525">
                   <a:solidFill>
                     <a:srgbClr val="000000"/>
                   </a:solidFill>
@@ -2068,7 +2068,7 @@
             </a:ln>
             <a:extLst>
               <a:ext uri="{91240B29-F687-4f45-9708-019B960494DF}">
-                <a14:hiddenLine xmlns="" xmlns:a14="http://schemas.microsoft.com/office/drawing/2010/main" w="9525">
+                <a14:hiddenLine xmlns:a14="http://schemas.microsoft.com/office/drawing/2010/main" xmlns="" w="9525">
                   <a:solidFill>
                     <a:srgbClr val="000000"/>
                   </a:solidFill>
@@ -2130,7 +2130,7 @@
             </a:ln>
             <a:extLst>
               <a:ext uri="{91240B29-F687-4f45-9708-019B960494DF}">
-                <a14:hiddenLine xmlns="" xmlns:a14="http://schemas.microsoft.com/office/drawing/2010/main" w="9525">
+                <a14:hiddenLine xmlns:a14="http://schemas.microsoft.com/office/drawing/2010/main" xmlns="" w="9525">
                   <a:solidFill>
                     <a:srgbClr val="000000"/>
                   </a:solidFill>
@@ -2240,7 +2240,7 @@
             </a:ln>
             <a:extLst>
               <a:ext uri="{91240B29-F687-4f45-9708-019B960494DF}">
-                <a14:hiddenLine xmlns="" xmlns:a14="http://schemas.microsoft.com/office/drawing/2010/main" w="9525">
+                <a14:hiddenLine xmlns:a14="http://schemas.microsoft.com/office/drawing/2010/main" xmlns="" w="9525">
                   <a:solidFill>
                     <a:srgbClr val="000000"/>
                   </a:solidFill>
@@ -2302,7 +2302,7 @@
             </a:ln>
             <a:extLst>
               <a:ext uri="{91240B29-F687-4f45-9708-019B960494DF}">
-                <a14:hiddenLine xmlns="" xmlns:a14="http://schemas.microsoft.com/office/drawing/2010/main" w="9525">
+                <a14:hiddenLine xmlns:a14="http://schemas.microsoft.com/office/drawing/2010/main" xmlns="" w="9525">
                   <a:solidFill>
                     <a:srgbClr val="000000"/>
                   </a:solidFill>
@@ -2392,7 +2392,7 @@
             </a:ln>
             <a:extLst>
               <a:ext uri="{91240B29-F687-4f45-9708-019B960494DF}">
-                <a14:hiddenLine xmlns="" xmlns:a14="http://schemas.microsoft.com/office/drawing/2010/main" w="9525">
+                <a14:hiddenLine xmlns:a14="http://schemas.microsoft.com/office/drawing/2010/main" xmlns="" w="9525">
                   <a:solidFill>
                     <a:srgbClr val="000000"/>
                   </a:solidFill>
@@ -2482,7 +2482,7 @@
             </a:ln>
             <a:extLst>
               <a:ext uri="{91240B29-F687-4f45-9708-019B960494DF}">
-                <a14:hiddenLine xmlns="" xmlns:a14="http://schemas.microsoft.com/office/drawing/2010/main" w="9525">
+                <a14:hiddenLine xmlns:a14="http://schemas.microsoft.com/office/drawing/2010/main" xmlns="" w="9525">
                   <a:solidFill>
                     <a:srgbClr val="000000"/>
                   </a:solidFill>
@@ -2544,7 +2544,7 @@
             </a:ln>
             <a:extLst>
               <a:ext uri="{91240B29-F687-4f45-9708-019B960494DF}">
-                <a14:hiddenLine xmlns="" xmlns:a14="http://schemas.microsoft.com/office/drawing/2010/main" w="9525">
+                <a14:hiddenLine xmlns:a14="http://schemas.microsoft.com/office/drawing/2010/main" xmlns="" w="9525">
                   <a:solidFill>
                     <a:srgbClr val="000000"/>
                   </a:solidFill>
@@ -2634,7 +2634,7 @@
             </a:ln>
             <a:extLst>
               <a:ext uri="{91240B29-F687-4f45-9708-019B960494DF}">
-                <a14:hiddenLine xmlns="" xmlns:a14="http://schemas.microsoft.com/office/drawing/2010/main" w="9525">
+                <a14:hiddenLine xmlns:a14="http://schemas.microsoft.com/office/drawing/2010/main" xmlns="" w="9525">
                   <a:solidFill>
                     <a:srgbClr val="000000"/>
                   </a:solidFill>
@@ -2724,7 +2724,7 @@
             </a:ln>
             <a:extLst>
               <a:ext uri="{91240B29-F687-4f45-9708-019B960494DF}">
-                <a14:hiddenLine xmlns="" xmlns:a14="http://schemas.microsoft.com/office/drawing/2010/main" w="9525">
+                <a14:hiddenLine xmlns:a14="http://schemas.microsoft.com/office/drawing/2010/main" xmlns="" w="9525">
                   <a:solidFill>
                     <a:srgbClr val="000000"/>
                   </a:solidFill>
@@ -2780,7 +2780,7 @@
             </a:ln>
             <a:extLst>
               <a:ext uri="{91240B29-F687-4f45-9708-019B960494DF}">
-                <a14:hiddenLine xmlns="" xmlns:a14="http://schemas.microsoft.com/office/drawing/2010/main" w="9525">
+                <a14:hiddenLine xmlns:a14="http://schemas.microsoft.com/office/drawing/2010/main" xmlns="" w="9525">
                   <a:solidFill>
                     <a:srgbClr val="000000"/>
                   </a:solidFill>
@@ -2870,7 +2870,7 @@
             </a:ln>
             <a:extLst>
               <a:ext uri="{91240B29-F687-4f45-9708-019B960494DF}">
-                <a14:hiddenLine xmlns="" xmlns:a14="http://schemas.microsoft.com/office/drawing/2010/main" w="9525">
+                <a14:hiddenLine xmlns:a14="http://schemas.microsoft.com/office/drawing/2010/main" xmlns="" w="9525">
                   <a:solidFill>
                     <a:srgbClr val="000000"/>
                   </a:solidFill>
@@ -2926,7 +2926,7 @@
             </a:ln>
             <a:extLst>
               <a:ext uri="{91240B29-F687-4f45-9708-019B960494DF}">
-                <a14:hiddenLine xmlns="" xmlns:a14="http://schemas.microsoft.com/office/drawing/2010/main" w="9525">
+                <a14:hiddenLine xmlns:a14="http://schemas.microsoft.com/office/drawing/2010/main" xmlns="" w="9525">
                   <a:solidFill>
                     <a:srgbClr val="000000"/>
                   </a:solidFill>
@@ -3016,7 +3016,7 @@
             </a:ln>
             <a:extLst>
               <a:ext uri="{91240B29-F687-4f45-9708-019B960494DF}">
-                <a14:hiddenLine xmlns="" xmlns:a14="http://schemas.microsoft.com/office/drawing/2010/main" w="9525">
+                <a14:hiddenLine xmlns:a14="http://schemas.microsoft.com/office/drawing/2010/main" xmlns="" w="9525">
                   <a:solidFill>
                     <a:srgbClr val="000000"/>
                   </a:solidFill>
@@ -3084,7 +3084,7 @@
             </a:ln>
             <a:extLst>
               <a:ext uri="{91240B29-F687-4f45-9708-019B960494DF}">
-                <a14:hiddenLine xmlns="" xmlns:a14="http://schemas.microsoft.com/office/drawing/2010/main" w="9525">
+                <a14:hiddenLine xmlns:a14="http://schemas.microsoft.com/office/drawing/2010/main" xmlns="" w="9525">
                   <a:solidFill>
                     <a:srgbClr val="000000"/>
                   </a:solidFill>
@@ -3174,7 +3174,7 @@
             </a:ln>
             <a:extLst>
               <a:ext uri="{91240B29-F687-4f45-9708-019B960494DF}">
-                <a14:hiddenLine xmlns="" xmlns:a14="http://schemas.microsoft.com/office/drawing/2010/main" w="9525">
+                <a14:hiddenLine xmlns:a14="http://schemas.microsoft.com/office/drawing/2010/main" xmlns="" w="9525">
                   <a:solidFill>
                     <a:srgbClr val="000000"/>
                   </a:solidFill>
@@ -3242,7 +3242,7 @@
             </a:ln>
             <a:extLst>
               <a:ext uri="{91240B29-F687-4f45-9708-019B960494DF}">
-                <a14:hiddenLine xmlns="" xmlns:a14="http://schemas.microsoft.com/office/drawing/2010/main" w="9525">
+                <a14:hiddenLine xmlns:a14="http://schemas.microsoft.com/office/drawing/2010/main" xmlns="" w="9525">
                   <a:solidFill>
                     <a:srgbClr val="000000"/>
                   </a:solidFill>
@@ -3332,7 +3332,7 @@
             </a:ln>
             <a:extLst>
               <a:ext uri="{91240B29-F687-4f45-9708-019B960494DF}">
-                <a14:hiddenLine xmlns="" xmlns:a14="http://schemas.microsoft.com/office/drawing/2010/main" w="9525">
+                <a14:hiddenLine xmlns:a14="http://schemas.microsoft.com/office/drawing/2010/main" xmlns="" w="9525">
                   <a:solidFill>
                     <a:srgbClr val="000000"/>
                   </a:solidFill>
@@ -3366,7 +3366,7 @@
             </a:ln>
             <a:extLst>
               <a:ext uri="{91240B29-F687-4f45-9708-019B960494DF}">
-                <a14:hiddenLine xmlns="" xmlns:a14="http://schemas.microsoft.com/office/drawing/2010/main" w="9525">
+                <a14:hiddenLine xmlns:a14="http://schemas.microsoft.com/office/drawing/2010/main" xmlns="" w="9525">
                   <a:solidFill>
                     <a:srgbClr val="000000"/>
                   </a:solidFill>
@@ -3456,7 +3456,7 @@
             </a:ln>
             <a:extLst>
               <a:ext uri="{91240B29-F687-4f45-9708-019B960494DF}">
-                <a14:hiddenLine xmlns="" xmlns:a14="http://schemas.microsoft.com/office/drawing/2010/main" w="9525">
+                <a14:hiddenLine xmlns:a14="http://schemas.microsoft.com/office/drawing/2010/main" xmlns="" w="9525">
                   <a:solidFill>
                     <a:srgbClr val="000000"/>
                   </a:solidFill>
@@ -3518,7 +3518,7 @@
             </a:ln>
             <a:extLst>
               <a:ext uri="{91240B29-F687-4f45-9708-019B960494DF}">
-                <a14:hiddenLine xmlns="" xmlns:a14="http://schemas.microsoft.com/office/drawing/2010/main" w="9525">
+                <a14:hiddenLine xmlns:a14="http://schemas.microsoft.com/office/drawing/2010/main" xmlns="" w="9525">
                   <a:solidFill>
                     <a:srgbClr val="000000"/>
                   </a:solidFill>
@@ -3580,7 +3580,7 @@
             </a:ln>
             <a:extLst>
               <a:ext uri="{91240B29-F687-4f45-9708-019B960494DF}">
-                <a14:hiddenLine xmlns="" xmlns:a14="http://schemas.microsoft.com/office/drawing/2010/main" w="9525">
+                <a14:hiddenLine xmlns:a14="http://schemas.microsoft.com/office/drawing/2010/main" xmlns="" w="9525">
                   <a:solidFill>
                     <a:srgbClr val="000000"/>
                   </a:solidFill>
@@ -3670,7 +3670,7 @@
             </a:ln>
             <a:extLst>
               <a:ext uri="{91240B29-F687-4f45-9708-019B960494DF}">
-                <a14:hiddenLine xmlns="" xmlns:a14="http://schemas.microsoft.com/office/drawing/2010/main" w="9525">
+                <a14:hiddenLine xmlns:a14="http://schemas.microsoft.com/office/drawing/2010/main" xmlns="" w="9525">
                   <a:solidFill>
                     <a:srgbClr val="000000"/>
                   </a:solidFill>
@@ -3738,7 +3738,7 @@
             </a:ln>
             <a:extLst>
               <a:ext uri="{91240B29-F687-4f45-9708-019B960494DF}">
-                <a14:hiddenLine xmlns="" xmlns:a14="http://schemas.microsoft.com/office/drawing/2010/main" w="9525">
+                <a14:hiddenLine xmlns:a14="http://schemas.microsoft.com/office/drawing/2010/main" xmlns="" w="9525">
                   <a:solidFill>
                     <a:srgbClr val="000000"/>
                   </a:solidFill>
@@ -3800,7 +3800,7 @@
             </a:ln>
             <a:extLst>
               <a:ext uri="{91240B29-F687-4f45-9708-019B960494DF}">
-                <a14:hiddenLine xmlns="" xmlns:a14="http://schemas.microsoft.com/office/drawing/2010/main" w="9525">
+                <a14:hiddenLine xmlns:a14="http://schemas.microsoft.com/office/drawing/2010/main" xmlns="" w="9525">
                   <a:solidFill>
                     <a:srgbClr val="000000"/>
                   </a:solidFill>
@@ -3890,7 +3890,7 @@
             </a:ln>
             <a:extLst>
               <a:ext uri="{91240B29-F687-4f45-9708-019B960494DF}">
-                <a14:hiddenLine xmlns="" xmlns:a14="http://schemas.microsoft.com/office/drawing/2010/main" w="9525">
+                <a14:hiddenLine xmlns:a14="http://schemas.microsoft.com/office/drawing/2010/main" xmlns="" w="9525">
                   <a:solidFill>
                     <a:srgbClr val="000000"/>
                   </a:solidFill>
@@ -3952,7 +3952,7 @@
             </a:ln>
             <a:extLst>
               <a:ext uri="{91240B29-F687-4f45-9708-019B960494DF}">
-                <a14:hiddenLine xmlns="" xmlns:a14="http://schemas.microsoft.com/office/drawing/2010/main" w="9525">
+                <a14:hiddenLine xmlns:a14="http://schemas.microsoft.com/office/drawing/2010/main" xmlns="" w="9525">
                   <a:solidFill>
                     <a:srgbClr val="000000"/>
                   </a:solidFill>
@@ -4042,7 +4042,7 @@
             </a:ln>
             <a:extLst>
               <a:ext uri="{91240B29-F687-4f45-9708-019B960494DF}">
-                <a14:hiddenLine xmlns="" xmlns:a14="http://schemas.microsoft.com/office/drawing/2010/main" w="9525">
+                <a14:hiddenLine xmlns:a14="http://schemas.microsoft.com/office/drawing/2010/main" xmlns="" w="9525">
                   <a:solidFill>
                     <a:srgbClr val="000000"/>
                   </a:solidFill>
@@ -4104,7 +4104,7 @@
             </a:ln>
             <a:extLst>
               <a:ext uri="{91240B29-F687-4f45-9708-019B960494DF}">
-                <a14:hiddenLine xmlns="" xmlns:a14="http://schemas.microsoft.com/office/drawing/2010/main" w="9525">
+                <a14:hiddenLine xmlns:a14="http://schemas.microsoft.com/office/drawing/2010/main" xmlns="" w="9525">
                   <a:solidFill>
                     <a:srgbClr val="000000"/>
                   </a:solidFill>
@@ -4194,7 +4194,7 @@
             </a:ln>
             <a:extLst>
               <a:ext uri="{91240B29-F687-4f45-9708-019B960494DF}">
-                <a14:hiddenLine xmlns="" xmlns:a14="http://schemas.microsoft.com/office/drawing/2010/main" w="9525">
+                <a14:hiddenLine xmlns:a14="http://schemas.microsoft.com/office/drawing/2010/main" xmlns="" w="9525">
                   <a:solidFill>
                     <a:srgbClr val="000000"/>
                   </a:solidFill>
@@ -4228,7 +4228,7 @@
             </a:ln>
             <a:extLst>
               <a:ext uri="{91240B29-F687-4f45-9708-019B960494DF}">
-                <a14:hiddenLine xmlns="" xmlns:a14="http://schemas.microsoft.com/office/drawing/2010/main" w="9525">
+                <a14:hiddenLine xmlns:a14="http://schemas.microsoft.com/office/drawing/2010/main" xmlns="" w="9525">
                   <a:solidFill>
                     <a:srgbClr val="000000"/>
                   </a:solidFill>
@@ -4293,7 +4293,7 @@
             </a:ln>
             <a:extLst>
               <a:ext uri="{91240B29-F687-4f45-9708-019B960494DF}">
-                <a14:hiddenLine xmlns="" xmlns:a14="http://schemas.microsoft.com/office/drawing/2010/main" w="9525">
+                <a14:hiddenLine xmlns:a14="http://schemas.microsoft.com/office/drawing/2010/main" xmlns="" w="9525">
                   <a:solidFill>
                     <a:srgbClr val="000000"/>
                   </a:solidFill>
@@ -4383,7 +4383,7 @@
             </a:ln>
             <a:extLst>
               <a:ext uri="{91240B29-F687-4f45-9708-019B960494DF}">
-                <a14:hiddenLine xmlns="" xmlns:a14="http://schemas.microsoft.com/office/drawing/2010/main" w="9525">
+                <a14:hiddenLine xmlns:a14="http://schemas.microsoft.com/office/drawing/2010/main" xmlns="" w="9525">
                   <a:solidFill>
                     <a:srgbClr val="000000"/>
                   </a:solidFill>
@@ -4445,7 +4445,7 @@
             </a:ln>
             <a:extLst>
               <a:ext uri="{91240B29-F687-4f45-9708-019B960494DF}">
-                <a14:hiddenLine xmlns="" xmlns:a14="http://schemas.microsoft.com/office/drawing/2010/main" w="9525">
+                <a14:hiddenLine xmlns:a14="http://schemas.microsoft.com/office/drawing/2010/main" xmlns="" w="9525">
                   <a:solidFill>
                     <a:srgbClr val="000000"/>
                   </a:solidFill>
@@ -4535,7 +4535,7 @@
             </a:ln>
             <a:extLst>
               <a:ext uri="{91240B29-F687-4f45-9708-019B960494DF}">
-                <a14:hiddenLine xmlns="" xmlns:a14="http://schemas.microsoft.com/office/drawing/2010/main" w="9525">
+                <a14:hiddenLine xmlns:a14="http://schemas.microsoft.com/office/drawing/2010/main" xmlns="" w="9525">
                   <a:solidFill>
                     <a:srgbClr val="000000"/>
                   </a:solidFill>
@@ -4625,7 +4625,7 @@
             </a:ln>
             <a:extLst>
               <a:ext uri="{91240B29-F687-4f45-9708-019B960494DF}">
-                <a14:hiddenLine xmlns="" xmlns:a14="http://schemas.microsoft.com/office/drawing/2010/main" w="9525">
+                <a14:hiddenLine xmlns:a14="http://schemas.microsoft.com/office/drawing/2010/main" xmlns="" w="9525">
                   <a:solidFill>
                     <a:srgbClr val="000000"/>
                   </a:solidFill>
@@ -4690,7 +4690,7 @@
             </a:ln>
             <a:extLst>
               <a:ext uri="{91240B29-F687-4f45-9708-019B960494DF}">
-                <a14:hiddenLine xmlns="" xmlns:a14="http://schemas.microsoft.com/office/drawing/2010/main" w="9525">
+                <a14:hiddenLine xmlns:a14="http://schemas.microsoft.com/office/drawing/2010/main" xmlns="" w="9525">
                   <a:solidFill>
                     <a:srgbClr val="000000"/>
                   </a:solidFill>
@@ -4752,7 +4752,7 @@
             </a:ln>
             <a:extLst>
               <a:ext uri="{91240B29-F687-4f45-9708-019B960494DF}">
-                <a14:hiddenLine xmlns="" xmlns:a14="http://schemas.microsoft.com/office/drawing/2010/main" w="9525">
+                <a14:hiddenLine xmlns:a14="http://schemas.microsoft.com/office/drawing/2010/main" xmlns="" w="9525">
                   <a:solidFill>
                     <a:srgbClr val="000000"/>
                   </a:solidFill>
@@ -4842,7 +4842,7 @@
             </a:ln>
             <a:extLst>
               <a:ext uri="{91240B29-F687-4f45-9708-019B960494DF}">
-                <a14:hiddenLine xmlns="" xmlns:a14="http://schemas.microsoft.com/office/drawing/2010/main" w="9525">
+                <a14:hiddenLine xmlns:a14="http://schemas.microsoft.com/office/drawing/2010/main" xmlns="" w="9525">
                   <a:solidFill>
                     <a:srgbClr val="000000"/>
                   </a:solidFill>
@@ -4932,7 +4932,7 @@
             </a:ln>
             <a:extLst>
               <a:ext uri="{91240B29-F687-4f45-9708-019B960494DF}">
-                <a14:hiddenLine xmlns="" xmlns:a14="http://schemas.microsoft.com/office/drawing/2010/main" w="9525">
+                <a14:hiddenLine xmlns:a14="http://schemas.microsoft.com/office/drawing/2010/main" xmlns="" w="9525">
                   <a:solidFill>
                     <a:srgbClr val="000000"/>
                   </a:solidFill>
@@ -4994,7 +4994,7 @@
             </a:ln>
             <a:extLst>
               <a:ext uri="{91240B29-F687-4f45-9708-019B960494DF}">
-                <a14:hiddenLine xmlns="" xmlns:a14="http://schemas.microsoft.com/office/drawing/2010/main" w="9525">
+                <a14:hiddenLine xmlns:a14="http://schemas.microsoft.com/office/drawing/2010/main" xmlns="" w="9525">
                   <a:solidFill>
                     <a:srgbClr val="000000"/>
                   </a:solidFill>
@@ -5114,7 +5114,7 @@
             </a:ln>
             <a:extLst>
               <a:ext uri="{91240B29-F687-4f45-9708-019B960494DF}">
-                <a14:hiddenLine xmlns="" xmlns:a14="http://schemas.microsoft.com/office/drawing/2010/main" w="9525">
+                <a14:hiddenLine xmlns:a14="http://schemas.microsoft.com/office/drawing/2010/main" xmlns="" w="9525">
                   <a:solidFill>
                     <a:srgbClr val="000000"/>
                   </a:solidFill>
@@ -5182,7 +5182,7 @@
             </a:ln>
             <a:extLst>
               <a:ext uri="{91240B29-F687-4f45-9708-019B960494DF}">
-                <a14:hiddenLine xmlns="" xmlns:a14="http://schemas.microsoft.com/office/drawing/2010/main" w="9525">
+                <a14:hiddenLine xmlns:a14="http://schemas.microsoft.com/office/drawing/2010/main" xmlns="" w="9525">
                   <a:solidFill>
                     <a:srgbClr val="000000"/>
                   </a:solidFill>
@@ -5272,7 +5272,7 @@
             </a:ln>
             <a:extLst>
               <a:ext uri="{91240B29-F687-4f45-9708-019B960494DF}">
-                <a14:hiddenLine xmlns="" xmlns:a14="http://schemas.microsoft.com/office/drawing/2010/main" w="9525">
+                <a14:hiddenLine xmlns:a14="http://schemas.microsoft.com/office/drawing/2010/main" xmlns="" w="9525">
                   <a:solidFill>
                     <a:srgbClr val="000000"/>
                   </a:solidFill>
@@ -5412,7 +5412,7 @@
           <a:p>
             <a:fld id="{48A87A34-81AB-432B-8DAE-1953F412C126}" type="datetimeFigureOut">
               <a:rPr lang="en-US" dirty="0"/>
-              <a:t>2/28/19</a:t>
+              <a:t>2/28/2019</a:t>
             </a:fld>
             <a:endParaRPr lang="en-US" dirty="0"/>
           </a:p>
@@ -5674,7 +5674,7 @@
           <a:p>
             <a:fld id="{48A87A34-81AB-432B-8DAE-1953F412C126}" type="datetimeFigureOut">
               <a:rPr lang="en-US" dirty="0"/>
-              <a:t>2/28/19</a:t>
+              <a:t>2/28/2019</a:t>
             </a:fld>
             <a:endParaRPr lang="en-US" dirty="0"/>
           </a:p>
@@ -5865,7 +5865,7 @@
           <a:p>
             <a:fld id="{48A87A34-81AB-432B-8DAE-1953F412C126}" type="datetimeFigureOut">
               <a:rPr lang="en-US" dirty="0"/>
-              <a:t>2/28/19</a:t>
+              <a:t>2/28/2019</a:t>
             </a:fld>
             <a:endParaRPr lang="en-US" dirty="0"/>
           </a:p>
@@ -6123,7 +6123,7 @@
           <a:p>
             <a:fld id="{48A87A34-81AB-432B-8DAE-1953F412C126}" type="datetimeFigureOut">
               <a:rPr lang="en-US" dirty="0"/>
-              <a:t>2/28/19</a:t>
+              <a:t>2/28/2019</a:t>
             </a:fld>
             <a:endParaRPr lang="en-US" dirty="0"/>
           </a:p>
@@ -6552,7 +6552,7 @@
           <a:p>
             <a:fld id="{48A87A34-81AB-432B-8DAE-1953F412C126}" type="datetimeFigureOut">
               <a:rPr lang="en-US" dirty="0"/>
-              <a:t>2/28/19</a:t>
+              <a:t>2/28/2019</a:t>
             </a:fld>
             <a:endParaRPr lang="en-US" dirty="0"/>
           </a:p>
@@ -7093,7 +7093,7 @@
           <a:p>
             <a:fld id="{48A87A34-81AB-432B-8DAE-1953F412C126}" type="datetimeFigureOut">
               <a:rPr lang="en-US" dirty="0"/>
-              <a:t>2/28/19</a:t>
+              <a:t>2/28/2019</a:t>
             </a:fld>
             <a:endParaRPr lang="en-US" dirty="0"/>
           </a:p>
@@ -7808,7 +7808,7 @@
           <a:p>
             <a:fld id="{48A87A34-81AB-432B-8DAE-1953F412C126}" type="datetimeFigureOut">
               <a:rPr lang="en-US" dirty="0"/>
-              <a:t>2/28/19</a:t>
+              <a:t>2/28/2019</a:t>
             </a:fld>
             <a:endParaRPr lang="en-US" dirty="0"/>
           </a:p>
@@ -7973,7 +7973,7 @@
           <a:p>
             <a:fld id="{48A87A34-81AB-432B-8DAE-1953F412C126}" type="datetimeFigureOut">
               <a:rPr lang="en-US" dirty="0"/>
-              <a:t>2/28/19</a:t>
+              <a:t>2/28/2019</a:t>
             </a:fld>
             <a:endParaRPr lang="en-US" dirty="0"/>
           </a:p>
@@ -8148,7 +8148,7 @@
           <a:p>
             <a:fld id="{48A87A34-81AB-432B-8DAE-1953F412C126}" type="datetimeFigureOut">
               <a:rPr lang="en-US" dirty="0"/>
-              <a:t>2/28/19</a:t>
+              <a:t>2/28/2019</a:t>
             </a:fld>
             <a:endParaRPr lang="en-US" dirty="0"/>
           </a:p>
@@ -8313,7 +8313,7 @@
           <a:p>
             <a:fld id="{48A87A34-81AB-432B-8DAE-1953F412C126}" type="datetimeFigureOut">
               <a:rPr lang="en-US" dirty="0"/>
-              <a:t>2/28/19</a:t>
+              <a:t>2/28/2019</a:t>
             </a:fld>
             <a:endParaRPr lang="en-US" dirty="0"/>
           </a:p>
@@ -8558,7 +8558,7 @@
           <a:p>
             <a:fld id="{48A87A34-81AB-432B-8DAE-1953F412C126}" type="datetimeFigureOut">
               <a:rPr lang="en-US" dirty="0"/>
-              <a:t>2/28/19</a:t>
+              <a:t>2/28/2019</a:t>
             </a:fld>
             <a:endParaRPr lang="en-US" dirty="0"/>
           </a:p>
@@ -8785,7 +8785,7 @@
           <a:p>
             <a:fld id="{48A87A34-81AB-432B-8DAE-1953F412C126}" type="datetimeFigureOut">
               <a:rPr lang="en-US" dirty="0"/>
-              <a:t>2/28/19</a:t>
+              <a:t>2/28/2019</a:t>
             </a:fld>
             <a:endParaRPr lang="en-US" dirty="0"/>
           </a:p>
@@ -9161,7 +9161,7 @@
           <a:p>
             <a:fld id="{48A87A34-81AB-432B-8DAE-1953F412C126}" type="datetimeFigureOut">
               <a:rPr lang="en-US" dirty="0"/>
-              <a:t>2/28/19</a:t>
+              <a:t>2/28/2019</a:t>
             </a:fld>
             <a:endParaRPr lang="en-US" dirty="0"/>
           </a:p>
@@ -9274,7 +9274,7 @@
           <a:p>
             <a:fld id="{48A87A34-81AB-432B-8DAE-1953F412C126}" type="datetimeFigureOut">
               <a:rPr lang="en-US" dirty="0"/>
-              <a:t>2/28/19</a:t>
+              <a:t>2/28/2019</a:t>
             </a:fld>
             <a:endParaRPr lang="en-US" dirty="0"/>
           </a:p>
@@ -9364,7 +9364,7 @@
           <a:p>
             <a:fld id="{48A87A34-81AB-432B-8DAE-1953F412C126}" type="datetimeFigureOut">
               <a:rPr lang="en-US" dirty="0"/>
-              <a:t>2/28/19</a:t>
+              <a:t>2/28/2019</a:t>
             </a:fld>
             <a:endParaRPr lang="en-US" dirty="0"/>
           </a:p>
@@ -9608,7 +9608,7 @@
           <a:p>
             <a:fld id="{48A87A34-81AB-432B-8DAE-1953F412C126}" type="datetimeFigureOut">
               <a:rPr lang="en-US" dirty="0"/>
-              <a:t>2/28/19</a:t>
+              <a:t>2/28/2019</a:t>
             </a:fld>
             <a:endParaRPr lang="en-US" dirty="0"/>
           </a:p>
@@ -9883,7 +9883,7 @@
           <a:p>
             <a:fld id="{48A87A34-81AB-432B-8DAE-1953F412C126}" type="datetimeFigureOut">
               <a:rPr lang="en-US" dirty="0"/>
-              <a:t>2/28/19</a:t>
+              <a:t>2/28/2019</a:t>
             </a:fld>
             <a:endParaRPr lang="en-US" dirty="0"/>
           </a:p>
@@ -10001,7 +10001,7 @@
           <a:noFill/>
           <a:extLst>
             <a:ext uri="{909E8E84-426E-40dd-AFC4-6F175D3DCCD1}">
-              <a14:hiddenFill xmlns="" xmlns:a14="http://schemas.microsoft.com/office/drawing/2010/main">
+              <a14:hiddenFill xmlns:a14="http://schemas.microsoft.com/office/drawing/2010/main" xmlns="">
                 <a:solidFill>
                   <a:srgbClr val="FFFFFF"/>
                 </a:solidFill>
@@ -10075,7 +10075,7 @@
               </a:ln>
               <a:extLst>
                 <a:ext uri="{91240B29-F687-4f45-9708-019B960494DF}">
-                  <a14:hiddenLine xmlns="" xmlns:a14="http://schemas.microsoft.com/office/drawing/2010/main" w="9525">
+                  <a14:hiddenLine xmlns:a14="http://schemas.microsoft.com/office/drawing/2010/main" xmlns="" w="9525">
                     <a:solidFill>
                       <a:srgbClr val="000000"/>
                     </a:solidFill>
@@ -10165,7 +10165,7 @@
               </a:ln>
               <a:extLst>
                 <a:ext uri="{91240B29-F687-4f45-9708-019B960494DF}">
-                  <a14:hiddenLine xmlns="" xmlns:a14="http://schemas.microsoft.com/office/drawing/2010/main" w="9525">
+                  <a14:hiddenLine xmlns:a14="http://schemas.microsoft.com/office/drawing/2010/main" xmlns="" w="9525">
                     <a:solidFill>
                       <a:srgbClr val="000000"/>
                     </a:solidFill>
@@ -10255,7 +10255,7 @@
               </a:ln>
               <a:extLst>
                 <a:ext uri="{91240B29-F687-4f45-9708-019B960494DF}">
-                  <a14:hiddenLine xmlns="" xmlns:a14="http://schemas.microsoft.com/office/drawing/2010/main" w="9525">
+                  <a14:hiddenLine xmlns:a14="http://schemas.microsoft.com/office/drawing/2010/main" xmlns="" w="9525">
                     <a:solidFill>
                       <a:srgbClr val="000000"/>
                     </a:solidFill>
@@ -10317,7 +10317,7 @@
               </a:ln>
               <a:extLst>
                 <a:ext uri="{91240B29-F687-4f45-9708-019B960494DF}">
-                  <a14:hiddenLine xmlns="" xmlns:a14="http://schemas.microsoft.com/office/drawing/2010/main" w="9525">
+                  <a14:hiddenLine xmlns:a14="http://schemas.microsoft.com/office/drawing/2010/main" xmlns="" w="9525">
                     <a:solidFill>
                       <a:srgbClr val="000000"/>
                     </a:solidFill>
@@ -10407,7 +10407,7 @@
               </a:ln>
               <a:extLst>
                 <a:ext uri="{91240B29-F687-4f45-9708-019B960494DF}">
-                  <a14:hiddenLine xmlns="" xmlns:a14="http://schemas.microsoft.com/office/drawing/2010/main" w="9525">
+                  <a14:hiddenLine xmlns:a14="http://schemas.microsoft.com/office/drawing/2010/main" xmlns="" w="9525">
                     <a:solidFill>
                       <a:srgbClr val="000000"/>
                     </a:solidFill>
@@ -10469,7 +10469,7 @@
               </a:ln>
               <a:extLst>
                 <a:ext uri="{91240B29-F687-4f45-9708-019B960494DF}">
-                  <a14:hiddenLine xmlns="" xmlns:a14="http://schemas.microsoft.com/office/drawing/2010/main" w="9525">
+                  <a14:hiddenLine xmlns:a14="http://schemas.microsoft.com/office/drawing/2010/main" xmlns="" w="9525">
                     <a:solidFill>
                       <a:srgbClr val="000000"/>
                     </a:solidFill>
@@ -10531,7 +10531,7 @@
               </a:ln>
               <a:extLst>
                 <a:ext uri="{91240B29-F687-4f45-9708-019B960494DF}">
-                  <a14:hiddenLine xmlns="" xmlns:a14="http://schemas.microsoft.com/office/drawing/2010/main" w="9525">
+                  <a14:hiddenLine xmlns:a14="http://schemas.microsoft.com/office/drawing/2010/main" xmlns="" w="9525">
                     <a:solidFill>
                       <a:srgbClr val="000000"/>
                     </a:solidFill>
@@ -10621,7 +10621,7 @@
               </a:ln>
               <a:extLst>
                 <a:ext uri="{91240B29-F687-4f45-9708-019B960494DF}">
-                  <a14:hiddenLine xmlns="" xmlns:a14="http://schemas.microsoft.com/office/drawing/2010/main" w="9525">
+                  <a14:hiddenLine xmlns:a14="http://schemas.microsoft.com/office/drawing/2010/main" xmlns="" w="9525">
                     <a:solidFill>
                       <a:srgbClr val="000000"/>
                     </a:solidFill>
@@ -10711,7 +10711,7 @@
               </a:ln>
               <a:extLst>
                 <a:ext uri="{91240B29-F687-4f45-9708-019B960494DF}">
-                  <a14:hiddenLine xmlns="" xmlns:a14="http://schemas.microsoft.com/office/drawing/2010/main" w="9525">
+                  <a14:hiddenLine xmlns:a14="http://schemas.microsoft.com/office/drawing/2010/main" xmlns="" w="9525">
                     <a:solidFill>
                       <a:srgbClr val="000000"/>
                     </a:solidFill>
@@ -10773,7 +10773,7 @@
               </a:ln>
               <a:extLst>
                 <a:ext uri="{91240B29-F687-4f45-9708-019B960494DF}">
-                  <a14:hiddenLine xmlns="" xmlns:a14="http://schemas.microsoft.com/office/drawing/2010/main" w="9525">
+                  <a14:hiddenLine xmlns:a14="http://schemas.microsoft.com/office/drawing/2010/main" xmlns="" w="9525">
                     <a:solidFill>
                       <a:srgbClr val="000000"/>
                     </a:solidFill>
@@ -10883,7 +10883,7 @@
               </a:ln>
               <a:extLst>
                 <a:ext uri="{91240B29-F687-4f45-9708-019B960494DF}">
-                  <a14:hiddenLine xmlns="" xmlns:a14="http://schemas.microsoft.com/office/drawing/2010/main" w="9525">
+                  <a14:hiddenLine xmlns:a14="http://schemas.microsoft.com/office/drawing/2010/main" xmlns="" w="9525">
                     <a:solidFill>
                       <a:srgbClr val="000000"/>
                     </a:solidFill>
@@ -10967,7 +10967,7 @@
               </a:ln>
               <a:extLst>
                 <a:ext uri="{91240B29-F687-4f45-9708-019B960494DF}">
-                  <a14:hiddenLine xmlns="" xmlns:a14="http://schemas.microsoft.com/office/drawing/2010/main" w="9525">
+                  <a14:hiddenLine xmlns:a14="http://schemas.microsoft.com/office/drawing/2010/main" xmlns="" w="9525">
                     <a:solidFill>
                       <a:srgbClr val="000000"/>
                     </a:solidFill>
@@ -11029,7 +11029,7 @@
               </a:ln>
               <a:extLst>
                 <a:ext uri="{91240B29-F687-4f45-9708-019B960494DF}">
-                  <a14:hiddenLine xmlns="" xmlns:a14="http://schemas.microsoft.com/office/drawing/2010/main" w="9525">
+                  <a14:hiddenLine xmlns:a14="http://schemas.microsoft.com/office/drawing/2010/main" xmlns="" w="9525">
                     <a:solidFill>
                       <a:srgbClr val="000000"/>
                     </a:solidFill>
@@ -11091,7 +11091,7 @@
               </a:ln>
               <a:extLst>
                 <a:ext uri="{91240B29-F687-4f45-9708-019B960494DF}">
-                  <a14:hiddenLine xmlns="" xmlns:a14="http://schemas.microsoft.com/office/drawing/2010/main" w="9525">
+                  <a14:hiddenLine xmlns:a14="http://schemas.microsoft.com/office/drawing/2010/main" xmlns="" w="9525">
                     <a:solidFill>
                       <a:srgbClr val="000000"/>
                     </a:solidFill>
@@ -11181,7 +11181,7 @@
               </a:ln>
               <a:extLst>
                 <a:ext uri="{91240B29-F687-4f45-9708-019B960494DF}">
-                  <a14:hiddenLine xmlns="" xmlns:a14="http://schemas.microsoft.com/office/drawing/2010/main" w="9525">
+                  <a14:hiddenLine xmlns:a14="http://schemas.microsoft.com/office/drawing/2010/main" xmlns="" w="9525">
                     <a:solidFill>
                       <a:srgbClr val="000000"/>
                     </a:solidFill>
@@ -11215,7 +11215,7 @@
               </a:ln>
               <a:extLst>
                 <a:ext uri="{91240B29-F687-4f45-9708-019B960494DF}">
-                  <a14:hiddenLine xmlns="" xmlns:a14="http://schemas.microsoft.com/office/drawing/2010/main" w="9525">
+                  <a14:hiddenLine xmlns:a14="http://schemas.microsoft.com/office/drawing/2010/main" xmlns="" w="9525">
                     <a:solidFill>
                       <a:srgbClr val="000000"/>
                     </a:solidFill>
@@ -11280,7 +11280,7 @@
               </a:ln>
               <a:extLst>
                 <a:ext uri="{91240B29-F687-4f45-9708-019B960494DF}">
-                  <a14:hiddenLine xmlns="" xmlns:a14="http://schemas.microsoft.com/office/drawing/2010/main" w="9525">
+                  <a14:hiddenLine xmlns:a14="http://schemas.microsoft.com/office/drawing/2010/main" xmlns="" w="9525">
                     <a:solidFill>
                       <a:srgbClr val="000000"/>
                     </a:solidFill>
@@ -11370,7 +11370,7 @@
               </a:ln>
               <a:extLst>
                 <a:ext uri="{91240B29-F687-4f45-9708-019B960494DF}">
-                  <a14:hiddenLine xmlns="" xmlns:a14="http://schemas.microsoft.com/office/drawing/2010/main" w="9525">
+                  <a14:hiddenLine xmlns:a14="http://schemas.microsoft.com/office/drawing/2010/main" xmlns="" w="9525">
                     <a:solidFill>
                       <a:srgbClr val="000000"/>
                     </a:solidFill>
@@ -11432,7 +11432,7 @@
               </a:ln>
               <a:extLst>
                 <a:ext uri="{91240B29-F687-4f45-9708-019B960494DF}">
-                  <a14:hiddenLine xmlns="" xmlns:a14="http://schemas.microsoft.com/office/drawing/2010/main" w="9525">
+                  <a14:hiddenLine xmlns:a14="http://schemas.microsoft.com/office/drawing/2010/main" xmlns="" w="9525">
                     <a:solidFill>
                       <a:srgbClr val="000000"/>
                     </a:solidFill>
@@ -11522,7 +11522,7 @@
               </a:ln>
               <a:extLst>
                 <a:ext uri="{91240B29-F687-4f45-9708-019B960494DF}">
-                  <a14:hiddenLine xmlns="" xmlns:a14="http://schemas.microsoft.com/office/drawing/2010/main" w="9525">
+                  <a14:hiddenLine xmlns:a14="http://schemas.microsoft.com/office/drawing/2010/main" xmlns="" w="9525">
                     <a:solidFill>
                       <a:srgbClr val="000000"/>
                     </a:solidFill>
@@ -11587,7 +11587,7 @@
               </a:ln>
               <a:extLst>
                 <a:ext uri="{91240B29-F687-4f45-9708-019B960494DF}">
-                  <a14:hiddenLine xmlns="" xmlns:a14="http://schemas.microsoft.com/office/drawing/2010/main" w="9525">
+                  <a14:hiddenLine xmlns:a14="http://schemas.microsoft.com/office/drawing/2010/main" xmlns="" w="9525">
                     <a:solidFill>
                       <a:srgbClr val="000000"/>
                     </a:solidFill>
@@ -11649,7 +11649,7 @@
               </a:ln>
               <a:extLst>
                 <a:ext uri="{91240B29-F687-4f45-9708-019B960494DF}">
-                  <a14:hiddenLine xmlns="" xmlns:a14="http://schemas.microsoft.com/office/drawing/2010/main" w="9525">
+                  <a14:hiddenLine xmlns:a14="http://schemas.microsoft.com/office/drawing/2010/main" xmlns="" w="9525">
                     <a:solidFill>
                       <a:srgbClr val="000000"/>
                     </a:solidFill>
@@ -11739,7 +11739,7 @@
               </a:ln>
               <a:extLst>
                 <a:ext uri="{91240B29-F687-4f45-9708-019B960494DF}">
-                  <a14:hiddenLine xmlns="" xmlns:a14="http://schemas.microsoft.com/office/drawing/2010/main" w="9525">
+                  <a14:hiddenLine xmlns:a14="http://schemas.microsoft.com/office/drawing/2010/main" xmlns="" w="9525">
                     <a:solidFill>
                       <a:srgbClr val="000000"/>
                     </a:solidFill>
@@ -11829,7 +11829,7 @@
               </a:ln>
               <a:extLst>
                 <a:ext uri="{91240B29-F687-4f45-9708-019B960494DF}">
-                  <a14:hiddenLine xmlns="" xmlns:a14="http://schemas.microsoft.com/office/drawing/2010/main" w="9525">
+                  <a14:hiddenLine xmlns:a14="http://schemas.microsoft.com/office/drawing/2010/main" xmlns="" w="9525">
                     <a:solidFill>
                       <a:srgbClr val="000000"/>
                     </a:solidFill>
@@ -11894,7 +11894,7 @@
               </a:ln>
               <a:extLst>
                 <a:ext uri="{91240B29-F687-4f45-9708-019B960494DF}">
-                  <a14:hiddenLine xmlns="" xmlns:a14="http://schemas.microsoft.com/office/drawing/2010/main" w="9525">
+                  <a14:hiddenLine xmlns:a14="http://schemas.microsoft.com/office/drawing/2010/main" xmlns="" w="9525">
                     <a:solidFill>
                       <a:srgbClr val="000000"/>
                     </a:solidFill>
@@ -12014,7 +12014,7 @@
               </a:ln>
               <a:extLst>
                 <a:ext uri="{91240B29-F687-4f45-9708-019B960494DF}">
-                  <a14:hiddenLine xmlns="" xmlns:a14="http://schemas.microsoft.com/office/drawing/2010/main" w="9525">
+                  <a14:hiddenLine xmlns:a14="http://schemas.microsoft.com/office/drawing/2010/main" xmlns="" w="9525">
                     <a:solidFill>
                       <a:srgbClr val="000000"/>
                     </a:solidFill>
@@ -12095,7 +12095,7 @@
               </a:ln>
               <a:extLst>
                 <a:ext uri="{91240B29-F687-4f45-9708-019B960494DF}">
-                  <a14:hiddenLine xmlns="" xmlns:a14="http://schemas.microsoft.com/office/drawing/2010/main" w="9525">
+                  <a14:hiddenLine xmlns:a14="http://schemas.microsoft.com/office/drawing/2010/main" xmlns="" w="9525">
                     <a:solidFill>
                       <a:srgbClr val="000000"/>
                     </a:solidFill>
@@ -12210,7 +12210,7 @@
               </a:ln>
               <a:extLst>
                 <a:ext uri="{91240B29-F687-4f45-9708-019B960494DF}">
-                  <a14:hiddenLine xmlns="" xmlns:a14="http://schemas.microsoft.com/office/drawing/2010/main" w="9525">
+                  <a14:hiddenLine xmlns:a14="http://schemas.microsoft.com/office/drawing/2010/main" xmlns="" w="9525">
                     <a:solidFill>
                       <a:srgbClr val="000000"/>
                     </a:solidFill>
@@ -12300,7 +12300,7 @@
               </a:ln>
               <a:extLst>
                 <a:ext uri="{91240B29-F687-4f45-9708-019B960494DF}">
-                  <a14:hiddenLine xmlns="" xmlns:a14="http://schemas.microsoft.com/office/drawing/2010/main" w="9525">
+                  <a14:hiddenLine xmlns:a14="http://schemas.microsoft.com/office/drawing/2010/main" xmlns="" w="9525">
                     <a:solidFill>
                       <a:srgbClr val="000000"/>
                     </a:solidFill>
@@ -12365,7 +12365,7 @@
               </a:ln>
               <a:extLst>
                 <a:ext uri="{91240B29-F687-4f45-9708-019B960494DF}">
-                  <a14:hiddenLine xmlns="" xmlns:a14="http://schemas.microsoft.com/office/drawing/2010/main" w="9525">
+                  <a14:hiddenLine xmlns:a14="http://schemas.microsoft.com/office/drawing/2010/main" xmlns="" w="9525">
                     <a:solidFill>
                       <a:srgbClr val="000000"/>
                     </a:solidFill>
@@ -12455,7 +12455,7 @@
               </a:ln>
               <a:extLst>
                 <a:ext uri="{91240B29-F687-4f45-9708-019B960494DF}">
-                  <a14:hiddenLine xmlns="" xmlns:a14="http://schemas.microsoft.com/office/drawing/2010/main" w="9525">
+                  <a14:hiddenLine xmlns:a14="http://schemas.microsoft.com/office/drawing/2010/main" xmlns="" w="9525">
                     <a:solidFill>
                       <a:srgbClr val="000000"/>
                     </a:solidFill>
@@ -12523,7 +12523,7 @@
               </a:ln>
               <a:extLst>
                 <a:ext uri="{91240B29-F687-4f45-9708-019B960494DF}">
-                  <a14:hiddenLine xmlns="" xmlns:a14="http://schemas.microsoft.com/office/drawing/2010/main" w="9525">
+                  <a14:hiddenLine xmlns:a14="http://schemas.microsoft.com/office/drawing/2010/main" xmlns="" w="9525">
                     <a:solidFill>
                       <a:srgbClr val="000000"/>
                     </a:solidFill>
@@ -12613,7 +12613,7 @@
               </a:ln>
               <a:extLst>
                 <a:ext uri="{91240B29-F687-4f45-9708-019B960494DF}">
-                  <a14:hiddenLine xmlns="" xmlns:a14="http://schemas.microsoft.com/office/drawing/2010/main" w="9525">
+                  <a14:hiddenLine xmlns:a14="http://schemas.microsoft.com/office/drawing/2010/main" xmlns="" w="9525">
                     <a:solidFill>
                       <a:srgbClr val="000000"/>
                     </a:solidFill>
@@ -12681,7 +12681,7 @@
               </a:ln>
               <a:extLst>
                 <a:ext uri="{91240B29-F687-4f45-9708-019B960494DF}">
-                  <a14:hiddenLine xmlns="" xmlns:a14="http://schemas.microsoft.com/office/drawing/2010/main" w="9525">
+                  <a14:hiddenLine xmlns:a14="http://schemas.microsoft.com/office/drawing/2010/main" xmlns="" w="9525">
                     <a:solidFill>
                       <a:srgbClr val="000000"/>
                     </a:solidFill>
@@ -12771,7 +12771,7 @@
               </a:ln>
               <a:extLst>
                 <a:ext uri="{91240B29-F687-4f45-9708-019B960494DF}">
-                  <a14:hiddenLine xmlns="" xmlns:a14="http://schemas.microsoft.com/office/drawing/2010/main" w="9525">
+                  <a14:hiddenLine xmlns:a14="http://schemas.microsoft.com/office/drawing/2010/main" xmlns="" w="9525">
                     <a:solidFill>
                       <a:srgbClr val="000000"/>
                     </a:solidFill>
@@ -12805,7 +12805,7 @@
               </a:ln>
               <a:extLst>
                 <a:ext uri="{91240B29-F687-4f45-9708-019B960494DF}">
-                  <a14:hiddenLine xmlns="" xmlns:a14="http://schemas.microsoft.com/office/drawing/2010/main" w="9525">
+                  <a14:hiddenLine xmlns:a14="http://schemas.microsoft.com/office/drawing/2010/main" xmlns="" w="9525">
                     <a:solidFill>
                       <a:srgbClr val="000000"/>
                     </a:solidFill>
@@ -12946,7 +12946,7 @@
             <a:fld id="{48A87A34-81AB-432B-8DAE-1953F412C126}" type="datetimeFigureOut">
               <a:rPr lang="en-US" dirty="0"/>
               <a:pPr/>
-              <a:t>2/28/19</a:t>
+              <a:t>2/28/2019</a:t>
             </a:fld>
             <a:endParaRPr lang="en-US" dirty="0"/>
           </a:p>
@@ -13656,7 +13656,7 @@
       </p:sp>
       <p:pic>
         <p:nvPicPr>
-          <p:cNvPr id="7" name="Picture 6" descr="A close up of a piece of paper&#13;&#10;&#13;&#10;Description automatically generated">
+          <p:cNvPr id="7" name="Picture 6" descr="A close up of a piece of paper&#10;&#10;Description automatically generated">
             <a:extLst>
               <a:ext uri="{FF2B5EF4-FFF2-40B4-BE49-F238E27FC236}">
                 <a16:creationId xmlns:a16="http://schemas.microsoft.com/office/drawing/2014/main" id="{C74BA77C-CE20-494C-AC6B-432E74A37147}"/>
@@ -17890,7 +17890,12 @@
             <p:ph idx="1"/>
           </p:nvPr>
         </p:nvSpPr>
-        <p:spPr/>
+        <p:spPr>
+          <a:xfrm>
+            <a:off x="923048" y="2233446"/>
+            <a:ext cx="6091901" cy="3541714"/>
+          </a:xfrm>
+        </p:spPr>
         <p:txBody>
           <a:bodyPr/>
           <a:lstStyle/>
@@ -17925,6 +17930,36 @@
           </a:p>
         </p:txBody>
       </p:sp>
+      <p:pic>
+        <p:nvPicPr>
+          <p:cNvPr id="5" name="Picture 4">
+            <a:extLst>
+              <a:ext uri="{FF2B5EF4-FFF2-40B4-BE49-F238E27FC236}">
+                <a16:creationId xmlns:a16="http://schemas.microsoft.com/office/drawing/2014/main" id="{5F5EB6FD-66A7-441F-B59A-FC41566ABF40}"/>
+              </a:ext>
+            </a:extLst>
+          </p:cNvPr>
+          <p:cNvPicPr>
+            <a:picLocks noChangeAspect="1"/>
+          </p:cNvPicPr>
+          <p:nvPr/>
+        </p:nvPicPr>
+        <p:blipFill>
+          <a:blip r:embed="rId3"/>
+          <a:stretch>
+            <a:fillRect/>
+          </a:stretch>
+        </p:blipFill>
+        <p:spPr>
+          <a:xfrm>
+            <a:off x="6890982" y="2249487"/>
+            <a:ext cx="4800600" cy="3429000"/>
+          </a:xfrm>
+          <a:prstGeom prst="rect">
+            <a:avLst/>
+          </a:prstGeom>
+        </p:spPr>
+      </p:pic>
     </p:spTree>
     <p:extLst>
       <p:ext uri="{BB962C8B-B14F-4D97-AF65-F5344CB8AC3E}">
@@ -19037,7 +19072,7 @@
             </a:ln>
             <a:extLst>
               <a:ext uri="{91240B29-F687-4f45-9708-019B960494DF}">
-                <a14:hiddenLine xmlns:a16="http://schemas.microsoft.com/office/drawing/2014/main" xmlns:p14="http://schemas.microsoft.com/office/powerpoint/2010/main" xmlns:a14="http://schemas.microsoft.com/office/drawing/2010/main" xmlns="" w="9525">
+                <a14:hiddenLine xmlns="" xmlns:a14="http://schemas.microsoft.com/office/drawing/2010/main" xmlns:p14="http://schemas.microsoft.com/office/powerpoint/2010/main" xmlns:a16="http://schemas.microsoft.com/office/drawing/2014/main" w="9525">
                   <a:solidFill>
                     <a:srgbClr val="000000"/>
                   </a:solidFill>
@@ -19142,7 +19177,7 @@
             </a:ln>
             <a:extLst>
               <a:ext uri="{91240B29-F687-4f45-9708-019B960494DF}">
-                <a14:hiddenLine xmlns:a16="http://schemas.microsoft.com/office/drawing/2014/main" xmlns:p14="http://schemas.microsoft.com/office/powerpoint/2010/main" xmlns:a14="http://schemas.microsoft.com/office/drawing/2010/main" xmlns="" w="9525">
+                <a14:hiddenLine xmlns="" xmlns:a14="http://schemas.microsoft.com/office/drawing/2010/main" xmlns:p14="http://schemas.microsoft.com/office/powerpoint/2010/main" xmlns:a16="http://schemas.microsoft.com/office/drawing/2014/main" w="9525">
                   <a:solidFill>
                     <a:srgbClr val="000000"/>
                   </a:solidFill>
@@ -19247,7 +19282,7 @@
             </a:ln>
             <a:extLst>
               <a:ext uri="{91240B29-F687-4f45-9708-019B960494DF}">
-                <a14:hiddenLine xmlns:a16="http://schemas.microsoft.com/office/drawing/2014/main" xmlns:p14="http://schemas.microsoft.com/office/powerpoint/2010/main" xmlns:a14="http://schemas.microsoft.com/office/drawing/2010/main" xmlns="" w="9525">
+                <a14:hiddenLine xmlns="" xmlns:a14="http://schemas.microsoft.com/office/drawing/2010/main" xmlns:p14="http://schemas.microsoft.com/office/powerpoint/2010/main" xmlns:a16="http://schemas.microsoft.com/office/drawing/2014/main" w="9525">
                   <a:solidFill>
                     <a:srgbClr val="000000"/>
                   </a:solidFill>
@@ -19324,7 +19359,7 @@
             </a:ln>
             <a:extLst>
               <a:ext uri="{91240B29-F687-4f45-9708-019B960494DF}">
-                <a14:hiddenLine xmlns:a16="http://schemas.microsoft.com/office/drawing/2014/main" xmlns:p14="http://schemas.microsoft.com/office/powerpoint/2010/main" xmlns:a14="http://schemas.microsoft.com/office/drawing/2010/main" xmlns="" w="9525">
+                <a14:hiddenLine xmlns="" xmlns:a14="http://schemas.microsoft.com/office/drawing/2010/main" xmlns:p14="http://schemas.microsoft.com/office/powerpoint/2010/main" xmlns:a16="http://schemas.microsoft.com/office/drawing/2014/main" w="9525">
                   <a:solidFill>
                     <a:srgbClr val="000000"/>
                   </a:solidFill>
@@ -19429,7 +19464,7 @@
             </a:ln>
             <a:extLst>
               <a:ext uri="{91240B29-F687-4f45-9708-019B960494DF}">
-                <a14:hiddenLine xmlns:a16="http://schemas.microsoft.com/office/drawing/2014/main" xmlns:p14="http://schemas.microsoft.com/office/powerpoint/2010/main" xmlns:a14="http://schemas.microsoft.com/office/drawing/2010/main" xmlns="" w="9525">
+                <a14:hiddenLine xmlns="" xmlns:a14="http://schemas.microsoft.com/office/drawing/2010/main" xmlns:p14="http://schemas.microsoft.com/office/powerpoint/2010/main" xmlns:a16="http://schemas.microsoft.com/office/drawing/2014/main" w="9525">
                   <a:solidFill>
                     <a:srgbClr val="000000"/>
                   </a:solidFill>
@@ -19506,7 +19541,7 @@
             </a:ln>
             <a:extLst>
               <a:ext uri="{91240B29-F687-4f45-9708-019B960494DF}">
-                <a14:hiddenLine xmlns:a16="http://schemas.microsoft.com/office/drawing/2014/main" xmlns:p14="http://schemas.microsoft.com/office/powerpoint/2010/main" xmlns:a14="http://schemas.microsoft.com/office/drawing/2010/main" xmlns="" w="9525">
+                <a14:hiddenLine xmlns="" xmlns:a14="http://schemas.microsoft.com/office/drawing/2010/main" xmlns:p14="http://schemas.microsoft.com/office/powerpoint/2010/main" xmlns:a16="http://schemas.microsoft.com/office/drawing/2014/main" w="9525">
                   <a:solidFill>
                     <a:srgbClr val="000000"/>
                   </a:solidFill>
@@ -19583,7 +19618,7 @@
             </a:ln>
             <a:extLst>
               <a:ext uri="{91240B29-F687-4f45-9708-019B960494DF}">
-                <a14:hiddenLine xmlns:a16="http://schemas.microsoft.com/office/drawing/2014/main" xmlns:p14="http://schemas.microsoft.com/office/powerpoint/2010/main" xmlns:a14="http://schemas.microsoft.com/office/drawing/2010/main" xmlns="" w="9525">
+                <a14:hiddenLine xmlns="" xmlns:a14="http://schemas.microsoft.com/office/drawing/2010/main" xmlns:p14="http://schemas.microsoft.com/office/powerpoint/2010/main" xmlns:a16="http://schemas.microsoft.com/office/drawing/2014/main" w="9525">
                   <a:solidFill>
                     <a:srgbClr val="000000"/>
                   </a:solidFill>
@@ -19688,7 +19723,7 @@
             </a:ln>
             <a:extLst>
               <a:ext uri="{91240B29-F687-4f45-9708-019B960494DF}">
-                <a14:hiddenLine xmlns:a16="http://schemas.microsoft.com/office/drawing/2014/main" xmlns:p14="http://schemas.microsoft.com/office/powerpoint/2010/main" xmlns:a14="http://schemas.microsoft.com/office/drawing/2010/main" xmlns="" w="9525">
+                <a14:hiddenLine xmlns="" xmlns:a14="http://schemas.microsoft.com/office/drawing/2010/main" xmlns:p14="http://schemas.microsoft.com/office/powerpoint/2010/main" xmlns:a16="http://schemas.microsoft.com/office/drawing/2014/main" w="9525">
                   <a:solidFill>
                     <a:srgbClr val="000000"/>
                   </a:solidFill>
@@ -19793,7 +19828,7 @@
             </a:ln>
             <a:extLst>
               <a:ext uri="{91240B29-F687-4f45-9708-019B960494DF}">
-                <a14:hiddenLine xmlns:a16="http://schemas.microsoft.com/office/drawing/2014/main" xmlns:p14="http://schemas.microsoft.com/office/powerpoint/2010/main" xmlns:a14="http://schemas.microsoft.com/office/drawing/2010/main" xmlns="" w="9525">
+                <a14:hiddenLine xmlns="" xmlns:a14="http://schemas.microsoft.com/office/drawing/2010/main" xmlns:p14="http://schemas.microsoft.com/office/powerpoint/2010/main" xmlns:a16="http://schemas.microsoft.com/office/drawing/2014/main" w="9525">
                   <a:solidFill>
                     <a:srgbClr val="000000"/>
                   </a:solidFill>
@@ -19870,7 +19905,7 @@
             </a:ln>
             <a:extLst>
               <a:ext uri="{91240B29-F687-4f45-9708-019B960494DF}">
-                <a14:hiddenLine xmlns:a16="http://schemas.microsoft.com/office/drawing/2014/main" xmlns:p14="http://schemas.microsoft.com/office/powerpoint/2010/main" xmlns:a14="http://schemas.microsoft.com/office/drawing/2010/main" xmlns="" w="9525">
+                <a14:hiddenLine xmlns="" xmlns:a14="http://schemas.microsoft.com/office/drawing/2010/main" xmlns:p14="http://schemas.microsoft.com/office/powerpoint/2010/main" xmlns:a16="http://schemas.microsoft.com/office/drawing/2014/main" w="9525">
                   <a:solidFill>
                     <a:srgbClr val="000000"/>
                   </a:solidFill>
@@ -19995,7 +20030,7 @@
             </a:ln>
             <a:extLst>
               <a:ext uri="{91240B29-F687-4f45-9708-019B960494DF}">
-                <a14:hiddenLine xmlns:a16="http://schemas.microsoft.com/office/drawing/2014/main" xmlns:p14="http://schemas.microsoft.com/office/powerpoint/2010/main" xmlns:a14="http://schemas.microsoft.com/office/drawing/2010/main" xmlns="" w="9525">
+                <a14:hiddenLine xmlns="" xmlns:a14="http://schemas.microsoft.com/office/drawing/2010/main" xmlns:p14="http://schemas.microsoft.com/office/powerpoint/2010/main" xmlns:a16="http://schemas.microsoft.com/office/drawing/2014/main" w="9525">
                   <a:solidFill>
                     <a:srgbClr val="000000"/>
                   </a:solidFill>
@@ -20109,7 +20144,7 @@
             </a:ln>
             <a:extLst>
               <a:ext uri="{91240B29-F687-4f45-9708-019B960494DF}">
-                <a14:hiddenLine xmlns:a16="http://schemas.microsoft.com/office/drawing/2014/main" xmlns:p14="http://schemas.microsoft.com/office/powerpoint/2010/main" xmlns:a14="http://schemas.microsoft.com/office/drawing/2010/main" xmlns="" w="9525">
+                <a14:hiddenLine xmlns="" xmlns:a14="http://schemas.microsoft.com/office/drawing/2010/main" xmlns:p14="http://schemas.microsoft.com/office/powerpoint/2010/main" xmlns:a16="http://schemas.microsoft.com/office/drawing/2014/main" w="9525">
                   <a:solidFill>
                     <a:srgbClr val="000000"/>
                   </a:solidFill>
@@ -20186,7 +20221,7 @@
             </a:ln>
             <a:extLst>
               <a:ext uri="{91240B29-F687-4f45-9708-019B960494DF}">
-                <a14:hiddenLine xmlns:a16="http://schemas.microsoft.com/office/drawing/2014/main" xmlns:p14="http://schemas.microsoft.com/office/powerpoint/2010/main" xmlns:a14="http://schemas.microsoft.com/office/drawing/2010/main" xmlns="" w="9525">
+                <a14:hiddenLine xmlns="" xmlns:a14="http://schemas.microsoft.com/office/drawing/2010/main" xmlns:p14="http://schemas.microsoft.com/office/powerpoint/2010/main" xmlns:a16="http://schemas.microsoft.com/office/drawing/2014/main" w="9525">
                   <a:solidFill>
                     <a:srgbClr val="000000"/>
                   </a:solidFill>
@@ -20263,7 +20298,7 @@
             </a:ln>
             <a:extLst>
               <a:ext uri="{91240B29-F687-4f45-9708-019B960494DF}">
-                <a14:hiddenLine xmlns:a16="http://schemas.microsoft.com/office/drawing/2014/main" xmlns:p14="http://schemas.microsoft.com/office/powerpoint/2010/main" xmlns:a14="http://schemas.microsoft.com/office/drawing/2010/main" xmlns="" w="9525">
+                <a14:hiddenLine xmlns="" xmlns:a14="http://schemas.microsoft.com/office/drawing/2010/main" xmlns:p14="http://schemas.microsoft.com/office/powerpoint/2010/main" xmlns:a16="http://schemas.microsoft.com/office/drawing/2014/main" w="9525">
                   <a:solidFill>
                     <a:srgbClr val="000000"/>
                   </a:solidFill>
@@ -20368,7 +20403,7 @@
             </a:ln>
             <a:extLst>
               <a:ext uri="{91240B29-F687-4f45-9708-019B960494DF}">
-                <a14:hiddenLine xmlns:a16="http://schemas.microsoft.com/office/drawing/2014/main" xmlns:p14="http://schemas.microsoft.com/office/powerpoint/2010/main" xmlns:a14="http://schemas.microsoft.com/office/drawing/2010/main" xmlns="" w="9525">
+                <a14:hiddenLine xmlns="" xmlns:a14="http://schemas.microsoft.com/office/drawing/2010/main" xmlns:p14="http://schemas.microsoft.com/office/powerpoint/2010/main" xmlns:a16="http://schemas.microsoft.com/office/drawing/2014/main" w="9525">
                   <a:solidFill>
                     <a:srgbClr val="000000"/>
                   </a:solidFill>
@@ -20417,7 +20452,7 @@
             </a:ln>
             <a:extLst>
               <a:ext uri="{91240B29-F687-4f45-9708-019B960494DF}">
-                <a14:hiddenLine xmlns:a16="http://schemas.microsoft.com/office/drawing/2014/main" xmlns:p14="http://schemas.microsoft.com/office/powerpoint/2010/main" xmlns:a14="http://schemas.microsoft.com/office/drawing/2010/main" xmlns="" w="9525">
+                <a14:hiddenLine xmlns="" xmlns:a14="http://schemas.microsoft.com/office/drawing/2010/main" xmlns:p14="http://schemas.microsoft.com/office/powerpoint/2010/main" xmlns:a16="http://schemas.microsoft.com/office/drawing/2014/main" w="9525">
                   <a:solidFill>
                     <a:srgbClr val="000000"/>
                   </a:solidFill>
@@ -20497,7 +20532,7 @@
             </a:ln>
             <a:extLst>
               <a:ext uri="{91240B29-F687-4f45-9708-019B960494DF}">
-                <a14:hiddenLine xmlns:a16="http://schemas.microsoft.com/office/drawing/2014/main" xmlns:p14="http://schemas.microsoft.com/office/powerpoint/2010/main" xmlns:a14="http://schemas.microsoft.com/office/drawing/2010/main" xmlns="" w="9525">
+                <a14:hiddenLine xmlns="" xmlns:a14="http://schemas.microsoft.com/office/drawing/2010/main" xmlns:p14="http://schemas.microsoft.com/office/powerpoint/2010/main" xmlns:a16="http://schemas.microsoft.com/office/drawing/2014/main" w="9525">
                   <a:solidFill>
                     <a:srgbClr val="000000"/>
                   </a:solidFill>
@@ -20602,7 +20637,7 @@
             </a:ln>
             <a:extLst>
               <a:ext uri="{91240B29-F687-4f45-9708-019B960494DF}">
-                <a14:hiddenLine xmlns:a16="http://schemas.microsoft.com/office/drawing/2014/main" xmlns:p14="http://schemas.microsoft.com/office/powerpoint/2010/main" xmlns:a14="http://schemas.microsoft.com/office/drawing/2010/main" xmlns="" w="9525">
+                <a14:hiddenLine xmlns="" xmlns:a14="http://schemas.microsoft.com/office/drawing/2010/main" xmlns:p14="http://schemas.microsoft.com/office/powerpoint/2010/main" xmlns:a16="http://schemas.microsoft.com/office/drawing/2014/main" w="9525">
                   <a:solidFill>
                     <a:srgbClr val="000000"/>
                   </a:solidFill>
@@ -20679,7 +20714,7 @@
             </a:ln>
             <a:extLst>
               <a:ext uri="{91240B29-F687-4f45-9708-019B960494DF}">
-                <a14:hiddenLine xmlns:a16="http://schemas.microsoft.com/office/drawing/2014/main" xmlns:p14="http://schemas.microsoft.com/office/powerpoint/2010/main" xmlns:a14="http://schemas.microsoft.com/office/drawing/2010/main" xmlns="" w="9525">
+                <a14:hiddenLine xmlns="" xmlns:a14="http://schemas.microsoft.com/office/drawing/2010/main" xmlns:p14="http://schemas.microsoft.com/office/powerpoint/2010/main" xmlns:a16="http://schemas.microsoft.com/office/drawing/2014/main" w="9525">
                   <a:solidFill>
                     <a:srgbClr val="000000"/>
                   </a:solidFill>
@@ -20784,7 +20819,7 @@
             </a:ln>
             <a:extLst>
               <a:ext uri="{91240B29-F687-4f45-9708-019B960494DF}">
-                <a14:hiddenLine xmlns:a16="http://schemas.microsoft.com/office/drawing/2014/main" xmlns:p14="http://schemas.microsoft.com/office/powerpoint/2010/main" xmlns:a14="http://schemas.microsoft.com/office/drawing/2010/main" xmlns="" w="9525">
+                <a14:hiddenLine xmlns="" xmlns:a14="http://schemas.microsoft.com/office/drawing/2010/main" xmlns:p14="http://schemas.microsoft.com/office/powerpoint/2010/main" xmlns:a16="http://schemas.microsoft.com/office/drawing/2014/main" w="9525">
                   <a:solidFill>
                     <a:srgbClr val="000000"/>
                   </a:solidFill>
@@ -20864,7 +20899,7 @@
             </a:ln>
             <a:extLst>
               <a:ext uri="{91240B29-F687-4f45-9708-019B960494DF}">
-                <a14:hiddenLine xmlns:a16="http://schemas.microsoft.com/office/drawing/2014/main" xmlns:p14="http://schemas.microsoft.com/office/powerpoint/2010/main" xmlns:a14="http://schemas.microsoft.com/office/drawing/2010/main" xmlns="" w="9525">
+                <a14:hiddenLine xmlns="" xmlns:a14="http://schemas.microsoft.com/office/drawing/2010/main" xmlns:p14="http://schemas.microsoft.com/office/powerpoint/2010/main" xmlns:a16="http://schemas.microsoft.com/office/drawing/2014/main" w="9525">
                   <a:solidFill>
                     <a:srgbClr val="000000"/>
                   </a:solidFill>
@@ -20941,7 +20976,7 @@
             </a:ln>
             <a:extLst>
               <a:ext uri="{91240B29-F687-4f45-9708-019B960494DF}">
-                <a14:hiddenLine xmlns:a16="http://schemas.microsoft.com/office/drawing/2014/main" xmlns:p14="http://schemas.microsoft.com/office/powerpoint/2010/main" xmlns:a14="http://schemas.microsoft.com/office/drawing/2010/main" xmlns="" w="9525">
+                <a14:hiddenLine xmlns="" xmlns:a14="http://schemas.microsoft.com/office/drawing/2010/main" xmlns:p14="http://schemas.microsoft.com/office/powerpoint/2010/main" xmlns:a16="http://schemas.microsoft.com/office/drawing/2014/main" w="9525">
                   <a:solidFill>
                     <a:srgbClr val="000000"/>
                   </a:solidFill>
@@ -21046,7 +21081,7 @@
             </a:ln>
             <a:extLst>
               <a:ext uri="{91240B29-F687-4f45-9708-019B960494DF}">
-                <a14:hiddenLine xmlns:a16="http://schemas.microsoft.com/office/drawing/2014/main" xmlns:p14="http://schemas.microsoft.com/office/powerpoint/2010/main" xmlns:a14="http://schemas.microsoft.com/office/drawing/2010/main" xmlns="" w="9525">
+                <a14:hiddenLine xmlns="" xmlns:a14="http://schemas.microsoft.com/office/drawing/2010/main" xmlns:p14="http://schemas.microsoft.com/office/powerpoint/2010/main" xmlns:a16="http://schemas.microsoft.com/office/drawing/2014/main" w="9525">
                   <a:solidFill>
                     <a:srgbClr val="000000"/>
                   </a:solidFill>
@@ -21151,7 +21186,7 @@
             </a:ln>
             <a:extLst>
               <a:ext uri="{91240B29-F687-4f45-9708-019B960494DF}">
-                <a14:hiddenLine xmlns:a16="http://schemas.microsoft.com/office/drawing/2014/main" xmlns:p14="http://schemas.microsoft.com/office/powerpoint/2010/main" xmlns:a14="http://schemas.microsoft.com/office/drawing/2010/main" xmlns="" w="9525">
+                <a14:hiddenLine xmlns="" xmlns:a14="http://schemas.microsoft.com/office/drawing/2010/main" xmlns:p14="http://schemas.microsoft.com/office/powerpoint/2010/main" xmlns:a16="http://schemas.microsoft.com/office/drawing/2014/main" w="9525">
                   <a:solidFill>
                     <a:srgbClr val="000000"/>
                   </a:solidFill>
@@ -21231,7 +21266,7 @@
             </a:ln>
             <a:extLst>
               <a:ext uri="{91240B29-F687-4f45-9708-019B960494DF}">
-                <a14:hiddenLine xmlns:a16="http://schemas.microsoft.com/office/drawing/2014/main" xmlns:p14="http://schemas.microsoft.com/office/powerpoint/2010/main" xmlns:a14="http://schemas.microsoft.com/office/drawing/2010/main" xmlns="" w="9525">
+                <a14:hiddenLine xmlns="" xmlns:a14="http://schemas.microsoft.com/office/drawing/2010/main" xmlns:p14="http://schemas.microsoft.com/office/powerpoint/2010/main" xmlns:a16="http://schemas.microsoft.com/office/drawing/2014/main" w="9525">
                   <a:solidFill>
                     <a:srgbClr val="000000"/>
                   </a:solidFill>
@@ -21366,7 +21401,7 @@
             </a:ln>
             <a:extLst>
               <a:ext uri="{91240B29-F687-4f45-9708-019B960494DF}">
-                <a14:hiddenLine xmlns:a16="http://schemas.microsoft.com/office/drawing/2014/main" xmlns:p14="http://schemas.microsoft.com/office/powerpoint/2010/main" xmlns:a14="http://schemas.microsoft.com/office/drawing/2010/main" xmlns="" w="9525">
+                <a14:hiddenLine xmlns="" xmlns:a14="http://schemas.microsoft.com/office/drawing/2010/main" xmlns:p14="http://schemas.microsoft.com/office/powerpoint/2010/main" xmlns:a16="http://schemas.microsoft.com/office/drawing/2014/main" w="9525">
                   <a:solidFill>
                     <a:srgbClr val="000000"/>
                   </a:solidFill>
@@ -21573,7 +21608,7 @@
             </a:ln>
             <a:extLst>
               <a:ext uri="{91240B29-F687-4f45-9708-019B960494DF}">
-                <a14:hiddenLine xmlns:a16="http://schemas.microsoft.com/office/drawing/2014/main" xmlns:p14="http://schemas.microsoft.com/office/powerpoint/2010/main" xmlns:a14="http://schemas.microsoft.com/office/drawing/2010/main" xmlns="" w="9525">
+                <a14:hiddenLine xmlns="" xmlns:a14="http://schemas.microsoft.com/office/drawing/2010/main" xmlns:p14="http://schemas.microsoft.com/office/powerpoint/2010/main" xmlns:a16="http://schemas.microsoft.com/office/drawing/2014/main" w="9525">
                   <a:solidFill>
                     <a:srgbClr val="000000"/>
                   </a:solidFill>
@@ -21703,7 +21738,7 @@
             </a:ln>
             <a:extLst>
               <a:ext uri="{91240B29-F687-4f45-9708-019B960494DF}">
-                <a14:hiddenLine xmlns:a16="http://schemas.microsoft.com/office/drawing/2014/main" xmlns:p14="http://schemas.microsoft.com/office/powerpoint/2010/main" xmlns:a14="http://schemas.microsoft.com/office/drawing/2010/main" xmlns="" w="9525">
+                <a14:hiddenLine xmlns="" xmlns:a14="http://schemas.microsoft.com/office/drawing/2010/main" xmlns:p14="http://schemas.microsoft.com/office/powerpoint/2010/main" xmlns:a16="http://schemas.microsoft.com/office/drawing/2014/main" w="9525">
                   <a:solidFill>
                     <a:srgbClr val="000000"/>
                   </a:solidFill>
@@ -21808,7 +21843,7 @@
             </a:ln>
             <a:extLst>
               <a:ext uri="{91240B29-F687-4f45-9708-019B960494DF}">
-                <a14:hiddenLine xmlns:a16="http://schemas.microsoft.com/office/drawing/2014/main" xmlns:p14="http://schemas.microsoft.com/office/powerpoint/2010/main" xmlns:a14="http://schemas.microsoft.com/office/drawing/2010/main" xmlns="" w="9525">
+                <a14:hiddenLine xmlns="" xmlns:a14="http://schemas.microsoft.com/office/drawing/2010/main" xmlns:p14="http://schemas.microsoft.com/office/powerpoint/2010/main" xmlns:a16="http://schemas.microsoft.com/office/drawing/2014/main" w="9525">
                   <a:solidFill>
                     <a:srgbClr val="000000"/>
                   </a:solidFill>
@@ -21888,7 +21923,7 @@
             </a:ln>
             <a:extLst>
               <a:ext uri="{91240B29-F687-4f45-9708-019B960494DF}">
-                <a14:hiddenLine xmlns:a16="http://schemas.microsoft.com/office/drawing/2014/main" xmlns:p14="http://schemas.microsoft.com/office/powerpoint/2010/main" xmlns:a14="http://schemas.microsoft.com/office/drawing/2010/main" xmlns="" w="9525">
+                <a14:hiddenLine xmlns="" xmlns:a14="http://schemas.microsoft.com/office/drawing/2010/main" xmlns:p14="http://schemas.microsoft.com/office/powerpoint/2010/main" xmlns:a16="http://schemas.microsoft.com/office/drawing/2014/main" w="9525">
                   <a:solidFill>
                     <a:srgbClr val="000000"/>
                   </a:solidFill>
@@ -21993,7 +22028,7 @@
             </a:ln>
             <a:extLst>
               <a:ext uri="{91240B29-F687-4f45-9708-019B960494DF}">
-                <a14:hiddenLine xmlns:a16="http://schemas.microsoft.com/office/drawing/2014/main" xmlns:p14="http://schemas.microsoft.com/office/powerpoint/2010/main" xmlns:a14="http://schemas.microsoft.com/office/drawing/2010/main" xmlns="" w="9525">
+                <a14:hiddenLine xmlns="" xmlns:a14="http://schemas.microsoft.com/office/drawing/2010/main" xmlns:p14="http://schemas.microsoft.com/office/powerpoint/2010/main" xmlns:a16="http://schemas.microsoft.com/office/drawing/2014/main" w="9525">
                   <a:solidFill>
                     <a:srgbClr val="000000"/>
                   </a:solidFill>
@@ -22076,7 +22111,7 @@
             </a:ln>
             <a:extLst>
               <a:ext uri="{91240B29-F687-4f45-9708-019B960494DF}">
-                <a14:hiddenLine xmlns:a16="http://schemas.microsoft.com/office/drawing/2014/main" xmlns:p14="http://schemas.microsoft.com/office/powerpoint/2010/main" xmlns:a14="http://schemas.microsoft.com/office/drawing/2010/main" xmlns="" w="9525">
+                <a14:hiddenLine xmlns="" xmlns:a14="http://schemas.microsoft.com/office/drawing/2010/main" xmlns:p14="http://schemas.microsoft.com/office/powerpoint/2010/main" xmlns:a16="http://schemas.microsoft.com/office/drawing/2014/main" w="9525">
                   <a:solidFill>
                     <a:srgbClr val="000000"/>
                   </a:solidFill>
@@ -22181,7 +22216,7 @@
             </a:ln>
             <a:extLst>
               <a:ext uri="{91240B29-F687-4f45-9708-019B960494DF}">
-                <a14:hiddenLine xmlns:a16="http://schemas.microsoft.com/office/drawing/2014/main" xmlns:p14="http://schemas.microsoft.com/office/powerpoint/2010/main" xmlns:a14="http://schemas.microsoft.com/office/drawing/2010/main" xmlns="" w="9525">
+                <a14:hiddenLine xmlns="" xmlns:a14="http://schemas.microsoft.com/office/drawing/2010/main" xmlns:p14="http://schemas.microsoft.com/office/powerpoint/2010/main" xmlns:a16="http://schemas.microsoft.com/office/drawing/2014/main" w="9525">
                   <a:solidFill>
                     <a:srgbClr val="000000"/>
                   </a:solidFill>
@@ -22264,7 +22299,7 @@
             </a:ln>
             <a:extLst>
               <a:ext uri="{91240B29-F687-4f45-9708-019B960494DF}">
-                <a14:hiddenLine xmlns:a16="http://schemas.microsoft.com/office/drawing/2014/main" xmlns:p14="http://schemas.microsoft.com/office/powerpoint/2010/main" xmlns:a14="http://schemas.microsoft.com/office/drawing/2010/main" xmlns="" w="9525">
+                <a14:hiddenLine xmlns="" xmlns:a14="http://schemas.microsoft.com/office/drawing/2010/main" xmlns:p14="http://schemas.microsoft.com/office/powerpoint/2010/main" xmlns:a16="http://schemas.microsoft.com/office/drawing/2014/main" w="9525">
                   <a:solidFill>
                     <a:srgbClr val="000000"/>
                   </a:solidFill>
@@ -22369,7 +22404,7 @@
             </a:ln>
             <a:extLst>
               <a:ext uri="{91240B29-F687-4f45-9708-019B960494DF}">
-                <a14:hiddenLine xmlns:a16="http://schemas.microsoft.com/office/drawing/2014/main" xmlns:p14="http://schemas.microsoft.com/office/powerpoint/2010/main" xmlns:a14="http://schemas.microsoft.com/office/drawing/2010/main" xmlns="" w="9525">
+                <a14:hiddenLine xmlns="" xmlns:a14="http://schemas.microsoft.com/office/drawing/2010/main" xmlns:p14="http://schemas.microsoft.com/office/powerpoint/2010/main" xmlns:a16="http://schemas.microsoft.com/office/drawing/2014/main" w="9525">
                   <a:solidFill>
                     <a:srgbClr val="000000"/>
                   </a:solidFill>
@@ -22418,7 +22453,7 @@
             </a:ln>
             <a:extLst>
               <a:ext uri="{91240B29-F687-4f45-9708-019B960494DF}">
-                <a14:hiddenLine xmlns:a16="http://schemas.microsoft.com/office/drawing/2014/main" xmlns:p14="http://schemas.microsoft.com/office/powerpoint/2010/main" xmlns:a14="http://schemas.microsoft.com/office/drawing/2010/main" xmlns="" w="9525">
+                <a14:hiddenLine xmlns="" xmlns:a14="http://schemas.microsoft.com/office/drawing/2010/main" xmlns:p14="http://schemas.microsoft.com/office/powerpoint/2010/main" xmlns:a16="http://schemas.microsoft.com/office/drawing/2014/main" w="9525">
                   <a:solidFill>
                     <a:srgbClr val="000000"/>
                   </a:solidFill>
@@ -22983,7 +23018,7 @@
       </p:cxnSp>
       <p:pic>
         <p:nvPicPr>
-          <p:cNvPr id="8" name="Content Placeholder 7" descr="A picture containing wall, map&#13;&#10;&#13;&#10;Description automatically generated">
+          <p:cNvPr id="8" name="Content Placeholder 7" descr="A picture containing wall, map&#10;&#10;Description automatically generated">
             <a:extLst>
               <a:ext uri="{FF2B5EF4-FFF2-40B4-BE49-F238E27FC236}">
                 <a16:creationId xmlns:a16="http://schemas.microsoft.com/office/drawing/2014/main" id="{CCBBB80F-4D86-5147-A06E-0DBAF4523D6B}"/>

</xml_diff>